<commit_message>
Updating small individual and big individual simulations for CBG scale model 1.
</commit_message>
<xml_diff>
--- a/MiscArtifacts/TucsonTestsModel1.pptx
+++ b/MiscArtifacts/TucsonTestsModel1.pptx
@@ -12,6 +12,21 @@
     <p:sldId id="260" r:id="rId6"/>
     <p:sldId id="261" r:id="rId7"/>
     <p:sldId id="262" r:id="rId8"/>
+    <p:sldId id="263" r:id="rId9"/>
+    <p:sldId id="266" r:id="rId10"/>
+    <p:sldId id="265" r:id="rId11"/>
+    <p:sldId id="272" r:id="rId12"/>
+    <p:sldId id="273" r:id="rId13"/>
+    <p:sldId id="274" r:id="rId14"/>
+    <p:sldId id="275" r:id="rId15"/>
+    <p:sldId id="276" r:id="rId16"/>
+    <p:sldId id="277" r:id="rId17"/>
+    <p:sldId id="278" r:id="rId18"/>
+    <p:sldId id="279" r:id="rId19"/>
+    <p:sldId id="270" r:id="rId20"/>
+    <p:sldId id="268" r:id="rId21"/>
+    <p:sldId id="269" r:id="rId22"/>
+    <p:sldId id="271" r:id="rId23"/>
   </p:sldIdLst>
   <p:sldSz cx="12192000" cy="6858000"/>
   <p:notesSz cx="12192000" cy="6858000"/>
@@ -269,7 +284,7 @@
             </a:pPr>
             <a:fld id="{5487DD6D-3B3D-41F0-9E3F-0C2163E813E3}" type="datetimeFigureOut">
               <a:rPr lang="en-US"/>
-              <a:t>3/3/2023</a:t>
+              <a:t>3/17/2023</a:t>
             </a:fld>
             <a:endParaRPr lang="en-US"/>
           </a:p>
@@ -460,7 +475,7 @@
             </a:pPr>
             <a:fld id="{5487DD6D-3B3D-41F0-9E3F-0C2163E813E3}" type="datetimeFigureOut">
               <a:rPr lang="en-US"/>
-              <a:t>3/3/2023</a:t>
+              <a:t>3/17/2023</a:t>
             </a:fld>
             <a:endParaRPr lang="en-US"/>
           </a:p>
@@ -661,7 +676,7 @@
             </a:pPr>
             <a:fld id="{5487DD6D-3B3D-41F0-9E3F-0C2163E813E3}" type="datetimeFigureOut">
               <a:rPr lang="en-US"/>
-              <a:t>3/3/2023</a:t>
+              <a:t>3/17/2023</a:t>
             </a:fld>
             <a:endParaRPr lang="en-US"/>
           </a:p>
@@ -852,7 +867,7 @@
             </a:pPr>
             <a:fld id="{5487DD6D-3B3D-41F0-9E3F-0C2163E813E3}" type="datetimeFigureOut">
               <a:rPr lang="en-US"/>
-              <a:t>3/3/2023</a:t>
+              <a:t>3/17/2023</a:t>
             </a:fld>
             <a:endParaRPr lang="en-US"/>
           </a:p>
@@ -1108,7 +1123,7 @@
             </a:pPr>
             <a:fld id="{5487DD6D-3B3D-41F0-9E3F-0C2163E813E3}" type="datetimeFigureOut">
               <a:rPr lang="en-US"/>
-              <a:t>3/3/2023</a:t>
+              <a:t>3/17/2023</a:t>
             </a:fld>
             <a:endParaRPr lang="en-US"/>
           </a:p>
@@ -1375,7 +1390,7 @@
             </a:pPr>
             <a:fld id="{5487DD6D-3B3D-41F0-9E3F-0C2163E813E3}" type="datetimeFigureOut">
               <a:rPr lang="en-US"/>
-              <a:t>3/3/2023</a:t>
+              <a:t>3/17/2023</a:t>
             </a:fld>
             <a:endParaRPr lang="en-US"/>
           </a:p>
@@ -1783,7 +1798,7 @@
             </a:pPr>
             <a:fld id="{5487DD6D-3B3D-41F0-9E3F-0C2163E813E3}" type="datetimeFigureOut">
               <a:rPr lang="en-US"/>
-              <a:t>3/3/2023</a:t>
+              <a:t>3/17/2023</a:t>
             </a:fld>
             <a:endParaRPr lang="en-US"/>
           </a:p>
@@ -1908,7 +1923,7 @@
             </a:pPr>
             <a:fld id="{5487DD6D-3B3D-41F0-9E3F-0C2163E813E3}" type="datetimeFigureOut">
               <a:rPr lang="en-US"/>
-              <a:t>3/3/2023</a:t>
+              <a:t>3/17/2023</a:t>
             </a:fld>
             <a:endParaRPr lang="en-US"/>
           </a:p>
@@ -2007,7 +2022,7 @@
             </a:pPr>
             <a:fld id="{5487DD6D-3B3D-41F0-9E3F-0C2163E813E3}" type="datetimeFigureOut">
               <a:rPr lang="en-US"/>
-              <a:t>3/3/2023</a:t>
+              <a:t>3/17/2023</a:t>
             </a:fld>
             <a:endParaRPr lang="en-US"/>
           </a:p>
@@ -2308,7 +2323,7 @@
             </a:pPr>
             <a:fld id="{5487DD6D-3B3D-41F0-9E3F-0C2163E813E3}" type="datetimeFigureOut">
               <a:rPr lang="en-US"/>
-              <a:t>3/3/2023</a:t>
+              <a:t>3/17/2023</a:t>
             </a:fld>
             <a:endParaRPr lang="en-US"/>
           </a:p>
@@ -2574,7 +2589,7 @@
             </a:pPr>
             <a:fld id="{5487DD6D-3B3D-41F0-9E3F-0C2163E813E3}" type="datetimeFigureOut">
               <a:rPr lang="en-US"/>
-              <a:t>3/3/2023</a:t>
+              <a:t>3/17/2023</a:t>
             </a:fld>
             <a:endParaRPr lang="en-US"/>
           </a:p>
@@ -2808,7 +2823,7 @@
             </a:pPr>
             <a:fld id="{5487DD6D-3B3D-41F0-9E3F-0C2163E813E3}" type="datetimeFigureOut">
               <a:rPr lang="en-US"/>
-              <a:t>3/3/2023</a:t>
+              <a:t>3/17/2023</a:t>
             </a:fld>
             <a:endParaRPr lang="en-US"/>
           </a:p>
@@ -3274,6 +3289,1298 @@
 </p:sld>
 </file>
 
+<file path=ppt/slides/slide10.xml><?xml version="1.0" encoding="utf-8"?>
+<p:sld xmlns:a="http://schemas.openxmlformats.org/drawingml/2006/main" xmlns:r="http://schemas.openxmlformats.org/officeDocument/2006/relationships" xmlns:p="http://schemas.openxmlformats.org/presentationml/2006/main">
+  <p:cSld>
+    <p:spTree>
+      <p:nvGrpSpPr>
+        <p:cNvPr id="1" name=""/>
+        <p:cNvGrpSpPr/>
+        <p:nvPr/>
+      </p:nvGrpSpPr>
+      <p:grpSpPr>
+        <a:xfrm>
+          <a:off x="0" y="0"/>
+          <a:ext cx="0" cy="0"/>
+          <a:chOff x="0" y="0"/>
+          <a:chExt cx="0" cy="0"/>
+        </a:xfrm>
+      </p:grpSpPr>
+      <p:sp>
+        <p:nvSpPr>
+          <p:cNvPr id="2" name="Title 1">
+            <a:extLst>
+              <a:ext uri="{FF2B5EF4-FFF2-40B4-BE49-F238E27FC236}">
+                <a16:creationId xmlns:a16="http://schemas.microsoft.com/office/drawing/2014/main" id="{EC1F49AD-02A7-5B02-6F24-287D1A4249F1}"/>
+              </a:ext>
+            </a:extLst>
+          </p:cNvPr>
+          <p:cNvSpPr>
+            <a:spLocks noGrp="1"/>
+          </p:cNvSpPr>
+          <p:nvPr>
+            <p:ph type="title"/>
+          </p:nvPr>
+        </p:nvSpPr>
+        <p:spPr/>
+        <p:txBody>
+          <a:bodyPr/>
+          <a:lstStyle/>
+          <a:p>
+            <a:r>
+              <a:rPr lang="en-US"/>
+              <a:t>3 particles parallel runs</a:t>
+            </a:r>
+          </a:p>
+        </p:txBody>
+      </p:sp>
+      <p:sp>
+        <p:nvSpPr>
+          <p:cNvPr id="6" name="TextBox 5">
+            <a:extLst>
+              <a:ext uri="{FF2B5EF4-FFF2-40B4-BE49-F238E27FC236}">
+                <a16:creationId xmlns:a16="http://schemas.microsoft.com/office/drawing/2014/main" id="{D44F3234-D939-D0E9-B2E1-DF08354E6E9B}"/>
+              </a:ext>
+            </a:extLst>
+          </p:cNvPr>
+          <p:cNvSpPr txBox="1"/>
+          <p:nvPr/>
+        </p:nvSpPr>
+        <p:spPr bwMode="auto">
+          <a:xfrm>
+            <a:off x="9048328" y="1919080"/>
+            <a:ext cx="2015413" cy="369332"/>
+          </a:xfrm>
+          <a:prstGeom prst="rect">
+            <a:avLst/>
+          </a:prstGeom>
+          <a:noFill/>
+        </p:spPr>
+        <p:txBody>
+          <a:bodyPr wrap="square" rtlCol="0">
+            <a:spAutoFit/>
+          </a:bodyPr>
+          <a:lstStyle/>
+          <a:p>
+            <a:pPr>
+              <a:defRPr/>
+            </a:pPr>
+            <a:r>
+              <a:rPr lang="en-US"/>
+              <a:t>Error</a:t>
+            </a:r>
+            <a:endParaRPr/>
+          </a:p>
+        </p:txBody>
+      </p:sp>
+      <p:sp>
+        <p:nvSpPr>
+          <p:cNvPr id="9" name="TextBox 8">
+            <a:extLst>
+              <a:ext uri="{FF2B5EF4-FFF2-40B4-BE49-F238E27FC236}">
+                <a16:creationId xmlns:a16="http://schemas.microsoft.com/office/drawing/2014/main" id="{ADCD49FA-E934-E8DA-1192-07119B8D031D}"/>
+              </a:ext>
+            </a:extLst>
+          </p:cNvPr>
+          <p:cNvSpPr txBox="1"/>
+          <p:nvPr/>
+        </p:nvSpPr>
+        <p:spPr bwMode="auto">
+          <a:xfrm>
+            <a:off x="2162207" y="1914397"/>
+            <a:ext cx="2015413" cy="369332"/>
+          </a:xfrm>
+          <a:prstGeom prst="rect">
+            <a:avLst/>
+          </a:prstGeom>
+          <a:noFill/>
+        </p:spPr>
+        <p:txBody>
+          <a:bodyPr wrap="square" rtlCol="0">
+            <a:spAutoFit/>
+          </a:bodyPr>
+          <a:lstStyle/>
+          <a:p>
+            <a:pPr>
+              <a:defRPr/>
+            </a:pPr>
+            <a:r>
+              <a:rPr lang="en-US"/>
+              <a:t>Loss (ELBO)</a:t>
+            </a:r>
+            <a:endParaRPr/>
+          </a:p>
+        </p:txBody>
+      </p:sp>
+      <p:sp>
+        <p:nvSpPr>
+          <p:cNvPr id="10" name="TextBox 9">
+            <a:extLst>
+              <a:ext uri="{FF2B5EF4-FFF2-40B4-BE49-F238E27FC236}">
+                <a16:creationId xmlns:a16="http://schemas.microsoft.com/office/drawing/2014/main" id="{A5F8E8A3-1F37-4C3E-8A63-63E7E8904C14}"/>
+              </a:ext>
+            </a:extLst>
+          </p:cNvPr>
+          <p:cNvSpPr txBox="1"/>
+          <p:nvPr/>
+        </p:nvSpPr>
+        <p:spPr bwMode="auto">
+          <a:xfrm>
+            <a:off x="4278438" y="-4207"/>
+            <a:ext cx="4122780" cy="369332"/>
+          </a:xfrm>
+          <a:prstGeom prst="rect">
+            <a:avLst/>
+          </a:prstGeom>
+          <a:noFill/>
+        </p:spPr>
+        <p:txBody>
+          <a:bodyPr wrap="square" rtlCol="0">
+            <a:spAutoFit/>
+          </a:bodyPr>
+          <a:lstStyle/>
+          <a:p>
+            <a:pPr>
+              <a:defRPr/>
+            </a:pPr>
+            <a:r>
+              <a:rPr lang="en-US"/>
+              <a:t>Tucson_renyiElbo_alpha0.2_lr 0.001</a:t>
+            </a:r>
+            <a:endParaRPr/>
+          </a:p>
+        </p:txBody>
+      </p:sp>
+      <p:pic>
+        <p:nvPicPr>
+          <p:cNvPr id="4" name="Picture 3" descr="Shape, square&#10;&#10;Description automatically generated">
+            <a:extLst>
+              <a:ext uri="{FF2B5EF4-FFF2-40B4-BE49-F238E27FC236}">
+                <a16:creationId xmlns:a16="http://schemas.microsoft.com/office/drawing/2014/main" id="{870177A8-C884-7DA2-74B1-7D51C687D707}"/>
+              </a:ext>
+            </a:extLst>
+          </p:cNvPr>
+          <p:cNvPicPr>
+            <a:picLocks noChangeAspect="1"/>
+          </p:cNvPicPr>
+          <p:nvPr/>
+        </p:nvPicPr>
+        <p:blipFill>
+          <a:blip r:embed="rId2">
+            <a:extLst>
+              <a:ext uri="{28A0092B-C50C-407E-A947-70E740481C1C}">
+                <a14:useLocalDpi xmlns:a14="http://schemas.microsoft.com/office/drawing/2010/main" val="0"/>
+              </a:ext>
+            </a:extLst>
+          </a:blip>
+          <a:stretch>
+            <a:fillRect/>
+          </a:stretch>
+        </p:blipFill>
+        <p:spPr>
+          <a:xfrm>
+            <a:off x="0" y="2275097"/>
+            <a:ext cx="5852172" cy="4389129"/>
+          </a:xfrm>
+          <a:prstGeom prst="rect">
+            <a:avLst/>
+          </a:prstGeom>
+        </p:spPr>
+      </p:pic>
+      <p:pic>
+        <p:nvPicPr>
+          <p:cNvPr id="11" name="Picture 10" descr="Chart, histogram&#10;&#10;Description automatically generated">
+            <a:extLst>
+              <a:ext uri="{FF2B5EF4-FFF2-40B4-BE49-F238E27FC236}">
+                <a16:creationId xmlns:a16="http://schemas.microsoft.com/office/drawing/2014/main" id="{952A2527-5600-AD50-1562-11D71613F4EC}"/>
+              </a:ext>
+            </a:extLst>
+          </p:cNvPr>
+          <p:cNvPicPr>
+            <a:picLocks noChangeAspect="1"/>
+          </p:cNvPicPr>
+          <p:nvPr/>
+        </p:nvPicPr>
+        <p:blipFill>
+          <a:blip r:embed="rId3">
+            <a:extLst>
+              <a:ext uri="{28A0092B-C50C-407E-A947-70E740481C1C}">
+                <a14:useLocalDpi xmlns:a14="http://schemas.microsoft.com/office/drawing/2010/main" val="0"/>
+              </a:ext>
+            </a:extLst>
+          </a:blip>
+          <a:stretch>
+            <a:fillRect/>
+          </a:stretch>
+        </p:blipFill>
+        <p:spPr>
+          <a:xfrm>
+            <a:off x="6339828" y="2283729"/>
+            <a:ext cx="5852172" cy="4389129"/>
+          </a:xfrm>
+          <a:prstGeom prst="rect">
+            <a:avLst/>
+          </a:prstGeom>
+        </p:spPr>
+      </p:pic>
+    </p:spTree>
+    <p:extLst>
+      <p:ext uri="{BB962C8B-B14F-4D97-AF65-F5344CB8AC3E}">
+        <p14:creationId xmlns:p14="http://schemas.microsoft.com/office/powerpoint/2010/main" val="4202475153"/>
+      </p:ext>
+    </p:extLst>
+  </p:cSld>
+  <p:clrMapOvr>
+    <a:masterClrMapping/>
+  </p:clrMapOvr>
+</p:sld>
+</file>
+
+<file path=ppt/slides/slide11.xml><?xml version="1.0" encoding="utf-8"?>
+<p:sld xmlns:a="http://schemas.openxmlformats.org/drawingml/2006/main" xmlns:r="http://schemas.openxmlformats.org/officeDocument/2006/relationships" xmlns:p="http://schemas.openxmlformats.org/presentationml/2006/main">
+  <p:cSld>
+    <p:spTree>
+      <p:nvGrpSpPr>
+        <p:cNvPr id="1" name=""/>
+        <p:cNvGrpSpPr/>
+        <p:nvPr/>
+      </p:nvGrpSpPr>
+      <p:grpSpPr>
+        <a:xfrm>
+          <a:off x="0" y="0"/>
+          <a:ext cx="0" cy="0"/>
+          <a:chOff x="0" y="0"/>
+          <a:chExt cx="0" cy="0"/>
+        </a:xfrm>
+      </p:grpSpPr>
+      <p:sp>
+        <p:nvSpPr>
+          <p:cNvPr id="2" name="Title 1">
+            <a:extLst>
+              <a:ext uri="{FF2B5EF4-FFF2-40B4-BE49-F238E27FC236}">
+                <a16:creationId xmlns:a16="http://schemas.microsoft.com/office/drawing/2014/main" id="{88D9B2CD-7845-0209-9E2A-4F457A2E0CE9}"/>
+              </a:ext>
+            </a:extLst>
+          </p:cNvPr>
+          <p:cNvSpPr>
+            <a:spLocks noGrp="1"/>
+          </p:cNvSpPr>
+          <p:nvPr>
+            <p:ph type="title"/>
+          </p:nvPr>
+        </p:nvSpPr>
+        <p:spPr>
+          <a:xfrm>
+            <a:off x="838200" y="231229"/>
+            <a:ext cx="10515600" cy="1325563"/>
+          </a:xfrm>
+        </p:spPr>
+        <p:txBody>
+          <a:bodyPr>
+            <a:normAutofit/>
+          </a:bodyPr>
+          <a:lstStyle/>
+          <a:p>
+            <a:r>
+              <a:rPr lang="en-US" sz="4000"/>
+              <a:t>Numeric Expectation vs Analytical Expectation</a:t>
+            </a:r>
+          </a:p>
+        </p:txBody>
+      </p:sp>
+      <p:pic>
+        <p:nvPicPr>
+          <p:cNvPr id="5" name="Picture 4" descr="Chart, line chart&#10;&#10;Description automatically generated">
+            <a:extLst>
+              <a:ext uri="{FF2B5EF4-FFF2-40B4-BE49-F238E27FC236}">
+                <a16:creationId xmlns:a16="http://schemas.microsoft.com/office/drawing/2014/main" id="{9C9FD4E7-1725-0CCB-92BF-8559864D9698}"/>
+              </a:ext>
+            </a:extLst>
+          </p:cNvPr>
+          <p:cNvPicPr>
+            <a:picLocks noChangeAspect="1"/>
+          </p:cNvPicPr>
+          <p:nvPr/>
+        </p:nvPicPr>
+        <p:blipFill rotWithShape="1">
+          <a:blip r:embed="rId2">
+            <a:extLst>
+              <a:ext uri="{28A0092B-C50C-407E-A947-70E740481C1C}">
+                <a14:useLocalDpi xmlns:a14="http://schemas.microsoft.com/office/drawing/2010/main" val="0"/>
+              </a:ext>
+            </a:extLst>
+          </a:blip>
+          <a:srcRect l="9247" t="6998" r="8657" b="5850"/>
+          <a:stretch/>
+        </p:blipFill>
+        <p:spPr>
+          <a:xfrm>
+            <a:off x="1091444" y="1417861"/>
+            <a:ext cx="10009112" cy="5440139"/>
+          </a:xfrm>
+          <a:prstGeom prst="rect">
+            <a:avLst/>
+          </a:prstGeom>
+        </p:spPr>
+      </p:pic>
+    </p:spTree>
+    <p:extLst>
+      <p:ext uri="{BB962C8B-B14F-4D97-AF65-F5344CB8AC3E}">
+        <p14:creationId xmlns:p14="http://schemas.microsoft.com/office/powerpoint/2010/main" val="2374254436"/>
+      </p:ext>
+    </p:extLst>
+  </p:cSld>
+  <p:clrMapOvr>
+    <a:masterClrMapping/>
+  </p:clrMapOvr>
+</p:sld>
+</file>
+
+<file path=ppt/slides/slide12.xml><?xml version="1.0" encoding="utf-8"?>
+<p:sld xmlns:a="http://schemas.openxmlformats.org/drawingml/2006/main" xmlns:r="http://schemas.openxmlformats.org/officeDocument/2006/relationships" xmlns:p="http://schemas.openxmlformats.org/presentationml/2006/main">
+  <p:cSld>
+    <p:spTree>
+      <p:nvGrpSpPr>
+        <p:cNvPr id="1" name=""/>
+        <p:cNvGrpSpPr/>
+        <p:nvPr/>
+      </p:nvGrpSpPr>
+      <p:grpSpPr>
+        <a:xfrm>
+          <a:off x="0" y="0"/>
+          <a:ext cx="0" cy="0"/>
+          <a:chOff x="0" y="0"/>
+          <a:chExt cx="0" cy="0"/>
+        </a:xfrm>
+      </p:grpSpPr>
+      <p:sp>
+        <p:nvSpPr>
+          <p:cNvPr id="2" name="Title 1">
+            <a:extLst>
+              <a:ext uri="{FF2B5EF4-FFF2-40B4-BE49-F238E27FC236}">
+                <a16:creationId xmlns:a16="http://schemas.microsoft.com/office/drawing/2014/main" id="{88D9B2CD-7845-0209-9E2A-4F457A2E0CE9}"/>
+              </a:ext>
+            </a:extLst>
+          </p:cNvPr>
+          <p:cNvSpPr>
+            <a:spLocks noGrp="1"/>
+          </p:cNvSpPr>
+          <p:nvPr>
+            <p:ph type="title"/>
+          </p:nvPr>
+        </p:nvSpPr>
+        <p:spPr>
+          <a:xfrm>
+            <a:off x="838200" y="231229"/>
+            <a:ext cx="10515600" cy="1325563"/>
+          </a:xfrm>
+        </p:spPr>
+        <p:txBody>
+          <a:bodyPr>
+            <a:normAutofit/>
+          </a:bodyPr>
+          <a:lstStyle/>
+          <a:p>
+            <a:r>
+              <a:rPr lang="en-US" sz="4000"/>
+              <a:t>Numeric Expectation vs Analytical Expectation</a:t>
+            </a:r>
+          </a:p>
+        </p:txBody>
+      </p:sp>
+      <p:pic>
+        <p:nvPicPr>
+          <p:cNvPr id="4" name="Picture 3" descr="Chart, line chart, histogram&#10;&#10;Description automatically generated">
+            <a:extLst>
+              <a:ext uri="{FF2B5EF4-FFF2-40B4-BE49-F238E27FC236}">
+                <a16:creationId xmlns:a16="http://schemas.microsoft.com/office/drawing/2014/main" id="{B17E2DFB-4FFA-2EAA-5E5A-C60750EE5AE1}"/>
+              </a:ext>
+            </a:extLst>
+          </p:cNvPr>
+          <p:cNvPicPr>
+            <a:picLocks noChangeAspect="1"/>
+          </p:cNvPicPr>
+          <p:nvPr/>
+        </p:nvPicPr>
+        <p:blipFill rotWithShape="1">
+          <a:blip r:embed="rId2">
+            <a:extLst>
+              <a:ext uri="{28A0092B-C50C-407E-A947-70E740481C1C}">
+                <a14:useLocalDpi xmlns:a14="http://schemas.microsoft.com/office/drawing/2010/main" val="0"/>
+              </a:ext>
+            </a:extLst>
+          </a:blip>
+          <a:srcRect l="9837" t="7317" r="8657" b="6164"/>
+          <a:stretch/>
+        </p:blipFill>
+        <p:spPr>
+          <a:xfrm>
+            <a:off x="1127448" y="1457399"/>
+            <a:ext cx="9937104" cy="5400601"/>
+          </a:xfrm>
+          <a:prstGeom prst="rect">
+            <a:avLst/>
+          </a:prstGeom>
+        </p:spPr>
+      </p:pic>
+    </p:spTree>
+    <p:extLst>
+      <p:ext uri="{BB962C8B-B14F-4D97-AF65-F5344CB8AC3E}">
+        <p14:creationId xmlns:p14="http://schemas.microsoft.com/office/powerpoint/2010/main" val="2941826585"/>
+      </p:ext>
+    </p:extLst>
+  </p:cSld>
+  <p:clrMapOvr>
+    <a:masterClrMapping/>
+  </p:clrMapOvr>
+</p:sld>
+</file>
+
+<file path=ppt/slides/slide13.xml><?xml version="1.0" encoding="utf-8"?>
+<p:sld xmlns:a="http://schemas.openxmlformats.org/drawingml/2006/main" xmlns:r="http://schemas.openxmlformats.org/officeDocument/2006/relationships" xmlns:p="http://schemas.openxmlformats.org/presentationml/2006/main">
+  <p:cSld>
+    <p:spTree>
+      <p:nvGrpSpPr>
+        <p:cNvPr id="1" name=""/>
+        <p:cNvGrpSpPr/>
+        <p:nvPr/>
+      </p:nvGrpSpPr>
+      <p:grpSpPr>
+        <a:xfrm>
+          <a:off x="0" y="0"/>
+          <a:ext cx="0" cy="0"/>
+          <a:chOff x="0" y="0"/>
+          <a:chExt cx="0" cy="0"/>
+        </a:xfrm>
+      </p:grpSpPr>
+      <p:sp>
+        <p:nvSpPr>
+          <p:cNvPr id="2" name="Title 1">
+            <a:extLst>
+              <a:ext uri="{FF2B5EF4-FFF2-40B4-BE49-F238E27FC236}">
+                <a16:creationId xmlns:a16="http://schemas.microsoft.com/office/drawing/2014/main" id="{88D9B2CD-7845-0209-9E2A-4F457A2E0CE9}"/>
+              </a:ext>
+            </a:extLst>
+          </p:cNvPr>
+          <p:cNvSpPr>
+            <a:spLocks noGrp="1"/>
+          </p:cNvSpPr>
+          <p:nvPr>
+            <p:ph type="title"/>
+          </p:nvPr>
+        </p:nvSpPr>
+        <p:spPr>
+          <a:xfrm>
+            <a:off x="838200" y="231229"/>
+            <a:ext cx="10515600" cy="1325563"/>
+          </a:xfrm>
+        </p:spPr>
+        <p:txBody>
+          <a:bodyPr>
+            <a:normAutofit/>
+          </a:bodyPr>
+          <a:lstStyle/>
+          <a:p>
+            <a:r>
+              <a:rPr lang="en-US" sz="4000"/>
+              <a:t>Numeric Expectation vs Analytical Expectation</a:t>
+            </a:r>
+          </a:p>
+        </p:txBody>
+      </p:sp>
+      <p:pic>
+        <p:nvPicPr>
+          <p:cNvPr id="5" name="Picture 4" descr="Chart, line chart&#10;&#10;Description automatically generated">
+            <a:extLst>
+              <a:ext uri="{FF2B5EF4-FFF2-40B4-BE49-F238E27FC236}">
+                <a16:creationId xmlns:a16="http://schemas.microsoft.com/office/drawing/2014/main" id="{FD513081-335F-71B6-DAD7-7A1DBD61E108}"/>
+              </a:ext>
+            </a:extLst>
+          </p:cNvPr>
+          <p:cNvPicPr>
+            <a:picLocks noChangeAspect="1"/>
+          </p:cNvPicPr>
+          <p:nvPr/>
+        </p:nvPicPr>
+        <p:blipFill rotWithShape="1">
+          <a:blip r:embed="rId2">
+            <a:extLst>
+              <a:ext uri="{28A0092B-C50C-407E-A947-70E740481C1C}">
+                <a14:useLocalDpi xmlns:a14="http://schemas.microsoft.com/office/drawing/2010/main" val="0"/>
+              </a:ext>
+            </a:extLst>
+          </a:blip>
+          <a:srcRect l="9837" t="7317" r="8657" b="6164"/>
+          <a:stretch/>
+        </p:blipFill>
+        <p:spPr>
+          <a:xfrm>
+            <a:off x="1127448" y="1457399"/>
+            <a:ext cx="9937104" cy="5400601"/>
+          </a:xfrm>
+          <a:prstGeom prst="rect">
+            <a:avLst/>
+          </a:prstGeom>
+        </p:spPr>
+      </p:pic>
+    </p:spTree>
+    <p:extLst>
+      <p:ext uri="{BB962C8B-B14F-4D97-AF65-F5344CB8AC3E}">
+        <p14:creationId xmlns:p14="http://schemas.microsoft.com/office/powerpoint/2010/main" val="3952482733"/>
+      </p:ext>
+    </p:extLst>
+  </p:cSld>
+  <p:clrMapOvr>
+    <a:masterClrMapping/>
+  </p:clrMapOvr>
+</p:sld>
+</file>
+
+<file path=ppt/slides/slide14.xml><?xml version="1.0" encoding="utf-8"?>
+<p:sld xmlns:a="http://schemas.openxmlformats.org/drawingml/2006/main" xmlns:r="http://schemas.openxmlformats.org/officeDocument/2006/relationships" xmlns:p="http://schemas.openxmlformats.org/presentationml/2006/main">
+  <p:cSld>
+    <p:spTree>
+      <p:nvGrpSpPr>
+        <p:cNvPr id="1" name=""/>
+        <p:cNvGrpSpPr/>
+        <p:nvPr/>
+      </p:nvGrpSpPr>
+      <p:grpSpPr>
+        <a:xfrm>
+          <a:off x="0" y="0"/>
+          <a:ext cx="0" cy="0"/>
+          <a:chOff x="0" y="0"/>
+          <a:chExt cx="0" cy="0"/>
+        </a:xfrm>
+      </p:grpSpPr>
+      <p:sp>
+        <p:nvSpPr>
+          <p:cNvPr id="2" name="Title 1">
+            <a:extLst>
+              <a:ext uri="{FF2B5EF4-FFF2-40B4-BE49-F238E27FC236}">
+                <a16:creationId xmlns:a16="http://schemas.microsoft.com/office/drawing/2014/main" id="{88D9B2CD-7845-0209-9E2A-4F457A2E0CE9}"/>
+              </a:ext>
+            </a:extLst>
+          </p:cNvPr>
+          <p:cNvSpPr>
+            <a:spLocks noGrp="1"/>
+          </p:cNvSpPr>
+          <p:nvPr>
+            <p:ph type="title"/>
+          </p:nvPr>
+        </p:nvSpPr>
+        <p:spPr>
+          <a:xfrm>
+            <a:off x="838200" y="231229"/>
+            <a:ext cx="10515600" cy="1325563"/>
+          </a:xfrm>
+        </p:spPr>
+        <p:txBody>
+          <a:bodyPr>
+            <a:normAutofit/>
+          </a:bodyPr>
+          <a:lstStyle/>
+          <a:p>
+            <a:r>
+              <a:rPr lang="en-US" sz="4000"/>
+              <a:t>Numeric Expectation vs Analytical Expectation</a:t>
+            </a:r>
+          </a:p>
+        </p:txBody>
+      </p:sp>
+      <p:pic>
+        <p:nvPicPr>
+          <p:cNvPr id="4" name="Picture 3" descr="Chart, line chart&#10;&#10;Description automatically generated">
+            <a:extLst>
+              <a:ext uri="{FF2B5EF4-FFF2-40B4-BE49-F238E27FC236}">
+                <a16:creationId xmlns:a16="http://schemas.microsoft.com/office/drawing/2014/main" id="{0E817C19-CF1F-E279-0E86-42F0020595CD}"/>
+              </a:ext>
+            </a:extLst>
+          </p:cNvPr>
+          <p:cNvPicPr>
+            <a:picLocks noChangeAspect="1"/>
+          </p:cNvPicPr>
+          <p:nvPr/>
+        </p:nvPicPr>
+        <p:blipFill rotWithShape="1">
+          <a:blip r:embed="rId2">
+            <a:extLst>
+              <a:ext uri="{28A0092B-C50C-407E-A947-70E740481C1C}">
+                <a14:useLocalDpi xmlns:a14="http://schemas.microsoft.com/office/drawing/2010/main" val="0"/>
+              </a:ext>
+            </a:extLst>
+          </a:blip>
+          <a:srcRect l="9247" t="7317" r="8066" b="6164"/>
+          <a:stretch/>
+        </p:blipFill>
+        <p:spPr>
+          <a:xfrm>
+            <a:off x="1055440" y="1457399"/>
+            <a:ext cx="10081120" cy="5400601"/>
+          </a:xfrm>
+          <a:prstGeom prst="rect">
+            <a:avLst/>
+          </a:prstGeom>
+        </p:spPr>
+      </p:pic>
+    </p:spTree>
+    <p:extLst>
+      <p:ext uri="{BB962C8B-B14F-4D97-AF65-F5344CB8AC3E}">
+        <p14:creationId xmlns:p14="http://schemas.microsoft.com/office/powerpoint/2010/main" val="3364748392"/>
+      </p:ext>
+    </p:extLst>
+  </p:cSld>
+  <p:clrMapOvr>
+    <a:masterClrMapping/>
+  </p:clrMapOvr>
+</p:sld>
+</file>
+
+<file path=ppt/slides/slide15.xml><?xml version="1.0" encoding="utf-8"?>
+<p:sld xmlns:a="http://schemas.openxmlformats.org/drawingml/2006/main" xmlns:r="http://schemas.openxmlformats.org/officeDocument/2006/relationships" xmlns:p="http://schemas.openxmlformats.org/presentationml/2006/main">
+  <p:cSld>
+    <p:spTree>
+      <p:nvGrpSpPr>
+        <p:cNvPr id="1" name=""/>
+        <p:cNvGrpSpPr/>
+        <p:nvPr/>
+      </p:nvGrpSpPr>
+      <p:grpSpPr>
+        <a:xfrm>
+          <a:off x="0" y="0"/>
+          <a:ext cx="0" cy="0"/>
+          <a:chOff x="0" y="0"/>
+          <a:chExt cx="0" cy="0"/>
+        </a:xfrm>
+      </p:grpSpPr>
+      <p:sp>
+        <p:nvSpPr>
+          <p:cNvPr id="2" name="Title 1">
+            <a:extLst>
+              <a:ext uri="{FF2B5EF4-FFF2-40B4-BE49-F238E27FC236}">
+                <a16:creationId xmlns:a16="http://schemas.microsoft.com/office/drawing/2014/main" id="{88D9B2CD-7845-0209-9E2A-4F457A2E0CE9}"/>
+              </a:ext>
+            </a:extLst>
+          </p:cNvPr>
+          <p:cNvSpPr>
+            <a:spLocks noGrp="1"/>
+          </p:cNvSpPr>
+          <p:nvPr>
+            <p:ph type="title"/>
+          </p:nvPr>
+        </p:nvSpPr>
+        <p:spPr>
+          <a:xfrm>
+            <a:off x="838200" y="231229"/>
+            <a:ext cx="10515600" cy="1325563"/>
+          </a:xfrm>
+        </p:spPr>
+        <p:txBody>
+          <a:bodyPr>
+            <a:normAutofit/>
+          </a:bodyPr>
+          <a:lstStyle/>
+          <a:p>
+            <a:r>
+              <a:rPr lang="en-US" sz="4000"/>
+              <a:t>Numeric Expectation vs Analytical Expectation</a:t>
+            </a:r>
+          </a:p>
+        </p:txBody>
+      </p:sp>
+      <p:pic>
+        <p:nvPicPr>
+          <p:cNvPr id="5" name="Picture 4" descr="Chart, line chart&#10;&#10;Description automatically generated">
+            <a:extLst>
+              <a:ext uri="{FF2B5EF4-FFF2-40B4-BE49-F238E27FC236}">
+                <a16:creationId xmlns:a16="http://schemas.microsoft.com/office/drawing/2014/main" id="{D37BE40B-FC42-2EF8-BDC0-288252013F2F}"/>
+              </a:ext>
+            </a:extLst>
+          </p:cNvPr>
+          <p:cNvPicPr>
+            <a:picLocks noChangeAspect="1"/>
+          </p:cNvPicPr>
+          <p:nvPr/>
+        </p:nvPicPr>
+        <p:blipFill rotWithShape="1">
+          <a:blip r:embed="rId2">
+            <a:extLst>
+              <a:ext uri="{28A0092B-C50C-407E-A947-70E740481C1C}">
+                <a14:useLocalDpi xmlns:a14="http://schemas.microsoft.com/office/drawing/2010/main" val="0"/>
+              </a:ext>
+            </a:extLst>
+          </a:blip>
+          <a:srcRect l="9247" t="7317" r="8066" b="6164"/>
+          <a:stretch/>
+        </p:blipFill>
+        <p:spPr>
+          <a:xfrm>
+            <a:off x="1055440" y="1457399"/>
+            <a:ext cx="10081120" cy="5400601"/>
+          </a:xfrm>
+          <a:prstGeom prst="rect">
+            <a:avLst/>
+          </a:prstGeom>
+        </p:spPr>
+      </p:pic>
+    </p:spTree>
+    <p:extLst>
+      <p:ext uri="{BB962C8B-B14F-4D97-AF65-F5344CB8AC3E}">
+        <p14:creationId xmlns:p14="http://schemas.microsoft.com/office/powerpoint/2010/main" val="1063443161"/>
+      </p:ext>
+    </p:extLst>
+  </p:cSld>
+  <p:clrMapOvr>
+    <a:masterClrMapping/>
+  </p:clrMapOvr>
+</p:sld>
+</file>
+
+<file path=ppt/slides/slide16.xml><?xml version="1.0" encoding="utf-8"?>
+<p:sld xmlns:a="http://schemas.openxmlformats.org/drawingml/2006/main" xmlns:r="http://schemas.openxmlformats.org/officeDocument/2006/relationships" xmlns:p="http://schemas.openxmlformats.org/presentationml/2006/main">
+  <p:cSld>
+    <p:spTree>
+      <p:nvGrpSpPr>
+        <p:cNvPr id="1" name=""/>
+        <p:cNvGrpSpPr/>
+        <p:nvPr/>
+      </p:nvGrpSpPr>
+      <p:grpSpPr>
+        <a:xfrm>
+          <a:off x="0" y="0"/>
+          <a:ext cx="0" cy="0"/>
+          <a:chOff x="0" y="0"/>
+          <a:chExt cx="0" cy="0"/>
+        </a:xfrm>
+      </p:grpSpPr>
+      <p:sp>
+        <p:nvSpPr>
+          <p:cNvPr id="2" name="Title 1">
+            <a:extLst>
+              <a:ext uri="{FF2B5EF4-FFF2-40B4-BE49-F238E27FC236}">
+                <a16:creationId xmlns:a16="http://schemas.microsoft.com/office/drawing/2014/main" id="{88D9B2CD-7845-0209-9E2A-4F457A2E0CE9}"/>
+              </a:ext>
+            </a:extLst>
+          </p:cNvPr>
+          <p:cNvSpPr>
+            <a:spLocks noGrp="1"/>
+          </p:cNvSpPr>
+          <p:nvPr>
+            <p:ph type="title"/>
+          </p:nvPr>
+        </p:nvSpPr>
+        <p:spPr>
+          <a:xfrm>
+            <a:off x="838200" y="231229"/>
+            <a:ext cx="10515600" cy="1325563"/>
+          </a:xfrm>
+        </p:spPr>
+        <p:txBody>
+          <a:bodyPr>
+            <a:normAutofit/>
+          </a:bodyPr>
+          <a:lstStyle/>
+          <a:p>
+            <a:r>
+              <a:rPr lang="en-US" sz="4000"/>
+              <a:t>Numeric Expectation vs Analytical Expectation</a:t>
+            </a:r>
+          </a:p>
+        </p:txBody>
+      </p:sp>
+      <p:pic>
+        <p:nvPicPr>
+          <p:cNvPr id="4" name="Picture 3" descr="Chart, line chart&#10;&#10;Description automatically generated">
+            <a:extLst>
+              <a:ext uri="{FF2B5EF4-FFF2-40B4-BE49-F238E27FC236}">
+                <a16:creationId xmlns:a16="http://schemas.microsoft.com/office/drawing/2014/main" id="{6B859586-2173-6AF6-C11F-841F498AA8B8}"/>
+              </a:ext>
+            </a:extLst>
+          </p:cNvPr>
+          <p:cNvPicPr>
+            <a:picLocks noChangeAspect="1"/>
+          </p:cNvPicPr>
+          <p:nvPr/>
+        </p:nvPicPr>
+        <p:blipFill rotWithShape="1">
+          <a:blip r:embed="rId2">
+            <a:extLst>
+              <a:ext uri="{28A0092B-C50C-407E-A947-70E740481C1C}">
+                <a14:useLocalDpi xmlns:a14="http://schemas.microsoft.com/office/drawing/2010/main" val="0"/>
+              </a:ext>
+            </a:extLst>
+          </a:blip>
+          <a:srcRect l="9837" t="7317" r="8657" b="6164"/>
+          <a:stretch/>
+        </p:blipFill>
+        <p:spPr>
+          <a:xfrm>
+            <a:off x="1127448" y="1458630"/>
+            <a:ext cx="9937104" cy="5400601"/>
+          </a:xfrm>
+          <a:prstGeom prst="rect">
+            <a:avLst/>
+          </a:prstGeom>
+        </p:spPr>
+      </p:pic>
+    </p:spTree>
+    <p:extLst>
+      <p:ext uri="{BB962C8B-B14F-4D97-AF65-F5344CB8AC3E}">
+        <p14:creationId xmlns:p14="http://schemas.microsoft.com/office/powerpoint/2010/main" val="3537655208"/>
+      </p:ext>
+    </p:extLst>
+  </p:cSld>
+  <p:clrMapOvr>
+    <a:masterClrMapping/>
+  </p:clrMapOvr>
+</p:sld>
+</file>
+
+<file path=ppt/slides/slide17.xml><?xml version="1.0" encoding="utf-8"?>
+<p:sld xmlns:a="http://schemas.openxmlformats.org/drawingml/2006/main" xmlns:r="http://schemas.openxmlformats.org/officeDocument/2006/relationships" xmlns:p="http://schemas.openxmlformats.org/presentationml/2006/main">
+  <p:cSld>
+    <p:spTree>
+      <p:nvGrpSpPr>
+        <p:cNvPr id="1" name=""/>
+        <p:cNvGrpSpPr/>
+        <p:nvPr/>
+      </p:nvGrpSpPr>
+      <p:grpSpPr>
+        <a:xfrm>
+          <a:off x="0" y="0"/>
+          <a:ext cx="0" cy="0"/>
+          <a:chOff x="0" y="0"/>
+          <a:chExt cx="0" cy="0"/>
+        </a:xfrm>
+      </p:grpSpPr>
+      <p:sp>
+        <p:nvSpPr>
+          <p:cNvPr id="2" name="Title 1">
+            <a:extLst>
+              <a:ext uri="{FF2B5EF4-FFF2-40B4-BE49-F238E27FC236}">
+                <a16:creationId xmlns:a16="http://schemas.microsoft.com/office/drawing/2014/main" id="{88D9B2CD-7845-0209-9E2A-4F457A2E0CE9}"/>
+              </a:ext>
+            </a:extLst>
+          </p:cNvPr>
+          <p:cNvSpPr>
+            <a:spLocks noGrp="1"/>
+          </p:cNvSpPr>
+          <p:nvPr>
+            <p:ph type="title"/>
+          </p:nvPr>
+        </p:nvSpPr>
+        <p:spPr>
+          <a:xfrm>
+            <a:off x="838200" y="231229"/>
+            <a:ext cx="10515600" cy="1325563"/>
+          </a:xfrm>
+        </p:spPr>
+        <p:txBody>
+          <a:bodyPr>
+            <a:normAutofit/>
+          </a:bodyPr>
+          <a:lstStyle/>
+          <a:p>
+            <a:r>
+              <a:rPr lang="en-US" sz="4000"/>
+              <a:t>Numeric Expectation vs Analytical Expectation</a:t>
+            </a:r>
+          </a:p>
+        </p:txBody>
+      </p:sp>
+      <p:pic>
+        <p:nvPicPr>
+          <p:cNvPr id="5" name="Picture 4" descr="Chart, line chart&#10;&#10;Description automatically generated">
+            <a:extLst>
+              <a:ext uri="{FF2B5EF4-FFF2-40B4-BE49-F238E27FC236}">
+                <a16:creationId xmlns:a16="http://schemas.microsoft.com/office/drawing/2014/main" id="{D061351A-AE93-DECD-6EBF-2E3CAFAA8E28}"/>
+              </a:ext>
+            </a:extLst>
+          </p:cNvPr>
+          <p:cNvPicPr>
+            <a:picLocks noChangeAspect="1"/>
+          </p:cNvPicPr>
+          <p:nvPr/>
+        </p:nvPicPr>
+        <p:blipFill rotWithShape="1">
+          <a:blip r:embed="rId2">
+            <a:extLst>
+              <a:ext uri="{28A0092B-C50C-407E-A947-70E740481C1C}">
+                <a14:useLocalDpi xmlns:a14="http://schemas.microsoft.com/office/drawing/2010/main" val="0"/>
+              </a:ext>
+            </a:extLst>
+          </a:blip>
+          <a:srcRect l="9838" t="7317" r="8066" b="6164"/>
+          <a:stretch/>
+        </p:blipFill>
+        <p:spPr>
+          <a:xfrm>
+            <a:off x="1091444" y="1457399"/>
+            <a:ext cx="10009112" cy="5400601"/>
+          </a:xfrm>
+          <a:prstGeom prst="rect">
+            <a:avLst/>
+          </a:prstGeom>
+        </p:spPr>
+      </p:pic>
+    </p:spTree>
+    <p:extLst>
+      <p:ext uri="{BB962C8B-B14F-4D97-AF65-F5344CB8AC3E}">
+        <p14:creationId xmlns:p14="http://schemas.microsoft.com/office/powerpoint/2010/main" val="2818768688"/>
+      </p:ext>
+    </p:extLst>
+  </p:cSld>
+  <p:clrMapOvr>
+    <a:masterClrMapping/>
+  </p:clrMapOvr>
+</p:sld>
+</file>
+
+<file path=ppt/slides/slide18.xml><?xml version="1.0" encoding="utf-8"?>
+<p:sld xmlns:a="http://schemas.openxmlformats.org/drawingml/2006/main" xmlns:r="http://schemas.openxmlformats.org/officeDocument/2006/relationships" xmlns:p="http://schemas.openxmlformats.org/presentationml/2006/main">
+  <p:cSld>
+    <p:spTree>
+      <p:nvGrpSpPr>
+        <p:cNvPr id="1" name=""/>
+        <p:cNvGrpSpPr/>
+        <p:nvPr/>
+      </p:nvGrpSpPr>
+      <p:grpSpPr>
+        <a:xfrm>
+          <a:off x="0" y="0"/>
+          <a:ext cx="0" cy="0"/>
+          <a:chOff x="0" y="0"/>
+          <a:chExt cx="0" cy="0"/>
+        </a:xfrm>
+      </p:grpSpPr>
+      <p:sp>
+        <p:nvSpPr>
+          <p:cNvPr id="2" name="Title 1">
+            <a:extLst>
+              <a:ext uri="{FF2B5EF4-FFF2-40B4-BE49-F238E27FC236}">
+                <a16:creationId xmlns:a16="http://schemas.microsoft.com/office/drawing/2014/main" id="{88D9B2CD-7845-0209-9E2A-4F457A2E0CE9}"/>
+              </a:ext>
+            </a:extLst>
+          </p:cNvPr>
+          <p:cNvSpPr>
+            <a:spLocks noGrp="1"/>
+          </p:cNvSpPr>
+          <p:nvPr>
+            <p:ph type="title"/>
+          </p:nvPr>
+        </p:nvSpPr>
+        <p:spPr>
+          <a:xfrm>
+            <a:off x="838200" y="231229"/>
+            <a:ext cx="10515600" cy="1325563"/>
+          </a:xfrm>
+        </p:spPr>
+        <p:txBody>
+          <a:bodyPr>
+            <a:normAutofit/>
+          </a:bodyPr>
+          <a:lstStyle/>
+          <a:p>
+            <a:r>
+              <a:rPr lang="en-US" sz="4000"/>
+              <a:t>Numeric Expectation vs Analytical Expectation</a:t>
+            </a:r>
+          </a:p>
+        </p:txBody>
+      </p:sp>
+      <p:pic>
+        <p:nvPicPr>
+          <p:cNvPr id="4" name="Picture 3" descr="Chart, line chart&#10;&#10;Description automatically generated">
+            <a:extLst>
+              <a:ext uri="{FF2B5EF4-FFF2-40B4-BE49-F238E27FC236}">
+                <a16:creationId xmlns:a16="http://schemas.microsoft.com/office/drawing/2014/main" id="{459B82F6-4397-70B6-CC2A-CECDC3E391CB}"/>
+              </a:ext>
+            </a:extLst>
+          </p:cNvPr>
+          <p:cNvPicPr>
+            <a:picLocks noChangeAspect="1"/>
+          </p:cNvPicPr>
+          <p:nvPr/>
+        </p:nvPicPr>
+        <p:blipFill rotWithShape="1">
+          <a:blip r:embed="rId2">
+            <a:extLst>
+              <a:ext uri="{28A0092B-C50C-407E-A947-70E740481C1C}">
+                <a14:useLocalDpi xmlns:a14="http://schemas.microsoft.com/office/drawing/2010/main" val="0"/>
+              </a:ext>
+            </a:extLst>
+          </a:blip>
+          <a:srcRect l="9247" t="6163" r="8066" b="6163"/>
+          <a:stretch/>
+        </p:blipFill>
+        <p:spPr>
+          <a:xfrm>
+            <a:off x="1055440" y="1385391"/>
+            <a:ext cx="10081120" cy="5472609"/>
+          </a:xfrm>
+          <a:prstGeom prst="rect">
+            <a:avLst/>
+          </a:prstGeom>
+        </p:spPr>
+      </p:pic>
+    </p:spTree>
+    <p:extLst>
+      <p:ext uri="{BB962C8B-B14F-4D97-AF65-F5344CB8AC3E}">
+        <p14:creationId xmlns:p14="http://schemas.microsoft.com/office/powerpoint/2010/main" val="1310359796"/>
+      </p:ext>
+    </p:extLst>
+  </p:cSld>
+  <p:clrMapOvr>
+    <a:masterClrMapping/>
+  </p:clrMapOvr>
+</p:sld>
+</file>
+
+<file path=ppt/slides/slide19.xml><?xml version="1.0" encoding="utf-8"?>
+<p:sld xmlns:a="http://schemas.openxmlformats.org/drawingml/2006/main" xmlns:r="http://schemas.openxmlformats.org/officeDocument/2006/relationships" xmlns:p="http://schemas.openxmlformats.org/presentationml/2006/main">
+  <p:cSld>
+    <p:spTree>
+      <p:nvGrpSpPr>
+        <p:cNvPr id="1" name=""/>
+        <p:cNvGrpSpPr/>
+        <p:nvPr/>
+      </p:nvGrpSpPr>
+      <p:grpSpPr>
+        <a:xfrm>
+          <a:off x="0" y="0"/>
+          <a:ext cx="0" cy="0"/>
+          <a:chOff x="0" y="0"/>
+          <a:chExt cx="0" cy="0"/>
+        </a:xfrm>
+      </p:grpSpPr>
+      <p:sp>
+        <p:nvSpPr>
+          <p:cNvPr id="2" name="Title 1">
+            <a:extLst>
+              <a:ext uri="{FF2B5EF4-FFF2-40B4-BE49-F238E27FC236}">
+                <a16:creationId xmlns:a16="http://schemas.microsoft.com/office/drawing/2014/main" id="{EC1F49AD-02A7-5B02-6F24-287D1A4249F1}"/>
+              </a:ext>
+            </a:extLst>
+          </p:cNvPr>
+          <p:cNvSpPr>
+            <a:spLocks noGrp="1"/>
+          </p:cNvSpPr>
+          <p:nvPr>
+            <p:ph type="title"/>
+          </p:nvPr>
+        </p:nvSpPr>
+        <p:spPr/>
+        <p:txBody>
+          <a:bodyPr/>
+          <a:lstStyle/>
+          <a:p>
+            <a:r>
+              <a:rPr lang="en-US"/>
+              <a:t>Samples of BetaBinomial</a:t>
+            </a:r>
+          </a:p>
+        </p:txBody>
+      </p:sp>
+      <p:sp>
+        <p:nvSpPr>
+          <p:cNvPr id="6" name="TextBox 5">
+            <a:extLst>
+              <a:ext uri="{FF2B5EF4-FFF2-40B4-BE49-F238E27FC236}">
+                <a16:creationId xmlns:a16="http://schemas.microsoft.com/office/drawing/2014/main" id="{D44F3234-D939-D0E9-B2E1-DF08354E6E9B}"/>
+              </a:ext>
+            </a:extLst>
+          </p:cNvPr>
+          <p:cNvSpPr txBox="1"/>
+          <p:nvPr/>
+        </p:nvSpPr>
+        <p:spPr bwMode="auto">
+          <a:xfrm>
+            <a:off x="9048328" y="1919080"/>
+            <a:ext cx="2015413" cy="369332"/>
+          </a:xfrm>
+          <a:prstGeom prst="rect">
+            <a:avLst/>
+          </a:prstGeom>
+          <a:noFill/>
+        </p:spPr>
+        <p:txBody>
+          <a:bodyPr wrap="square" rtlCol="0">
+            <a:spAutoFit/>
+          </a:bodyPr>
+          <a:lstStyle/>
+          <a:p>
+            <a:pPr>
+              <a:defRPr/>
+            </a:pPr>
+            <a:r>
+              <a:rPr lang="en-US"/>
+              <a:t>Big individual</a:t>
+            </a:r>
+            <a:endParaRPr/>
+          </a:p>
+        </p:txBody>
+      </p:sp>
+      <p:sp>
+        <p:nvSpPr>
+          <p:cNvPr id="9" name="TextBox 8">
+            <a:extLst>
+              <a:ext uri="{FF2B5EF4-FFF2-40B4-BE49-F238E27FC236}">
+                <a16:creationId xmlns:a16="http://schemas.microsoft.com/office/drawing/2014/main" id="{ADCD49FA-E934-E8DA-1192-07119B8D031D}"/>
+              </a:ext>
+            </a:extLst>
+          </p:cNvPr>
+          <p:cNvSpPr txBox="1"/>
+          <p:nvPr/>
+        </p:nvSpPr>
+        <p:spPr bwMode="auto">
+          <a:xfrm>
+            <a:off x="2162207" y="1914397"/>
+            <a:ext cx="2015413" cy="369332"/>
+          </a:xfrm>
+          <a:prstGeom prst="rect">
+            <a:avLst/>
+          </a:prstGeom>
+          <a:noFill/>
+        </p:spPr>
+        <p:txBody>
+          <a:bodyPr wrap="square" rtlCol="0">
+            <a:spAutoFit/>
+          </a:bodyPr>
+          <a:lstStyle/>
+          <a:p>
+            <a:pPr>
+              <a:defRPr/>
+            </a:pPr>
+            <a:r>
+              <a:rPr lang="en-US"/>
+              <a:t>Small individual</a:t>
+            </a:r>
+            <a:endParaRPr/>
+          </a:p>
+        </p:txBody>
+      </p:sp>
+      <p:sp>
+        <p:nvSpPr>
+          <p:cNvPr id="10" name="TextBox 9">
+            <a:extLst>
+              <a:ext uri="{FF2B5EF4-FFF2-40B4-BE49-F238E27FC236}">
+                <a16:creationId xmlns:a16="http://schemas.microsoft.com/office/drawing/2014/main" id="{A5F8E8A3-1F37-4C3E-8A63-63E7E8904C14}"/>
+              </a:ext>
+            </a:extLst>
+          </p:cNvPr>
+          <p:cNvSpPr txBox="1"/>
+          <p:nvPr/>
+        </p:nvSpPr>
+        <p:spPr bwMode="auto">
+          <a:xfrm>
+            <a:off x="4278438" y="-4207"/>
+            <a:ext cx="4122780" cy="369332"/>
+          </a:xfrm>
+          <a:prstGeom prst="rect">
+            <a:avLst/>
+          </a:prstGeom>
+          <a:noFill/>
+        </p:spPr>
+        <p:txBody>
+          <a:bodyPr wrap="square" rtlCol="0">
+            <a:spAutoFit/>
+          </a:bodyPr>
+          <a:lstStyle/>
+          <a:p>
+            <a:pPr>
+              <a:defRPr/>
+            </a:pPr>
+            <a:r>
+              <a:rPr lang="en-US"/>
+              <a:t>Tucson_renyiElbo_alpha0.2_lr 0.001</a:t>
+            </a:r>
+            <a:endParaRPr/>
+          </a:p>
+        </p:txBody>
+      </p:sp>
+      <p:pic>
+        <p:nvPicPr>
+          <p:cNvPr id="5" name="Picture 4" descr="Chart, bar chart&#10;&#10;Description automatically generated">
+            <a:extLst>
+              <a:ext uri="{FF2B5EF4-FFF2-40B4-BE49-F238E27FC236}">
+                <a16:creationId xmlns:a16="http://schemas.microsoft.com/office/drawing/2014/main" id="{1518C2F0-D609-C788-4DF5-0F7C2D00B604}"/>
+              </a:ext>
+            </a:extLst>
+          </p:cNvPr>
+          <p:cNvPicPr>
+            <a:picLocks noChangeAspect="1"/>
+          </p:cNvPicPr>
+          <p:nvPr/>
+        </p:nvPicPr>
+        <p:blipFill rotWithShape="1">
+          <a:blip r:embed="rId2" cstate="print">
+            <a:extLst>
+              <a:ext uri="{28A0092B-C50C-407E-A947-70E740481C1C}">
+                <a14:useLocalDpi xmlns:a14="http://schemas.microsoft.com/office/drawing/2010/main" val="0"/>
+              </a:ext>
+            </a:extLst>
+          </a:blip>
+          <a:srcRect l="9254" t="6998" r="8657" b="5850"/>
+          <a:stretch/>
+        </p:blipFill>
+        <p:spPr>
+          <a:xfrm>
+            <a:off x="1" y="2507439"/>
+            <a:ext cx="6096000" cy="3313558"/>
+          </a:xfrm>
+          <a:prstGeom prst="rect">
+            <a:avLst/>
+          </a:prstGeom>
+        </p:spPr>
+      </p:pic>
+      <p:pic>
+        <p:nvPicPr>
+          <p:cNvPr id="8" name="Picture 7" descr="Chart&#10;&#10;Description automatically generated">
+            <a:extLst>
+              <a:ext uri="{FF2B5EF4-FFF2-40B4-BE49-F238E27FC236}">
+                <a16:creationId xmlns:a16="http://schemas.microsoft.com/office/drawing/2014/main" id="{38760BF5-2283-0435-1DF3-978EB2939838}"/>
+              </a:ext>
+            </a:extLst>
+          </p:cNvPr>
+          <p:cNvPicPr>
+            <a:picLocks noChangeAspect="1"/>
+          </p:cNvPicPr>
+          <p:nvPr/>
+        </p:nvPicPr>
+        <p:blipFill rotWithShape="1">
+          <a:blip r:embed="rId3" cstate="print">
+            <a:extLst>
+              <a:ext uri="{28A0092B-C50C-407E-A947-70E740481C1C}">
+                <a14:useLocalDpi xmlns:a14="http://schemas.microsoft.com/office/drawing/2010/main" val="0"/>
+              </a:ext>
+            </a:extLst>
+          </a:blip>
+          <a:srcRect l="9254" t="8470" r="9254" b="6163"/>
+          <a:stretch/>
+        </p:blipFill>
+        <p:spPr>
+          <a:xfrm>
+            <a:off x="6013669" y="2507438"/>
+            <a:ext cx="6178331" cy="3313558"/>
+          </a:xfrm>
+          <a:prstGeom prst="rect">
+            <a:avLst/>
+          </a:prstGeom>
+        </p:spPr>
+      </p:pic>
+    </p:spTree>
+    <p:extLst>
+      <p:ext uri="{BB962C8B-B14F-4D97-AF65-F5344CB8AC3E}">
+        <p14:creationId xmlns:p14="http://schemas.microsoft.com/office/powerpoint/2010/main" val="2172394252"/>
+      </p:ext>
+    </p:extLst>
+  </p:cSld>
+  <p:clrMapOvr>
+    <a:masterClrMapping/>
+  </p:clrMapOvr>
+</p:sld>
+</file>
+
 <file path=ppt/slides/slide2.xml><?xml version="1.0" encoding="utf-8"?>
 <p:sld xmlns:a="http://schemas.openxmlformats.org/drawingml/2006/main" xmlns:r="http://schemas.openxmlformats.org/officeDocument/2006/relationships" xmlns:p="http://schemas.openxmlformats.org/presentationml/2006/main" showMasterPhAnim="0">
   <p:cSld>
@@ -3455,6 +4762,745 @@
         </p:spPr>
       </p:pic>
     </p:spTree>
+  </p:cSld>
+  <p:clrMapOvr>
+    <a:masterClrMapping/>
+  </p:clrMapOvr>
+</p:sld>
+</file>
+
+<file path=ppt/slides/slide20.xml><?xml version="1.0" encoding="utf-8"?>
+<p:sld xmlns:a="http://schemas.openxmlformats.org/drawingml/2006/main" xmlns:r="http://schemas.openxmlformats.org/officeDocument/2006/relationships" xmlns:p="http://schemas.openxmlformats.org/presentationml/2006/main">
+  <p:cSld>
+    <p:spTree>
+      <p:nvGrpSpPr>
+        <p:cNvPr id="1" name=""/>
+        <p:cNvGrpSpPr/>
+        <p:nvPr/>
+      </p:nvGrpSpPr>
+      <p:grpSpPr>
+        <a:xfrm>
+          <a:off x="0" y="0"/>
+          <a:ext cx="0" cy="0"/>
+          <a:chOff x="0" y="0"/>
+          <a:chExt cx="0" cy="0"/>
+        </a:xfrm>
+      </p:grpSpPr>
+      <p:sp>
+        <p:nvSpPr>
+          <p:cNvPr id="2" name="Title 1">
+            <a:extLst>
+              <a:ext uri="{FF2B5EF4-FFF2-40B4-BE49-F238E27FC236}">
+                <a16:creationId xmlns:a16="http://schemas.microsoft.com/office/drawing/2014/main" id="{EC1F49AD-02A7-5B02-6F24-287D1A4249F1}"/>
+              </a:ext>
+            </a:extLst>
+          </p:cNvPr>
+          <p:cNvSpPr>
+            <a:spLocks noGrp="1"/>
+          </p:cNvSpPr>
+          <p:nvPr>
+            <p:ph type="title"/>
+          </p:nvPr>
+        </p:nvSpPr>
+        <p:spPr/>
+        <p:txBody>
+          <a:bodyPr/>
+          <a:lstStyle/>
+          <a:p>
+            <a:r>
+              <a:rPr lang="en-US"/>
+              <a:t>Big individual</a:t>
+            </a:r>
+          </a:p>
+        </p:txBody>
+      </p:sp>
+      <p:sp>
+        <p:nvSpPr>
+          <p:cNvPr id="6" name="TextBox 5">
+            <a:extLst>
+              <a:ext uri="{FF2B5EF4-FFF2-40B4-BE49-F238E27FC236}">
+                <a16:creationId xmlns:a16="http://schemas.microsoft.com/office/drawing/2014/main" id="{D44F3234-D939-D0E9-B2E1-DF08354E6E9B}"/>
+              </a:ext>
+            </a:extLst>
+          </p:cNvPr>
+          <p:cNvSpPr txBox="1"/>
+          <p:nvPr/>
+        </p:nvSpPr>
+        <p:spPr bwMode="auto">
+          <a:xfrm>
+            <a:off x="9048328" y="1919080"/>
+            <a:ext cx="2015413" cy="369332"/>
+          </a:xfrm>
+          <a:prstGeom prst="rect">
+            <a:avLst/>
+          </a:prstGeom>
+          <a:noFill/>
+        </p:spPr>
+        <p:txBody>
+          <a:bodyPr wrap="square" rtlCol="0">
+            <a:spAutoFit/>
+          </a:bodyPr>
+          <a:lstStyle/>
+          <a:p>
+            <a:pPr>
+              <a:defRPr/>
+            </a:pPr>
+            <a:r>
+              <a:rPr lang="en-US"/>
+              <a:t>Error</a:t>
+            </a:r>
+            <a:endParaRPr/>
+          </a:p>
+        </p:txBody>
+      </p:sp>
+      <p:sp>
+        <p:nvSpPr>
+          <p:cNvPr id="9" name="TextBox 8">
+            <a:extLst>
+              <a:ext uri="{FF2B5EF4-FFF2-40B4-BE49-F238E27FC236}">
+                <a16:creationId xmlns:a16="http://schemas.microsoft.com/office/drawing/2014/main" id="{ADCD49FA-E934-E8DA-1192-07119B8D031D}"/>
+              </a:ext>
+            </a:extLst>
+          </p:cNvPr>
+          <p:cNvSpPr txBox="1"/>
+          <p:nvPr/>
+        </p:nvSpPr>
+        <p:spPr bwMode="auto">
+          <a:xfrm>
+            <a:off x="2162207" y="1914397"/>
+            <a:ext cx="2015413" cy="369332"/>
+          </a:xfrm>
+          <a:prstGeom prst="rect">
+            <a:avLst/>
+          </a:prstGeom>
+          <a:noFill/>
+        </p:spPr>
+        <p:txBody>
+          <a:bodyPr wrap="square" rtlCol="0">
+            <a:spAutoFit/>
+          </a:bodyPr>
+          <a:lstStyle/>
+          <a:p>
+            <a:pPr>
+              <a:defRPr/>
+            </a:pPr>
+            <a:r>
+              <a:rPr lang="en-US"/>
+              <a:t>Loss (ELBO)</a:t>
+            </a:r>
+            <a:endParaRPr/>
+          </a:p>
+        </p:txBody>
+      </p:sp>
+      <p:sp>
+        <p:nvSpPr>
+          <p:cNvPr id="10" name="TextBox 9">
+            <a:extLst>
+              <a:ext uri="{FF2B5EF4-FFF2-40B4-BE49-F238E27FC236}">
+                <a16:creationId xmlns:a16="http://schemas.microsoft.com/office/drawing/2014/main" id="{A5F8E8A3-1F37-4C3E-8A63-63E7E8904C14}"/>
+              </a:ext>
+            </a:extLst>
+          </p:cNvPr>
+          <p:cNvSpPr txBox="1"/>
+          <p:nvPr/>
+        </p:nvSpPr>
+        <p:spPr bwMode="auto">
+          <a:xfrm>
+            <a:off x="3769401" y="-4207"/>
+            <a:ext cx="4653197" cy="369332"/>
+          </a:xfrm>
+          <a:prstGeom prst="rect">
+            <a:avLst/>
+          </a:prstGeom>
+          <a:noFill/>
+        </p:spPr>
+        <p:txBody>
+          <a:bodyPr wrap="square" rtlCol="0">
+            <a:spAutoFit/>
+          </a:bodyPr>
+          <a:lstStyle/>
+          <a:p>
+            <a:pPr>
+              <a:defRPr/>
+            </a:pPr>
+            <a:r>
+              <a:rPr lang="en-US"/>
+              <a:t>Tucson_renyiElbo_alpha0.2_lr 0.001_3particles</a:t>
+            </a:r>
+            <a:endParaRPr/>
+          </a:p>
+        </p:txBody>
+      </p:sp>
+      <p:pic>
+        <p:nvPicPr>
+          <p:cNvPr id="5" name="Picture 4" descr="Chart, histogram&#10;&#10;Description automatically generated">
+            <a:extLst>
+              <a:ext uri="{FF2B5EF4-FFF2-40B4-BE49-F238E27FC236}">
+                <a16:creationId xmlns:a16="http://schemas.microsoft.com/office/drawing/2014/main" id="{44B908DC-A002-968A-8FE4-3EDA114CB6E1}"/>
+              </a:ext>
+            </a:extLst>
+          </p:cNvPr>
+          <p:cNvPicPr>
+            <a:picLocks noChangeAspect="1"/>
+          </p:cNvPicPr>
+          <p:nvPr/>
+        </p:nvPicPr>
+        <p:blipFill>
+          <a:blip r:embed="rId2">
+            <a:extLst>
+              <a:ext uri="{28A0092B-C50C-407E-A947-70E740481C1C}">
+                <a14:useLocalDpi xmlns:a14="http://schemas.microsoft.com/office/drawing/2010/main" val="0"/>
+              </a:ext>
+            </a:extLst>
+          </a:blip>
+          <a:stretch>
+            <a:fillRect/>
+          </a:stretch>
+        </p:blipFill>
+        <p:spPr>
+          <a:xfrm>
+            <a:off x="6339827" y="2204864"/>
+            <a:ext cx="5852172" cy="4389129"/>
+          </a:xfrm>
+          <a:prstGeom prst="rect">
+            <a:avLst/>
+          </a:prstGeom>
+        </p:spPr>
+      </p:pic>
+      <p:pic>
+        <p:nvPicPr>
+          <p:cNvPr id="8" name="Picture 7" descr="Chart, histogram&#10;&#10;Description automatically generated">
+            <a:extLst>
+              <a:ext uri="{FF2B5EF4-FFF2-40B4-BE49-F238E27FC236}">
+                <a16:creationId xmlns:a16="http://schemas.microsoft.com/office/drawing/2014/main" id="{18C32AC4-6B2C-AD53-9382-C33861782D9B}"/>
+              </a:ext>
+            </a:extLst>
+          </p:cNvPr>
+          <p:cNvPicPr>
+            <a:picLocks noChangeAspect="1"/>
+          </p:cNvPicPr>
+          <p:nvPr/>
+        </p:nvPicPr>
+        <p:blipFill>
+          <a:blip r:embed="rId3">
+            <a:extLst>
+              <a:ext uri="{28A0092B-C50C-407E-A947-70E740481C1C}">
+                <a14:useLocalDpi xmlns:a14="http://schemas.microsoft.com/office/drawing/2010/main" val="0"/>
+              </a:ext>
+            </a:extLst>
+          </a:blip>
+          <a:stretch>
+            <a:fillRect/>
+          </a:stretch>
+        </p:blipFill>
+        <p:spPr>
+          <a:xfrm>
+            <a:off x="0" y="2283729"/>
+            <a:ext cx="5852172" cy="4389129"/>
+          </a:xfrm>
+          <a:prstGeom prst="rect">
+            <a:avLst/>
+          </a:prstGeom>
+        </p:spPr>
+      </p:pic>
+    </p:spTree>
+    <p:extLst>
+      <p:ext uri="{BB962C8B-B14F-4D97-AF65-F5344CB8AC3E}">
+        <p14:creationId xmlns:p14="http://schemas.microsoft.com/office/powerpoint/2010/main" val="1385596318"/>
+      </p:ext>
+    </p:extLst>
+  </p:cSld>
+  <p:clrMapOvr>
+    <a:masterClrMapping/>
+  </p:clrMapOvr>
+</p:sld>
+</file>
+
+<file path=ppt/slides/slide21.xml><?xml version="1.0" encoding="utf-8"?>
+<p:sld xmlns:a="http://schemas.openxmlformats.org/drawingml/2006/main" xmlns:r="http://schemas.openxmlformats.org/officeDocument/2006/relationships" xmlns:p="http://schemas.openxmlformats.org/presentationml/2006/main">
+  <p:cSld>
+    <p:spTree>
+      <p:nvGrpSpPr>
+        <p:cNvPr id="1" name=""/>
+        <p:cNvGrpSpPr/>
+        <p:nvPr/>
+      </p:nvGrpSpPr>
+      <p:grpSpPr>
+        <a:xfrm>
+          <a:off x="0" y="0"/>
+          <a:ext cx="0" cy="0"/>
+          <a:chOff x="0" y="0"/>
+          <a:chExt cx="0" cy="0"/>
+        </a:xfrm>
+      </p:grpSpPr>
+      <p:sp>
+        <p:nvSpPr>
+          <p:cNvPr id="2" name="Title 1">
+            <a:extLst>
+              <a:ext uri="{FF2B5EF4-FFF2-40B4-BE49-F238E27FC236}">
+                <a16:creationId xmlns:a16="http://schemas.microsoft.com/office/drawing/2014/main" id="{EC1F49AD-02A7-5B02-6F24-287D1A4249F1}"/>
+              </a:ext>
+            </a:extLst>
+          </p:cNvPr>
+          <p:cNvSpPr>
+            <a:spLocks noGrp="1"/>
+          </p:cNvSpPr>
+          <p:nvPr>
+            <p:ph type="title"/>
+          </p:nvPr>
+        </p:nvSpPr>
+        <p:spPr/>
+        <p:txBody>
+          <a:bodyPr/>
+          <a:lstStyle/>
+          <a:p>
+            <a:r>
+              <a:rPr lang="en-US"/>
+              <a:t>Small individual</a:t>
+            </a:r>
+          </a:p>
+        </p:txBody>
+      </p:sp>
+      <p:sp>
+        <p:nvSpPr>
+          <p:cNvPr id="6" name="TextBox 5">
+            <a:extLst>
+              <a:ext uri="{FF2B5EF4-FFF2-40B4-BE49-F238E27FC236}">
+                <a16:creationId xmlns:a16="http://schemas.microsoft.com/office/drawing/2014/main" id="{D44F3234-D939-D0E9-B2E1-DF08354E6E9B}"/>
+              </a:ext>
+            </a:extLst>
+          </p:cNvPr>
+          <p:cNvSpPr txBox="1"/>
+          <p:nvPr/>
+        </p:nvSpPr>
+        <p:spPr bwMode="auto">
+          <a:xfrm>
+            <a:off x="9048328" y="1919080"/>
+            <a:ext cx="2015413" cy="369332"/>
+          </a:xfrm>
+          <a:prstGeom prst="rect">
+            <a:avLst/>
+          </a:prstGeom>
+          <a:noFill/>
+        </p:spPr>
+        <p:txBody>
+          <a:bodyPr wrap="square" rtlCol="0">
+            <a:spAutoFit/>
+          </a:bodyPr>
+          <a:lstStyle/>
+          <a:p>
+            <a:pPr>
+              <a:defRPr/>
+            </a:pPr>
+            <a:r>
+              <a:rPr lang="en-US"/>
+              <a:t>Error</a:t>
+            </a:r>
+            <a:endParaRPr/>
+          </a:p>
+        </p:txBody>
+      </p:sp>
+      <p:sp>
+        <p:nvSpPr>
+          <p:cNvPr id="9" name="TextBox 8">
+            <a:extLst>
+              <a:ext uri="{FF2B5EF4-FFF2-40B4-BE49-F238E27FC236}">
+                <a16:creationId xmlns:a16="http://schemas.microsoft.com/office/drawing/2014/main" id="{ADCD49FA-E934-E8DA-1192-07119B8D031D}"/>
+              </a:ext>
+            </a:extLst>
+          </p:cNvPr>
+          <p:cNvSpPr txBox="1"/>
+          <p:nvPr/>
+        </p:nvSpPr>
+        <p:spPr bwMode="auto">
+          <a:xfrm>
+            <a:off x="2162207" y="1914397"/>
+            <a:ext cx="2015413" cy="369332"/>
+          </a:xfrm>
+          <a:prstGeom prst="rect">
+            <a:avLst/>
+          </a:prstGeom>
+          <a:noFill/>
+        </p:spPr>
+        <p:txBody>
+          <a:bodyPr wrap="square" rtlCol="0">
+            <a:spAutoFit/>
+          </a:bodyPr>
+          <a:lstStyle/>
+          <a:p>
+            <a:pPr>
+              <a:defRPr/>
+            </a:pPr>
+            <a:r>
+              <a:rPr lang="en-US"/>
+              <a:t>Loss (ELBO)</a:t>
+            </a:r>
+            <a:endParaRPr/>
+          </a:p>
+        </p:txBody>
+      </p:sp>
+      <p:sp>
+        <p:nvSpPr>
+          <p:cNvPr id="10" name="TextBox 9">
+            <a:extLst>
+              <a:ext uri="{FF2B5EF4-FFF2-40B4-BE49-F238E27FC236}">
+                <a16:creationId xmlns:a16="http://schemas.microsoft.com/office/drawing/2014/main" id="{A5F8E8A3-1F37-4C3E-8A63-63E7E8904C14}"/>
+              </a:ext>
+            </a:extLst>
+          </p:cNvPr>
+          <p:cNvSpPr txBox="1"/>
+          <p:nvPr/>
+        </p:nvSpPr>
+        <p:spPr bwMode="auto">
+          <a:xfrm>
+            <a:off x="3769401" y="476"/>
+            <a:ext cx="4653197" cy="369332"/>
+          </a:xfrm>
+          <a:prstGeom prst="rect">
+            <a:avLst/>
+          </a:prstGeom>
+          <a:noFill/>
+        </p:spPr>
+        <p:txBody>
+          <a:bodyPr wrap="square" rtlCol="0">
+            <a:spAutoFit/>
+          </a:bodyPr>
+          <a:lstStyle/>
+          <a:p>
+            <a:pPr>
+              <a:defRPr/>
+            </a:pPr>
+            <a:r>
+              <a:rPr lang="fr-FR"/>
+              <a:t>Tucson_renyiElbo_alpha0.2_lr 0.001_3particles</a:t>
+            </a:r>
+          </a:p>
+        </p:txBody>
+      </p:sp>
+      <p:pic>
+        <p:nvPicPr>
+          <p:cNvPr id="4" name="Picture 3" descr="Chart, histogram&#10;&#10;Description automatically generated">
+            <a:extLst>
+              <a:ext uri="{FF2B5EF4-FFF2-40B4-BE49-F238E27FC236}">
+                <a16:creationId xmlns:a16="http://schemas.microsoft.com/office/drawing/2014/main" id="{00ADD32A-5E82-A2DB-4182-895D28D6D918}"/>
+              </a:ext>
+            </a:extLst>
+          </p:cNvPr>
+          <p:cNvPicPr>
+            <a:picLocks noChangeAspect="1"/>
+          </p:cNvPicPr>
+          <p:nvPr/>
+        </p:nvPicPr>
+        <p:blipFill>
+          <a:blip r:embed="rId2">
+            <a:extLst>
+              <a:ext uri="{28A0092B-C50C-407E-A947-70E740481C1C}">
+                <a14:useLocalDpi xmlns:a14="http://schemas.microsoft.com/office/drawing/2010/main" val="0"/>
+              </a:ext>
+            </a:extLst>
+          </a:blip>
+          <a:stretch>
+            <a:fillRect/>
+          </a:stretch>
+        </p:blipFill>
+        <p:spPr>
+          <a:xfrm>
+            <a:off x="119336" y="2283729"/>
+            <a:ext cx="5852172" cy="4389129"/>
+          </a:xfrm>
+          <a:prstGeom prst="rect">
+            <a:avLst/>
+          </a:prstGeom>
+        </p:spPr>
+      </p:pic>
+      <p:pic>
+        <p:nvPicPr>
+          <p:cNvPr id="11" name="Picture 10" descr="Chart, histogram&#10;&#10;Description automatically generated">
+            <a:extLst>
+              <a:ext uri="{FF2B5EF4-FFF2-40B4-BE49-F238E27FC236}">
+                <a16:creationId xmlns:a16="http://schemas.microsoft.com/office/drawing/2014/main" id="{134374D2-0E56-FE9E-A301-BBDC79BC90B0}"/>
+              </a:ext>
+            </a:extLst>
+          </p:cNvPr>
+          <p:cNvPicPr>
+            <a:picLocks noChangeAspect="1"/>
+          </p:cNvPicPr>
+          <p:nvPr/>
+        </p:nvPicPr>
+        <p:blipFill>
+          <a:blip r:embed="rId3">
+            <a:extLst>
+              <a:ext uri="{28A0092B-C50C-407E-A947-70E740481C1C}">
+                <a14:useLocalDpi xmlns:a14="http://schemas.microsoft.com/office/drawing/2010/main" val="0"/>
+              </a:ext>
+            </a:extLst>
+          </a:blip>
+          <a:stretch>
+            <a:fillRect/>
+          </a:stretch>
+        </p:blipFill>
+        <p:spPr>
+          <a:xfrm>
+            <a:off x="6339828" y="2283729"/>
+            <a:ext cx="5852172" cy="4389129"/>
+          </a:xfrm>
+          <a:prstGeom prst="rect">
+            <a:avLst/>
+          </a:prstGeom>
+        </p:spPr>
+      </p:pic>
+    </p:spTree>
+    <p:extLst>
+      <p:ext uri="{BB962C8B-B14F-4D97-AF65-F5344CB8AC3E}">
+        <p14:creationId xmlns:p14="http://schemas.microsoft.com/office/powerpoint/2010/main" val="1136244900"/>
+      </p:ext>
+    </p:extLst>
+  </p:cSld>
+  <p:clrMapOvr>
+    <a:masterClrMapping/>
+  </p:clrMapOvr>
+</p:sld>
+</file>
+
+<file path=ppt/slides/slide22.xml><?xml version="1.0" encoding="utf-8"?>
+<p:sld xmlns:a="http://schemas.openxmlformats.org/drawingml/2006/main" xmlns:r="http://schemas.openxmlformats.org/officeDocument/2006/relationships" xmlns:p="http://schemas.openxmlformats.org/presentationml/2006/main">
+  <p:cSld>
+    <p:spTree>
+      <p:nvGrpSpPr>
+        <p:cNvPr id="1" name=""/>
+        <p:cNvGrpSpPr/>
+        <p:nvPr/>
+      </p:nvGrpSpPr>
+      <p:grpSpPr>
+        <a:xfrm>
+          <a:off x="0" y="0"/>
+          <a:ext cx="0" cy="0"/>
+          <a:chOff x="0" y="0"/>
+          <a:chExt cx="0" cy="0"/>
+        </a:xfrm>
+      </p:grpSpPr>
+      <p:sp>
+        <p:nvSpPr>
+          <p:cNvPr id="2" name="Title 1">
+            <a:extLst>
+              <a:ext uri="{FF2B5EF4-FFF2-40B4-BE49-F238E27FC236}">
+                <a16:creationId xmlns:a16="http://schemas.microsoft.com/office/drawing/2014/main" id="{EC1F49AD-02A7-5B02-6F24-287D1A4249F1}"/>
+              </a:ext>
+            </a:extLst>
+          </p:cNvPr>
+          <p:cNvSpPr>
+            <a:spLocks noGrp="1"/>
+          </p:cNvSpPr>
+          <p:nvPr>
+            <p:ph type="title"/>
+          </p:nvPr>
+        </p:nvSpPr>
+        <p:spPr/>
+        <p:txBody>
+          <a:bodyPr/>
+          <a:lstStyle/>
+          <a:p>
+            <a:r>
+              <a:rPr lang="en-US"/>
+              <a:t>Small individual</a:t>
+            </a:r>
+          </a:p>
+        </p:txBody>
+      </p:sp>
+      <p:sp>
+        <p:nvSpPr>
+          <p:cNvPr id="6" name="TextBox 5">
+            <a:extLst>
+              <a:ext uri="{FF2B5EF4-FFF2-40B4-BE49-F238E27FC236}">
+                <a16:creationId xmlns:a16="http://schemas.microsoft.com/office/drawing/2014/main" id="{D44F3234-D939-D0E9-B2E1-DF08354E6E9B}"/>
+              </a:ext>
+            </a:extLst>
+          </p:cNvPr>
+          <p:cNvSpPr txBox="1"/>
+          <p:nvPr/>
+        </p:nvSpPr>
+        <p:spPr bwMode="auto">
+          <a:xfrm>
+            <a:off x="9048328" y="1919080"/>
+            <a:ext cx="2015413" cy="369332"/>
+          </a:xfrm>
+          <a:prstGeom prst="rect">
+            <a:avLst/>
+          </a:prstGeom>
+          <a:noFill/>
+        </p:spPr>
+        <p:txBody>
+          <a:bodyPr wrap="square" rtlCol="0">
+            <a:spAutoFit/>
+          </a:bodyPr>
+          <a:lstStyle/>
+          <a:p>
+            <a:pPr>
+              <a:defRPr/>
+            </a:pPr>
+            <a:r>
+              <a:rPr lang="en-US"/>
+              <a:t>Error</a:t>
+            </a:r>
+            <a:endParaRPr/>
+          </a:p>
+        </p:txBody>
+      </p:sp>
+      <p:sp>
+        <p:nvSpPr>
+          <p:cNvPr id="9" name="TextBox 8">
+            <a:extLst>
+              <a:ext uri="{FF2B5EF4-FFF2-40B4-BE49-F238E27FC236}">
+                <a16:creationId xmlns:a16="http://schemas.microsoft.com/office/drawing/2014/main" id="{ADCD49FA-E934-E8DA-1192-07119B8D031D}"/>
+              </a:ext>
+            </a:extLst>
+          </p:cNvPr>
+          <p:cNvSpPr txBox="1"/>
+          <p:nvPr/>
+        </p:nvSpPr>
+        <p:spPr bwMode="auto">
+          <a:xfrm>
+            <a:off x="2162207" y="1914397"/>
+            <a:ext cx="2015413" cy="369332"/>
+          </a:xfrm>
+          <a:prstGeom prst="rect">
+            <a:avLst/>
+          </a:prstGeom>
+          <a:noFill/>
+        </p:spPr>
+        <p:txBody>
+          <a:bodyPr wrap="square" rtlCol="0">
+            <a:spAutoFit/>
+          </a:bodyPr>
+          <a:lstStyle/>
+          <a:p>
+            <a:pPr>
+              <a:defRPr/>
+            </a:pPr>
+            <a:r>
+              <a:rPr lang="en-US"/>
+              <a:t>Loss (ELBO)</a:t>
+            </a:r>
+            <a:endParaRPr/>
+          </a:p>
+        </p:txBody>
+      </p:sp>
+      <p:sp>
+        <p:nvSpPr>
+          <p:cNvPr id="10" name="TextBox 9">
+            <a:extLst>
+              <a:ext uri="{FF2B5EF4-FFF2-40B4-BE49-F238E27FC236}">
+                <a16:creationId xmlns:a16="http://schemas.microsoft.com/office/drawing/2014/main" id="{A5F8E8A3-1F37-4C3E-8A63-63E7E8904C14}"/>
+              </a:ext>
+            </a:extLst>
+          </p:cNvPr>
+          <p:cNvSpPr txBox="1"/>
+          <p:nvPr/>
+        </p:nvSpPr>
+        <p:spPr bwMode="auto">
+          <a:xfrm>
+            <a:off x="3769401" y="476"/>
+            <a:ext cx="4653197" cy="369332"/>
+          </a:xfrm>
+          <a:prstGeom prst="rect">
+            <a:avLst/>
+          </a:prstGeom>
+          <a:noFill/>
+        </p:spPr>
+        <p:txBody>
+          <a:bodyPr wrap="square" rtlCol="0">
+            <a:spAutoFit/>
+          </a:bodyPr>
+          <a:lstStyle/>
+          <a:p>
+            <a:pPr>
+              <a:defRPr/>
+            </a:pPr>
+            <a:r>
+              <a:rPr lang="fr-FR"/>
+              <a:t>Tucson_renyiElbo_alpha0.2_lr 0.001_5particles</a:t>
+            </a:r>
+          </a:p>
+        </p:txBody>
+      </p:sp>
+      <p:pic>
+        <p:nvPicPr>
+          <p:cNvPr id="5" name="Picture 4" descr="Chart, histogram&#10;&#10;Description automatically generated">
+            <a:extLst>
+              <a:ext uri="{FF2B5EF4-FFF2-40B4-BE49-F238E27FC236}">
+                <a16:creationId xmlns:a16="http://schemas.microsoft.com/office/drawing/2014/main" id="{C46363D5-96C2-990A-1B97-5FE63DF3DE80}"/>
+              </a:ext>
+            </a:extLst>
+          </p:cNvPr>
+          <p:cNvPicPr>
+            <a:picLocks noChangeAspect="1"/>
+          </p:cNvPicPr>
+          <p:nvPr/>
+        </p:nvPicPr>
+        <p:blipFill>
+          <a:blip r:embed="rId2">
+            <a:extLst>
+              <a:ext uri="{28A0092B-C50C-407E-A947-70E740481C1C}">
+                <a14:useLocalDpi xmlns:a14="http://schemas.microsoft.com/office/drawing/2010/main" val="0"/>
+              </a:ext>
+            </a:extLst>
+          </a:blip>
+          <a:stretch>
+            <a:fillRect/>
+          </a:stretch>
+        </p:blipFill>
+        <p:spPr>
+          <a:xfrm>
+            <a:off x="0" y="2283728"/>
+            <a:ext cx="5852172" cy="4389129"/>
+          </a:xfrm>
+          <a:prstGeom prst="rect">
+            <a:avLst/>
+          </a:prstGeom>
+        </p:spPr>
+      </p:pic>
+      <p:pic>
+        <p:nvPicPr>
+          <p:cNvPr id="8" name="Picture 7" descr="Chart, histogram&#10;&#10;Description automatically generated">
+            <a:extLst>
+              <a:ext uri="{FF2B5EF4-FFF2-40B4-BE49-F238E27FC236}">
+                <a16:creationId xmlns:a16="http://schemas.microsoft.com/office/drawing/2014/main" id="{41C87CA6-743E-625D-E7AF-C258AE1985FC}"/>
+              </a:ext>
+            </a:extLst>
+          </p:cNvPr>
+          <p:cNvPicPr>
+            <a:picLocks noChangeAspect="1"/>
+          </p:cNvPicPr>
+          <p:nvPr/>
+        </p:nvPicPr>
+        <p:blipFill>
+          <a:blip r:embed="rId3">
+            <a:extLst>
+              <a:ext uri="{28A0092B-C50C-407E-A947-70E740481C1C}">
+                <a14:useLocalDpi xmlns:a14="http://schemas.microsoft.com/office/drawing/2010/main" val="0"/>
+              </a:ext>
+            </a:extLst>
+          </a:blip>
+          <a:stretch>
+            <a:fillRect/>
+          </a:stretch>
+        </p:blipFill>
+        <p:spPr>
+          <a:xfrm>
+            <a:off x="6339827" y="2283728"/>
+            <a:ext cx="5852172" cy="4389129"/>
+          </a:xfrm>
+          <a:prstGeom prst="rect">
+            <a:avLst/>
+          </a:prstGeom>
+        </p:spPr>
+      </p:pic>
+    </p:spTree>
+    <p:extLst>
+      <p:ext uri="{BB962C8B-B14F-4D97-AF65-F5344CB8AC3E}">
+        <p14:creationId xmlns:p14="http://schemas.microsoft.com/office/powerpoint/2010/main" val="1181785641"/>
+      </p:ext>
+    </p:extLst>
   </p:cSld>
   <p:clrMapOvr>
     <a:masterClrMapping/>
@@ -4379,6 +6425,500 @@
     <p:extLst>
       <p:ext uri="{BB962C8B-B14F-4D97-AF65-F5344CB8AC3E}">
         <p14:creationId xmlns:p14="http://schemas.microsoft.com/office/powerpoint/2010/main" val="2844702733"/>
+      </p:ext>
+    </p:extLst>
+  </p:cSld>
+  <p:clrMapOvr>
+    <a:masterClrMapping/>
+  </p:clrMapOvr>
+</p:sld>
+</file>
+
+<file path=ppt/slides/slide8.xml><?xml version="1.0" encoding="utf-8"?>
+<p:sld xmlns:a="http://schemas.openxmlformats.org/drawingml/2006/main" xmlns:r="http://schemas.openxmlformats.org/officeDocument/2006/relationships" xmlns:p="http://schemas.openxmlformats.org/presentationml/2006/main">
+  <p:cSld>
+    <p:spTree>
+      <p:nvGrpSpPr>
+        <p:cNvPr id="1" name=""/>
+        <p:cNvGrpSpPr/>
+        <p:nvPr/>
+      </p:nvGrpSpPr>
+      <p:grpSpPr>
+        <a:xfrm>
+          <a:off x="0" y="0"/>
+          <a:ext cx="0" cy="0"/>
+          <a:chOff x="0" y="0"/>
+          <a:chExt cx="0" cy="0"/>
+        </a:xfrm>
+      </p:grpSpPr>
+      <p:sp>
+        <p:nvSpPr>
+          <p:cNvPr id="2" name="Title 1">
+            <a:extLst>
+              <a:ext uri="{FF2B5EF4-FFF2-40B4-BE49-F238E27FC236}">
+                <a16:creationId xmlns:a16="http://schemas.microsoft.com/office/drawing/2014/main" id="{EC1F49AD-02A7-5B02-6F24-287D1A4249F1}"/>
+              </a:ext>
+            </a:extLst>
+          </p:cNvPr>
+          <p:cNvSpPr>
+            <a:spLocks noGrp="1"/>
+          </p:cNvSpPr>
+          <p:nvPr>
+            <p:ph type="title"/>
+          </p:nvPr>
+        </p:nvSpPr>
+        <p:spPr/>
+        <p:txBody>
+          <a:bodyPr/>
+          <a:lstStyle/>
+          <a:p>
+            <a:r>
+              <a:rPr lang="en-US"/>
+              <a:t>1 particle parallel runs</a:t>
+            </a:r>
+          </a:p>
+        </p:txBody>
+      </p:sp>
+      <p:sp>
+        <p:nvSpPr>
+          <p:cNvPr id="6" name="TextBox 5">
+            <a:extLst>
+              <a:ext uri="{FF2B5EF4-FFF2-40B4-BE49-F238E27FC236}">
+                <a16:creationId xmlns:a16="http://schemas.microsoft.com/office/drawing/2014/main" id="{D44F3234-D939-D0E9-B2E1-DF08354E6E9B}"/>
+              </a:ext>
+            </a:extLst>
+          </p:cNvPr>
+          <p:cNvSpPr txBox="1"/>
+          <p:nvPr/>
+        </p:nvSpPr>
+        <p:spPr bwMode="auto">
+          <a:xfrm>
+            <a:off x="9048328" y="1919080"/>
+            <a:ext cx="2015413" cy="369332"/>
+          </a:xfrm>
+          <a:prstGeom prst="rect">
+            <a:avLst/>
+          </a:prstGeom>
+          <a:noFill/>
+        </p:spPr>
+        <p:txBody>
+          <a:bodyPr wrap="square" rtlCol="0">
+            <a:spAutoFit/>
+          </a:bodyPr>
+          <a:lstStyle/>
+          <a:p>
+            <a:pPr>
+              <a:defRPr/>
+            </a:pPr>
+            <a:r>
+              <a:rPr lang="en-US"/>
+              <a:t>Error</a:t>
+            </a:r>
+            <a:endParaRPr/>
+          </a:p>
+        </p:txBody>
+      </p:sp>
+      <p:sp>
+        <p:nvSpPr>
+          <p:cNvPr id="9" name="TextBox 8">
+            <a:extLst>
+              <a:ext uri="{FF2B5EF4-FFF2-40B4-BE49-F238E27FC236}">
+                <a16:creationId xmlns:a16="http://schemas.microsoft.com/office/drawing/2014/main" id="{ADCD49FA-E934-E8DA-1192-07119B8D031D}"/>
+              </a:ext>
+            </a:extLst>
+          </p:cNvPr>
+          <p:cNvSpPr txBox="1"/>
+          <p:nvPr/>
+        </p:nvSpPr>
+        <p:spPr bwMode="auto">
+          <a:xfrm>
+            <a:off x="2162207" y="1914397"/>
+            <a:ext cx="2015413" cy="369332"/>
+          </a:xfrm>
+          <a:prstGeom prst="rect">
+            <a:avLst/>
+          </a:prstGeom>
+          <a:noFill/>
+        </p:spPr>
+        <p:txBody>
+          <a:bodyPr wrap="square" rtlCol="0">
+            <a:spAutoFit/>
+          </a:bodyPr>
+          <a:lstStyle/>
+          <a:p>
+            <a:pPr>
+              <a:defRPr/>
+            </a:pPr>
+            <a:r>
+              <a:rPr lang="en-US"/>
+              <a:t>Loss (ELBO)</a:t>
+            </a:r>
+            <a:endParaRPr/>
+          </a:p>
+        </p:txBody>
+      </p:sp>
+      <p:sp>
+        <p:nvSpPr>
+          <p:cNvPr id="10" name="TextBox 9">
+            <a:extLst>
+              <a:ext uri="{FF2B5EF4-FFF2-40B4-BE49-F238E27FC236}">
+                <a16:creationId xmlns:a16="http://schemas.microsoft.com/office/drawing/2014/main" id="{A5F8E8A3-1F37-4C3E-8A63-63E7E8904C14}"/>
+              </a:ext>
+            </a:extLst>
+          </p:cNvPr>
+          <p:cNvSpPr txBox="1"/>
+          <p:nvPr/>
+        </p:nvSpPr>
+        <p:spPr bwMode="auto">
+          <a:xfrm>
+            <a:off x="4278438" y="-4207"/>
+            <a:ext cx="4122780" cy="369332"/>
+          </a:xfrm>
+          <a:prstGeom prst="rect">
+            <a:avLst/>
+          </a:prstGeom>
+          <a:noFill/>
+        </p:spPr>
+        <p:txBody>
+          <a:bodyPr wrap="square" rtlCol="0">
+            <a:spAutoFit/>
+          </a:bodyPr>
+          <a:lstStyle/>
+          <a:p>
+            <a:pPr>
+              <a:defRPr/>
+            </a:pPr>
+            <a:r>
+              <a:rPr lang="en-US"/>
+              <a:t>Tucson_renyiElbo_alpha0.2_lr 0.0008</a:t>
+            </a:r>
+            <a:endParaRPr/>
+          </a:p>
+        </p:txBody>
+      </p:sp>
+      <p:pic>
+        <p:nvPicPr>
+          <p:cNvPr id="12" name="Picture 11" descr="Chart, histogram&#10;&#10;Description automatically generated">
+            <a:extLst>
+              <a:ext uri="{FF2B5EF4-FFF2-40B4-BE49-F238E27FC236}">
+                <a16:creationId xmlns:a16="http://schemas.microsoft.com/office/drawing/2014/main" id="{88E90FA2-9A2D-2B28-0C75-D8A680DE1314}"/>
+              </a:ext>
+            </a:extLst>
+          </p:cNvPr>
+          <p:cNvPicPr>
+            <a:picLocks noChangeAspect="1"/>
+          </p:cNvPicPr>
+          <p:nvPr/>
+        </p:nvPicPr>
+        <p:blipFill>
+          <a:blip r:embed="rId2">
+            <a:extLst>
+              <a:ext uri="{28A0092B-C50C-407E-A947-70E740481C1C}">
+                <a14:useLocalDpi xmlns:a14="http://schemas.microsoft.com/office/drawing/2010/main" val="0"/>
+              </a:ext>
+            </a:extLst>
+          </a:blip>
+          <a:stretch>
+            <a:fillRect/>
+          </a:stretch>
+        </p:blipFill>
+        <p:spPr>
+          <a:xfrm>
+            <a:off x="6339828" y="2283729"/>
+            <a:ext cx="5852172" cy="4389129"/>
+          </a:xfrm>
+          <a:prstGeom prst="rect">
+            <a:avLst/>
+          </a:prstGeom>
+        </p:spPr>
+      </p:pic>
+      <p:pic>
+        <p:nvPicPr>
+          <p:cNvPr id="20" name="Picture 19" descr="Chart, histogram&#10;&#10;Description automatically generated">
+            <a:extLst>
+              <a:ext uri="{FF2B5EF4-FFF2-40B4-BE49-F238E27FC236}">
+                <a16:creationId xmlns:a16="http://schemas.microsoft.com/office/drawing/2014/main" id="{644B1AB3-3FF7-8C65-53A2-CF6D686290BE}"/>
+              </a:ext>
+            </a:extLst>
+          </p:cNvPr>
+          <p:cNvPicPr>
+            <a:picLocks noChangeAspect="1"/>
+          </p:cNvPicPr>
+          <p:nvPr/>
+        </p:nvPicPr>
+        <p:blipFill>
+          <a:blip r:embed="rId3">
+            <a:extLst>
+              <a:ext uri="{28A0092B-C50C-407E-A947-70E740481C1C}">
+                <a14:useLocalDpi xmlns:a14="http://schemas.microsoft.com/office/drawing/2010/main" val="0"/>
+              </a:ext>
+            </a:extLst>
+          </a:blip>
+          <a:stretch>
+            <a:fillRect/>
+          </a:stretch>
+        </p:blipFill>
+        <p:spPr>
+          <a:xfrm>
+            <a:off x="-3" y="2283728"/>
+            <a:ext cx="5852172" cy="4389129"/>
+          </a:xfrm>
+          <a:prstGeom prst="rect">
+            <a:avLst/>
+          </a:prstGeom>
+        </p:spPr>
+      </p:pic>
+    </p:spTree>
+    <p:extLst>
+      <p:ext uri="{BB962C8B-B14F-4D97-AF65-F5344CB8AC3E}">
+        <p14:creationId xmlns:p14="http://schemas.microsoft.com/office/powerpoint/2010/main" val="2149014364"/>
+      </p:ext>
+    </p:extLst>
+  </p:cSld>
+  <p:clrMapOvr>
+    <a:masterClrMapping/>
+  </p:clrMapOvr>
+</p:sld>
+</file>
+
+<file path=ppt/slides/slide9.xml><?xml version="1.0" encoding="utf-8"?>
+<p:sld xmlns:a="http://schemas.openxmlformats.org/drawingml/2006/main" xmlns:r="http://schemas.openxmlformats.org/officeDocument/2006/relationships" xmlns:p="http://schemas.openxmlformats.org/presentationml/2006/main">
+  <p:cSld>
+    <p:spTree>
+      <p:nvGrpSpPr>
+        <p:cNvPr id="1" name=""/>
+        <p:cNvGrpSpPr/>
+        <p:nvPr/>
+      </p:nvGrpSpPr>
+      <p:grpSpPr>
+        <a:xfrm>
+          <a:off x="0" y="0"/>
+          <a:ext cx="0" cy="0"/>
+          <a:chOff x="0" y="0"/>
+          <a:chExt cx="0" cy="0"/>
+        </a:xfrm>
+      </p:grpSpPr>
+      <p:sp>
+        <p:nvSpPr>
+          <p:cNvPr id="2" name="Title 1">
+            <a:extLst>
+              <a:ext uri="{FF2B5EF4-FFF2-40B4-BE49-F238E27FC236}">
+                <a16:creationId xmlns:a16="http://schemas.microsoft.com/office/drawing/2014/main" id="{EC1F49AD-02A7-5B02-6F24-287D1A4249F1}"/>
+              </a:ext>
+            </a:extLst>
+          </p:cNvPr>
+          <p:cNvSpPr>
+            <a:spLocks noGrp="1"/>
+          </p:cNvSpPr>
+          <p:nvPr>
+            <p:ph type="title"/>
+          </p:nvPr>
+        </p:nvSpPr>
+        <p:spPr/>
+        <p:txBody>
+          <a:bodyPr/>
+          <a:lstStyle/>
+          <a:p>
+            <a:r>
+              <a:rPr lang="en-US"/>
+              <a:t>1 particle parallel runs</a:t>
+            </a:r>
+          </a:p>
+        </p:txBody>
+      </p:sp>
+      <p:sp>
+        <p:nvSpPr>
+          <p:cNvPr id="6" name="TextBox 5">
+            <a:extLst>
+              <a:ext uri="{FF2B5EF4-FFF2-40B4-BE49-F238E27FC236}">
+                <a16:creationId xmlns:a16="http://schemas.microsoft.com/office/drawing/2014/main" id="{D44F3234-D939-D0E9-B2E1-DF08354E6E9B}"/>
+              </a:ext>
+            </a:extLst>
+          </p:cNvPr>
+          <p:cNvSpPr txBox="1"/>
+          <p:nvPr/>
+        </p:nvSpPr>
+        <p:spPr bwMode="auto">
+          <a:xfrm>
+            <a:off x="9048328" y="1919080"/>
+            <a:ext cx="2015413" cy="369332"/>
+          </a:xfrm>
+          <a:prstGeom prst="rect">
+            <a:avLst/>
+          </a:prstGeom>
+          <a:noFill/>
+        </p:spPr>
+        <p:txBody>
+          <a:bodyPr wrap="square" rtlCol="0">
+            <a:spAutoFit/>
+          </a:bodyPr>
+          <a:lstStyle/>
+          <a:p>
+            <a:pPr>
+              <a:defRPr/>
+            </a:pPr>
+            <a:r>
+              <a:rPr lang="en-US"/>
+              <a:t>Error</a:t>
+            </a:r>
+            <a:endParaRPr/>
+          </a:p>
+        </p:txBody>
+      </p:sp>
+      <p:sp>
+        <p:nvSpPr>
+          <p:cNvPr id="9" name="TextBox 8">
+            <a:extLst>
+              <a:ext uri="{FF2B5EF4-FFF2-40B4-BE49-F238E27FC236}">
+                <a16:creationId xmlns:a16="http://schemas.microsoft.com/office/drawing/2014/main" id="{ADCD49FA-E934-E8DA-1192-07119B8D031D}"/>
+              </a:ext>
+            </a:extLst>
+          </p:cNvPr>
+          <p:cNvSpPr txBox="1"/>
+          <p:nvPr/>
+        </p:nvSpPr>
+        <p:spPr bwMode="auto">
+          <a:xfrm>
+            <a:off x="2162207" y="1914397"/>
+            <a:ext cx="2015413" cy="369332"/>
+          </a:xfrm>
+          <a:prstGeom prst="rect">
+            <a:avLst/>
+          </a:prstGeom>
+          <a:noFill/>
+        </p:spPr>
+        <p:txBody>
+          <a:bodyPr wrap="square" rtlCol="0">
+            <a:spAutoFit/>
+          </a:bodyPr>
+          <a:lstStyle/>
+          <a:p>
+            <a:pPr>
+              <a:defRPr/>
+            </a:pPr>
+            <a:r>
+              <a:rPr lang="en-US"/>
+              <a:t>Loss (ELBO)</a:t>
+            </a:r>
+            <a:endParaRPr/>
+          </a:p>
+        </p:txBody>
+      </p:sp>
+      <p:sp>
+        <p:nvSpPr>
+          <p:cNvPr id="10" name="TextBox 9">
+            <a:extLst>
+              <a:ext uri="{FF2B5EF4-FFF2-40B4-BE49-F238E27FC236}">
+                <a16:creationId xmlns:a16="http://schemas.microsoft.com/office/drawing/2014/main" id="{A5F8E8A3-1F37-4C3E-8A63-63E7E8904C14}"/>
+              </a:ext>
+            </a:extLst>
+          </p:cNvPr>
+          <p:cNvSpPr txBox="1"/>
+          <p:nvPr/>
+        </p:nvSpPr>
+        <p:spPr bwMode="auto">
+          <a:xfrm>
+            <a:off x="4278438" y="-4207"/>
+            <a:ext cx="4122780" cy="369332"/>
+          </a:xfrm>
+          <a:prstGeom prst="rect">
+            <a:avLst/>
+          </a:prstGeom>
+          <a:noFill/>
+        </p:spPr>
+        <p:txBody>
+          <a:bodyPr wrap="square" rtlCol="0">
+            <a:spAutoFit/>
+          </a:bodyPr>
+          <a:lstStyle/>
+          <a:p>
+            <a:pPr>
+              <a:defRPr/>
+            </a:pPr>
+            <a:r>
+              <a:rPr lang="en-US"/>
+              <a:t>Tucson_renyiElbo_alpha0.2_lr 0.001</a:t>
+            </a:r>
+            <a:endParaRPr/>
+          </a:p>
+        </p:txBody>
+      </p:sp>
+      <p:pic>
+        <p:nvPicPr>
+          <p:cNvPr id="4" name="Picture 3" descr="Chart, histogram&#10;&#10;Description automatically generated">
+            <a:extLst>
+              <a:ext uri="{FF2B5EF4-FFF2-40B4-BE49-F238E27FC236}">
+                <a16:creationId xmlns:a16="http://schemas.microsoft.com/office/drawing/2014/main" id="{AA7225C3-E14D-4A3D-9344-5A91678BAEA4}"/>
+              </a:ext>
+            </a:extLst>
+          </p:cNvPr>
+          <p:cNvPicPr>
+            <a:picLocks noChangeAspect="1"/>
+          </p:cNvPicPr>
+          <p:nvPr/>
+        </p:nvPicPr>
+        <p:blipFill>
+          <a:blip r:embed="rId2">
+            <a:extLst>
+              <a:ext uri="{28A0092B-C50C-407E-A947-70E740481C1C}">
+                <a14:useLocalDpi xmlns:a14="http://schemas.microsoft.com/office/drawing/2010/main" val="0"/>
+              </a:ext>
+            </a:extLst>
+          </a:blip>
+          <a:stretch>
+            <a:fillRect/>
+          </a:stretch>
+        </p:blipFill>
+        <p:spPr>
+          <a:xfrm>
+            <a:off x="6339828" y="2313572"/>
+            <a:ext cx="5852172" cy="4389129"/>
+          </a:xfrm>
+          <a:prstGeom prst="rect">
+            <a:avLst/>
+          </a:prstGeom>
+        </p:spPr>
+      </p:pic>
+      <p:pic>
+        <p:nvPicPr>
+          <p:cNvPr id="17" name="Picture 16" descr="Chart, histogram&#10;&#10;Description automatically generated">
+            <a:extLst>
+              <a:ext uri="{FF2B5EF4-FFF2-40B4-BE49-F238E27FC236}">
+                <a16:creationId xmlns:a16="http://schemas.microsoft.com/office/drawing/2014/main" id="{F0B6C28F-2517-5C85-F8D8-68A2A5B3F7CF}"/>
+              </a:ext>
+            </a:extLst>
+          </p:cNvPr>
+          <p:cNvPicPr>
+            <a:picLocks noChangeAspect="1"/>
+          </p:cNvPicPr>
+          <p:nvPr/>
+        </p:nvPicPr>
+        <p:blipFill>
+          <a:blip r:embed="rId3">
+            <a:extLst>
+              <a:ext uri="{28A0092B-C50C-407E-A947-70E740481C1C}">
+                <a14:useLocalDpi xmlns:a14="http://schemas.microsoft.com/office/drawing/2010/main" val="0"/>
+              </a:ext>
+            </a:extLst>
+          </a:blip>
+          <a:stretch>
+            <a:fillRect/>
+          </a:stretch>
+        </p:blipFill>
+        <p:spPr>
+          <a:xfrm>
+            <a:off x="1" y="2313572"/>
+            <a:ext cx="5852172" cy="4389129"/>
+          </a:xfrm>
+          <a:prstGeom prst="rect">
+            <a:avLst/>
+          </a:prstGeom>
+        </p:spPr>
+      </p:pic>
+    </p:spTree>
+    <p:extLst>
+      <p:ext uri="{BB962C8B-B14F-4D97-AF65-F5344CB8AC3E}">
+        <p14:creationId xmlns:p14="http://schemas.microsoft.com/office/powerpoint/2010/main" val="2074041890"/>
       </p:ext>
     </p:extLst>
   </p:cSld>

</xml_diff>

<commit_message>
Updating results for KF_val
</commit_message>
<xml_diff>
--- a/MiscArtifacts/TucsonTestsModel1.pptx
+++ b/MiscArtifacts/TucsonTestsModel1.pptx
@@ -29,6 +29,8 @@
     <p:sldId id="271" r:id="rId23"/>
     <p:sldId id="280" r:id="rId24"/>
     <p:sldId id="281" r:id="rId25"/>
+    <p:sldId id="283" r:id="rId26"/>
+    <p:sldId id="282" r:id="rId27"/>
   </p:sldIdLst>
   <p:sldSz cx="12192000" cy="6858000"/>
   <p:notesSz cx="12192000" cy="6858000"/>
@@ -146,6 +148,2220 @@
 </p:presentation>
 </file>
 
+<file path=ppt/charts/chart1.xml><?xml version="1.0" encoding="utf-8"?>
+<c:chartSpace xmlns:c="http://schemas.openxmlformats.org/drawingml/2006/chart" xmlns:a="http://schemas.openxmlformats.org/drawingml/2006/main" xmlns:r="http://schemas.openxmlformats.org/officeDocument/2006/relationships" xmlns:c16r2="http://schemas.microsoft.com/office/drawing/2015/06/chart">
+  <c:date1904 val="0"/>
+  <c:lang val="en-US"/>
+  <c:roundedCorners val="0"/>
+  <mc:AlternateContent xmlns:mc="http://schemas.openxmlformats.org/markup-compatibility/2006">
+    <mc:Choice xmlns:c14="http://schemas.microsoft.com/office/drawing/2007/8/2/chart" Requires="c14">
+      <c14:style val="102"/>
+    </mc:Choice>
+    <mc:Fallback>
+      <c:style val="2"/>
+    </mc:Fallback>
+  </mc:AlternateContent>
+  <c:chart>
+    <c:title>
+      <c:tx>
+        <c:rich>
+          <a:bodyPr rot="0" spcFirstLastPara="1" vertOverflow="ellipsis" vert="horz" wrap="square" anchor="ctr" anchorCtr="1"/>
+          <a:lstStyle/>
+          <a:p>
+            <a:pPr>
+              <a:defRPr sz="1680" b="1" i="0" u="none" strike="noStrike" kern="1200" spc="0" baseline="0">
+                <a:solidFill>
+                  <a:schemeClr val="tx1">
+                    <a:lumMod val="65000"/>
+                    <a:lumOff val="35000"/>
+                  </a:schemeClr>
+                </a:solidFill>
+                <a:latin typeface="Times New Roman" panose="02020603050405020304" pitchFamily="18" charset="0"/>
+                <a:ea typeface="+mn-ea"/>
+                <a:cs typeface="Times New Roman" panose="02020603050405020304" pitchFamily="18" charset="0"/>
+              </a:defRPr>
+            </a:pPr>
+            <a:r>
+              <a:rPr lang="en-US"/>
+              <a:t>Tucson error,</a:t>
+            </a:r>
+            <a:r>
+              <a:rPr lang="en-US" baseline="0"/>
+              <a:t> trained on 2021_01</a:t>
+            </a:r>
+            <a:endParaRPr lang="en-US"/>
+          </a:p>
+        </c:rich>
+      </c:tx>
+      <c:overlay val="0"/>
+      <c:spPr>
+        <a:noFill/>
+        <a:ln>
+          <a:noFill/>
+        </a:ln>
+        <a:effectLst/>
+      </c:spPr>
+      <c:txPr>
+        <a:bodyPr rot="0" spcFirstLastPara="1" vertOverflow="ellipsis" vert="horz" wrap="square" anchor="ctr" anchorCtr="1"/>
+        <a:lstStyle/>
+        <a:p>
+          <a:pPr>
+            <a:defRPr sz="1680" b="1" i="0" u="none" strike="noStrike" kern="1200" spc="0" baseline="0">
+              <a:solidFill>
+                <a:schemeClr val="tx1">
+                  <a:lumMod val="65000"/>
+                  <a:lumOff val="35000"/>
+                </a:schemeClr>
+              </a:solidFill>
+              <a:latin typeface="Times New Roman" panose="02020603050405020304" pitchFamily="18" charset="0"/>
+              <a:ea typeface="+mn-ea"/>
+              <a:cs typeface="Times New Roman" panose="02020603050405020304" pitchFamily="18" charset="0"/>
+            </a:defRPr>
+          </a:pPr>
+          <a:endParaRPr lang="en-US"/>
+        </a:p>
+      </c:txPr>
+    </c:title>
+    <c:autoTitleDeleted val="0"/>
+    <c:plotArea>
+      <c:layout/>
+      <c:barChart>
+        <c:barDir val="col"/>
+        <c:grouping val="clustered"/>
+        <c:varyColors val="0"/>
+        <c:ser>
+          <c:idx val="0"/>
+          <c:order val="0"/>
+          <c:spPr>
+            <a:solidFill>
+              <a:schemeClr val="accent1"/>
+            </a:solidFill>
+            <a:ln>
+              <a:noFill/>
+            </a:ln>
+            <a:effectLst/>
+          </c:spPr>
+          <c:invertIfNegative val="0"/>
+          <c:cat>
+            <c:strRef>
+              <c:f>Tucson!$A$10:$A$16</c:f>
+              <c:strCache>
+                <c:ptCount val="7"/>
+                <c:pt idx="0">
+                  <c:v>2021_01</c:v>
+                </c:pt>
+                <c:pt idx="1">
+                  <c:v>2021_02</c:v>
+                </c:pt>
+                <c:pt idx="2">
+                  <c:v>2021_03</c:v>
+                </c:pt>
+                <c:pt idx="3">
+                  <c:v>2021_04</c:v>
+                </c:pt>
+                <c:pt idx="4">
+                  <c:v>2021_05</c:v>
+                </c:pt>
+                <c:pt idx="5">
+                  <c:v>2021_06</c:v>
+                </c:pt>
+                <c:pt idx="6">
+                  <c:v>2021_07</c:v>
+                </c:pt>
+              </c:strCache>
+            </c:strRef>
+          </c:cat>
+          <c:val>
+            <c:numRef>
+              <c:f>Tucson!$C$10:$C$16</c:f>
+              <c:numCache>
+                <c:formatCode>General</c:formatCode>
+                <c:ptCount val="7"/>
+                <c:pt idx="0">
+                  <c:v>119</c:v>
+                </c:pt>
+                <c:pt idx="1">
+                  <c:v>16825</c:v>
+                </c:pt>
+                <c:pt idx="2">
+                  <c:v>19090</c:v>
+                </c:pt>
+                <c:pt idx="3">
+                  <c:v>53278</c:v>
+                </c:pt>
+                <c:pt idx="4">
+                  <c:v>56861</c:v>
+                </c:pt>
+                <c:pt idx="5">
+                  <c:v>32640</c:v>
+                </c:pt>
+                <c:pt idx="6">
+                  <c:v>9817</c:v>
+                </c:pt>
+              </c:numCache>
+            </c:numRef>
+          </c:val>
+          <c:extLst>
+            <c:ext xmlns:c16="http://schemas.microsoft.com/office/drawing/2014/chart" uri="{C3380CC4-5D6E-409C-BE32-E72D297353CC}">
+              <c16:uniqueId val="{00000000-A8BC-487C-A9A2-EBAB360F5CD0}"/>
+            </c:ext>
+          </c:extLst>
+        </c:ser>
+        <c:ser>
+          <c:idx val="1"/>
+          <c:order val="1"/>
+          <c:spPr>
+            <a:solidFill>
+              <a:schemeClr val="accent2"/>
+            </a:solidFill>
+            <a:ln>
+              <a:noFill/>
+            </a:ln>
+            <a:effectLst/>
+          </c:spPr>
+          <c:invertIfNegative val="0"/>
+          <c:cat>
+            <c:strRef>
+              <c:f>Tucson!$A$10:$A$16</c:f>
+              <c:strCache>
+                <c:ptCount val="7"/>
+                <c:pt idx="0">
+                  <c:v>2021_01</c:v>
+                </c:pt>
+                <c:pt idx="1">
+                  <c:v>2021_02</c:v>
+                </c:pt>
+                <c:pt idx="2">
+                  <c:v>2021_03</c:v>
+                </c:pt>
+                <c:pt idx="3">
+                  <c:v>2021_04</c:v>
+                </c:pt>
+                <c:pt idx="4">
+                  <c:v>2021_05</c:v>
+                </c:pt>
+                <c:pt idx="5">
+                  <c:v>2021_06</c:v>
+                </c:pt>
+                <c:pt idx="6">
+                  <c:v>2021_07</c:v>
+                </c:pt>
+              </c:strCache>
+            </c:strRef>
+          </c:cat>
+          <c:val>
+            <c:numRef>
+              <c:f>Tucson!$D$10:$D$16</c:f>
+              <c:numCache>
+                <c:formatCode>General</c:formatCode>
+                <c:ptCount val="7"/>
+                <c:pt idx="0">
+                  <c:v>381</c:v>
+                </c:pt>
+                <c:pt idx="1">
+                  <c:v>16483</c:v>
+                </c:pt>
+                <c:pt idx="2">
+                  <c:v>18625</c:v>
+                </c:pt>
+                <c:pt idx="3">
+                  <c:v>52948</c:v>
+                </c:pt>
+                <c:pt idx="4">
+                  <c:v>56531</c:v>
+                </c:pt>
+                <c:pt idx="5">
+                  <c:v>32310</c:v>
+                </c:pt>
+                <c:pt idx="6">
+                  <c:v>9622</c:v>
+                </c:pt>
+              </c:numCache>
+            </c:numRef>
+          </c:val>
+          <c:extLst>
+            <c:ext xmlns:c16="http://schemas.microsoft.com/office/drawing/2014/chart" uri="{C3380CC4-5D6E-409C-BE32-E72D297353CC}">
+              <c16:uniqueId val="{00000001-A8BC-487C-A9A2-EBAB360F5CD0}"/>
+            </c:ext>
+          </c:extLst>
+        </c:ser>
+        <c:ser>
+          <c:idx val="2"/>
+          <c:order val="2"/>
+          <c:spPr>
+            <a:solidFill>
+              <a:schemeClr val="accent3"/>
+            </a:solidFill>
+            <a:ln>
+              <a:noFill/>
+            </a:ln>
+            <a:effectLst/>
+          </c:spPr>
+          <c:invertIfNegative val="0"/>
+          <c:cat>
+            <c:strRef>
+              <c:f>Tucson!$A$10:$A$16</c:f>
+              <c:strCache>
+                <c:ptCount val="7"/>
+                <c:pt idx="0">
+                  <c:v>2021_01</c:v>
+                </c:pt>
+                <c:pt idx="1">
+                  <c:v>2021_02</c:v>
+                </c:pt>
+                <c:pt idx="2">
+                  <c:v>2021_03</c:v>
+                </c:pt>
+                <c:pt idx="3">
+                  <c:v>2021_04</c:v>
+                </c:pt>
+                <c:pt idx="4">
+                  <c:v>2021_05</c:v>
+                </c:pt>
+                <c:pt idx="5">
+                  <c:v>2021_06</c:v>
+                </c:pt>
+                <c:pt idx="6">
+                  <c:v>2021_07</c:v>
+                </c:pt>
+              </c:strCache>
+            </c:strRef>
+          </c:cat>
+          <c:val>
+            <c:numRef>
+              <c:f>Tucson!$E$10:$E$16</c:f>
+              <c:numCache>
+                <c:formatCode>General</c:formatCode>
+                <c:ptCount val="7"/>
+                <c:pt idx="0">
+                  <c:v>250</c:v>
+                </c:pt>
+                <c:pt idx="1">
+                  <c:v>16958</c:v>
+                </c:pt>
+                <c:pt idx="2">
+                  <c:v>19223</c:v>
+                </c:pt>
+                <c:pt idx="3">
+                  <c:v>53245</c:v>
+                </c:pt>
+                <c:pt idx="4">
+                  <c:v>56828</c:v>
+                </c:pt>
+                <c:pt idx="5">
+                  <c:v>32607</c:v>
+                </c:pt>
+                <c:pt idx="6">
+                  <c:v>9729</c:v>
+                </c:pt>
+              </c:numCache>
+            </c:numRef>
+          </c:val>
+          <c:extLst>
+            <c:ext xmlns:c16="http://schemas.microsoft.com/office/drawing/2014/chart" uri="{C3380CC4-5D6E-409C-BE32-E72D297353CC}">
+              <c16:uniqueId val="{00000002-A8BC-487C-A9A2-EBAB360F5CD0}"/>
+            </c:ext>
+          </c:extLst>
+        </c:ser>
+        <c:ser>
+          <c:idx val="3"/>
+          <c:order val="3"/>
+          <c:spPr>
+            <a:solidFill>
+              <a:schemeClr val="accent4"/>
+            </a:solidFill>
+            <a:ln>
+              <a:noFill/>
+            </a:ln>
+            <a:effectLst/>
+          </c:spPr>
+          <c:invertIfNegative val="0"/>
+          <c:cat>
+            <c:strRef>
+              <c:f>Tucson!$A$10:$A$16</c:f>
+              <c:strCache>
+                <c:ptCount val="7"/>
+                <c:pt idx="0">
+                  <c:v>2021_01</c:v>
+                </c:pt>
+                <c:pt idx="1">
+                  <c:v>2021_02</c:v>
+                </c:pt>
+                <c:pt idx="2">
+                  <c:v>2021_03</c:v>
+                </c:pt>
+                <c:pt idx="3">
+                  <c:v>2021_04</c:v>
+                </c:pt>
+                <c:pt idx="4">
+                  <c:v>2021_05</c:v>
+                </c:pt>
+                <c:pt idx="5">
+                  <c:v>2021_06</c:v>
+                </c:pt>
+                <c:pt idx="6">
+                  <c:v>2021_07</c:v>
+                </c:pt>
+              </c:strCache>
+            </c:strRef>
+          </c:cat>
+          <c:val>
+            <c:numRef>
+              <c:f>Tucson!$G$10:$G$16</c:f>
+              <c:numCache>
+                <c:formatCode>General</c:formatCode>
+                <c:ptCount val="7"/>
+                <c:pt idx="0">
+                  <c:v>1</c:v>
+                </c:pt>
+                <c:pt idx="1">
+                  <c:v>16941</c:v>
+                </c:pt>
+                <c:pt idx="2">
+                  <c:v>19206</c:v>
+                </c:pt>
+                <c:pt idx="3">
+                  <c:v>53390</c:v>
+                </c:pt>
+                <c:pt idx="4">
+                  <c:v>56973</c:v>
+                </c:pt>
+                <c:pt idx="5">
+                  <c:v>32752</c:v>
+                </c:pt>
+                <c:pt idx="6">
+                  <c:v>9833</c:v>
+                </c:pt>
+              </c:numCache>
+            </c:numRef>
+          </c:val>
+          <c:extLst>
+            <c:ext xmlns:c16="http://schemas.microsoft.com/office/drawing/2014/chart" uri="{C3380CC4-5D6E-409C-BE32-E72D297353CC}">
+              <c16:uniqueId val="{00000003-A8BC-487C-A9A2-EBAB360F5CD0}"/>
+            </c:ext>
+          </c:extLst>
+        </c:ser>
+        <c:ser>
+          <c:idx val="4"/>
+          <c:order val="4"/>
+          <c:spPr>
+            <a:solidFill>
+              <a:schemeClr val="accent5"/>
+            </a:solidFill>
+            <a:ln>
+              <a:noFill/>
+            </a:ln>
+            <a:effectLst/>
+          </c:spPr>
+          <c:invertIfNegative val="0"/>
+          <c:cat>
+            <c:strRef>
+              <c:f>Tucson!$A$10:$A$16</c:f>
+              <c:strCache>
+                <c:ptCount val="7"/>
+                <c:pt idx="0">
+                  <c:v>2021_01</c:v>
+                </c:pt>
+                <c:pt idx="1">
+                  <c:v>2021_02</c:v>
+                </c:pt>
+                <c:pt idx="2">
+                  <c:v>2021_03</c:v>
+                </c:pt>
+                <c:pt idx="3">
+                  <c:v>2021_04</c:v>
+                </c:pt>
+                <c:pt idx="4">
+                  <c:v>2021_05</c:v>
+                </c:pt>
+                <c:pt idx="5">
+                  <c:v>2021_06</c:v>
+                </c:pt>
+                <c:pt idx="6">
+                  <c:v>2021_07</c:v>
+                </c:pt>
+              </c:strCache>
+            </c:strRef>
+          </c:cat>
+          <c:val>
+            <c:numRef>
+              <c:f>Tucson!$H$10:$H$16</c:f>
+              <c:numCache>
+                <c:formatCode>General</c:formatCode>
+                <c:ptCount val="7"/>
+              </c:numCache>
+            </c:numRef>
+          </c:val>
+          <c:extLst>
+            <c:ext xmlns:c16="http://schemas.microsoft.com/office/drawing/2014/chart" uri="{C3380CC4-5D6E-409C-BE32-E72D297353CC}">
+              <c16:uniqueId val="{00000004-A8BC-487C-A9A2-EBAB360F5CD0}"/>
+            </c:ext>
+          </c:extLst>
+        </c:ser>
+        <c:ser>
+          <c:idx val="5"/>
+          <c:order val="5"/>
+          <c:tx>
+            <c:strRef>
+              <c:f>Tucson!$A$10:$A$16</c:f>
+              <c:strCache>
+                <c:ptCount val="7"/>
+                <c:pt idx="0">
+                  <c:v>2021_01</c:v>
+                </c:pt>
+                <c:pt idx="1">
+                  <c:v>2021_02</c:v>
+                </c:pt>
+                <c:pt idx="2">
+                  <c:v>2021_03</c:v>
+                </c:pt>
+                <c:pt idx="3">
+                  <c:v>2021_04</c:v>
+                </c:pt>
+                <c:pt idx="4">
+                  <c:v>2021_05</c:v>
+                </c:pt>
+                <c:pt idx="5">
+                  <c:v>2021_06</c:v>
+                </c:pt>
+                <c:pt idx="6">
+                  <c:v>2021_07</c:v>
+                </c:pt>
+              </c:strCache>
+            </c:strRef>
+          </c:tx>
+          <c:spPr>
+            <a:solidFill>
+              <a:schemeClr val="accent6"/>
+            </a:solidFill>
+            <a:ln>
+              <a:noFill/>
+            </a:ln>
+            <a:effectLst/>
+          </c:spPr>
+          <c:invertIfNegative val="0"/>
+          <c:val>
+            <c:numRef>
+              <c:f>Tucson!$F$10:$F$16</c:f>
+              <c:numCache>
+                <c:formatCode>General</c:formatCode>
+                <c:ptCount val="7"/>
+                <c:pt idx="0">
+                  <c:v>618</c:v>
+                </c:pt>
+                <c:pt idx="1">
+                  <c:v>8445</c:v>
+                </c:pt>
+                <c:pt idx="2">
+                  <c:v>11402</c:v>
+                </c:pt>
+                <c:pt idx="3">
+                  <c:v>15649</c:v>
+                </c:pt>
+                <c:pt idx="4">
+                  <c:v>20646</c:v>
+                </c:pt>
+                <c:pt idx="5">
+                  <c:v>15763</c:v>
+                </c:pt>
+                <c:pt idx="6">
+                  <c:v>14683</c:v>
+                </c:pt>
+              </c:numCache>
+            </c:numRef>
+          </c:val>
+          <c:extLst>
+            <c:ext xmlns:c16="http://schemas.microsoft.com/office/drawing/2014/chart" uri="{C3380CC4-5D6E-409C-BE32-E72D297353CC}">
+              <c16:uniqueId val="{00000005-A8BC-487C-A9A2-EBAB360F5CD0}"/>
+            </c:ext>
+          </c:extLst>
+        </c:ser>
+        <c:dLbls>
+          <c:showLegendKey val="0"/>
+          <c:showVal val="0"/>
+          <c:showCatName val="0"/>
+          <c:showSerName val="0"/>
+          <c:showPercent val="0"/>
+          <c:showBubbleSize val="0"/>
+        </c:dLbls>
+        <c:gapWidth val="219"/>
+        <c:overlap val="-27"/>
+        <c:axId val="692795088"/>
+        <c:axId val="692796336"/>
+      </c:barChart>
+      <c:catAx>
+        <c:axId val="692795088"/>
+        <c:scaling>
+          <c:orientation val="minMax"/>
+        </c:scaling>
+        <c:delete val="0"/>
+        <c:axPos val="b"/>
+        <c:numFmt formatCode="General" sourceLinked="1"/>
+        <c:majorTickMark val="none"/>
+        <c:minorTickMark val="none"/>
+        <c:tickLblPos val="nextTo"/>
+        <c:spPr>
+          <a:noFill/>
+          <a:ln w="9525" cap="flat" cmpd="sng" algn="ctr">
+            <a:solidFill>
+              <a:schemeClr val="tx1">
+                <a:lumMod val="15000"/>
+                <a:lumOff val="85000"/>
+              </a:schemeClr>
+            </a:solidFill>
+            <a:round/>
+          </a:ln>
+          <a:effectLst/>
+        </c:spPr>
+        <c:txPr>
+          <a:bodyPr rot="-60000000" spcFirstLastPara="1" vertOverflow="ellipsis" vert="horz" wrap="square" anchor="ctr" anchorCtr="1"/>
+          <a:lstStyle/>
+          <a:p>
+            <a:pPr>
+              <a:defRPr sz="1400" b="1" i="0" u="none" strike="noStrike" kern="1200" baseline="0">
+                <a:solidFill>
+                  <a:schemeClr val="tx1">
+                    <a:lumMod val="65000"/>
+                    <a:lumOff val="35000"/>
+                  </a:schemeClr>
+                </a:solidFill>
+                <a:latin typeface="Times New Roman" panose="02020603050405020304" pitchFamily="18" charset="0"/>
+                <a:ea typeface="+mn-ea"/>
+                <a:cs typeface="Times New Roman" panose="02020603050405020304" pitchFamily="18" charset="0"/>
+              </a:defRPr>
+            </a:pPr>
+            <a:endParaRPr lang="en-US"/>
+          </a:p>
+        </c:txPr>
+        <c:crossAx val="692796336"/>
+        <c:crosses val="autoZero"/>
+        <c:auto val="1"/>
+        <c:lblAlgn val="ctr"/>
+        <c:lblOffset val="100"/>
+        <c:noMultiLvlLbl val="0"/>
+      </c:catAx>
+      <c:valAx>
+        <c:axId val="692796336"/>
+        <c:scaling>
+          <c:orientation val="minMax"/>
+        </c:scaling>
+        <c:delete val="0"/>
+        <c:axPos val="l"/>
+        <c:majorGridlines>
+          <c:spPr>
+            <a:ln w="9525" cap="flat" cmpd="sng" algn="ctr">
+              <a:solidFill>
+                <a:schemeClr val="tx1">
+                  <a:lumMod val="15000"/>
+                  <a:lumOff val="85000"/>
+                </a:schemeClr>
+              </a:solidFill>
+              <a:round/>
+            </a:ln>
+            <a:effectLst/>
+          </c:spPr>
+        </c:majorGridlines>
+        <c:numFmt formatCode="General" sourceLinked="1"/>
+        <c:majorTickMark val="none"/>
+        <c:minorTickMark val="none"/>
+        <c:tickLblPos val="nextTo"/>
+        <c:spPr>
+          <a:noFill/>
+          <a:ln>
+            <a:noFill/>
+          </a:ln>
+          <a:effectLst/>
+        </c:spPr>
+        <c:txPr>
+          <a:bodyPr rot="-60000000" spcFirstLastPara="1" vertOverflow="ellipsis" vert="horz" wrap="square" anchor="ctr" anchorCtr="1"/>
+          <a:lstStyle/>
+          <a:p>
+            <a:pPr>
+              <a:defRPr sz="1400" b="1" i="0" u="none" strike="noStrike" kern="1200" baseline="0">
+                <a:solidFill>
+                  <a:schemeClr val="tx1">
+                    <a:lumMod val="65000"/>
+                    <a:lumOff val="35000"/>
+                  </a:schemeClr>
+                </a:solidFill>
+                <a:latin typeface="Times New Roman" panose="02020603050405020304" pitchFamily="18" charset="0"/>
+                <a:ea typeface="+mn-ea"/>
+                <a:cs typeface="Times New Roman" panose="02020603050405020304" pitchFamily="18" charset="0"/>
+              </a:defRPr>
+            </a:pPr>
+            <a:endParaRPr lang="en-US"/>
+          </a:p>
+        </c:txPr>
+        <c:crossAx val="692795088"/>
+        <c:crosses val="autoZero"/>
+        <c:crossBetween val="between"/>
+      </c:valAx>
+      <c:spPr>
+        <a:noFill/>
+        <a:ln>
+          <a:noFill/>
+        </a:ln>
+        <a:effectLst/>
+      </c:spPr>
+    </c:plotArea>
+    <c:plotVisOnly val="1"/>
+    <c:dispBlanksAs val="gap"/>
+    <c:extLst>
+      <c:ext xmlns:c16r3="http://schemas.microsoft.com/office/drawing/2017/03/chart" uri="{56B9EC1D-385E-4148-901F-78D8002777C0}">
+        <c16r3:dataDisplayOptions16>
+          <c16r3:dispNaAsBlank val="1"/>
+        </c16r3:dataDisplayOptions16>
+      </c:ext>
+    </c:extLst>
+    <c:showDLblsOverMax val="0"/>
+  </c:chart>
+  <c:spPr>
+    <a:noFill/>
+    <a:ln>
+      <a:noFill/>
+    </a:ln>
+    <a:effectLst/>
+  </c:spPr>
+  <c:txPr>
+    <a:bodyPr/>
+    <a:lstStyle/>
+    <a:p>
+      <a:pPr>
+        <a:defRPr sz="1400" b="1">
+          <a:latin typeface="Times New Roman" panose="02020603050405020304" pitchFamily="18" charset="0"/>
+          <a:cs typeface="Times New Roman" panose="02020603050405020304" pitchFamily="18" charset="0"/>
+        </a:defRPr>
+      </a:pPr>
+      <a:endParaRPr lang="en-US"/>
+    </a:p>
+  </c:txPr>
+  <c:externalData r:id="rId3">
+    <c:autoUpdate val="0"/>
+  </c:externalData>
+</c:chartSpace>
+</file>
+
+<file path=ppt/charts/chart2.xml><?xml version="1.0" encoding="utf-8"?>
+<c:chartSpace xmlns:c="http://schemas.openxmlformats.org/drawingml/2006/chart" xmlns:a="http://schemas.openxmlformats.org/drawingml/2006/main" xmlns:r="http://schemas.openxmlformats.org/officeDocument/2006/relationships" xmlns:c16r2="http://schemas.microsoft.com/office/drawing/2015/06/chart">
+  <c:date1904 val="0"/>
+  <c:lang val="en-US"/>
+  <c:roundedCorners val="0"/>
+  <mc:AlternateContent xmlns:mc="http://schemas.openxmlformats.org/markup-compatibility/2006">
+    <mc:Choice xmlns:c14="http://schemas.microsoft.com/office/drawing/2007/8/2/chart" Requires="c14">
+      <c14:style val="102"/>
+    </mc:Choice>
+    <mc:Fallback>
+      <c:style val="2"/>
+    </mc:Fallback>
+  </mc:AlternateContent>
+  <c:chart>
+    <c:title>
+      <c:tx>
+        <c:rich>
+          <a:bodyPr rot="0" spcFirstLastPara="1" vertOverflow="ellipsis" vert="horz" wrap="square" anchor="ctr" anchorCtr="1"/>
+          <a:lstStyle/>
+          <a:p>
+            <a:pPr>
+              <a:defRPr sz="1400" b="0" i="0" u="none" strike="noStrike" kern="1200" spc="0" baseline="0">
+                <a:solidFill>
+                  <a:schemeClr val="tx1">
+                    <a:lumMod val="65000"/>
+                    <a:lumOff val="35000"/>
+                  </a:schemeClr>
+                </a:solidFill>
+                <a:latin typeface="+mn-lt"/>
+                <a:ea typeface="+mn-ea"/>
+                <a:cs typeface="+mn-cs"/>
+              </a:defRPr>
+            </a:pPr>
+            <a:r>
+              <a:rPr lang="en-US"/>
+              <a:t>Tucson KF crossVal</a:t>
+            </a:r>
+          </a:p>
+        </c:rich>
+      </c:tx>
+      <c:overlay val="0"/>
+      <c:spPr>
+        <a:noFill/>
+        <a:ln>
+          <a:noFill/>
+        </a:ln>
+        <a:effectLst/>
+      </c:spPr>
+      <c:txPr>
+        <a:bodyPr rot="0" spcFirstLastPara="1" vertOverflow="ellipsis" vert="horz" wrap="square" anchor="ctr" anchorCtr="1"/>
+        <a:lstStyle/>
+        <a:p>
+          <a:pPr>
+            <a:defRPr sz="1400" b="0" i="0" u="none" strike="noStrike" kern="1200" spc="0" baseline="0">
+              <a:solidFill>
+                <a:schemeClr val="tx1">
+                  <a:lumMod val="65000"/>
+                  <a:lumOff val="35000"/>
+                </a:schemeClr>
+              </a:solidFill>
+              <a:latin typeface="+mn-lt"/>
+              <a:ea typeface="+mn-ea"/>
+              <a:cs typeface="+mn-cs"/>
+            </a:defRPr>
+          </a:pPr>
+          <a:endParaRPr lang="en-US"/>
+        </a:p>
+      </c:txPr>
+    </c:title>
+    <c:autoTitleDeleted val="0"/>
+    <c:plotArea>
+      <c:layout/>
+      <c:barChart>
+        <c:barDir val="col"/>
+        <c:grouping val="clustered"/>
+        <c:varyColors val="0"/>
+        <c:ser>
+          <c:idx val="0"/>
+          <c:order val="0"/>
+          <c:tx>
+            <c:strRef>
+              <c:f>'KFCV_USA_AZ_Pima County_Tucson_'!$D$2</c:f>
+              <c:strCache>
+                <c:ptCount val="1"/>
+                <c:pt idx="0">
+                  <c:v>Train</c:v>
+                </c:pt>
+              </c:strCache>
+            </c:strRef>
+          </c:tx>
+          <c:spPr>
+            <a:solidFill>
+              <a:schemeClr val="accent1"/>
+            </a:solidFill>
+            <a:ln>
+              <a:noFill/>
+            </a:ln>
+            <a:effectLst/>
+          </c:spPr>
+          <c:invertIfNegative val="0"/>
+          <c:cat>
+            <c:strRef>
+              <c:f>'KFCV_USA_AZ_Pima County_Tucson_'!$E$1:$J$1</c:f>
+              <c:strCache>
+                <c:ptCount val="6"/>
+                <c:pt idx="0">
+                  <c:v>M1</c:v>
+                </c:pt>
+                <c:pt idx="1">
+                  <c:v>M2</c:v>
+                </c:pt>
+                <c:pt idx="2">
+                  <c:v>M3</c:v>
+                </c:pt>
+                <c:pt idx="3">
+                  <c:v>M4</c:v>
+                </c:pt>
+                <c:pt idx="4">
+                  <c:v>M5</c:v>
+                </c:pt>
+                <c:pt idx="5">
+                  <c:v>M6</c:v>
+                </c:pt>
+              </c:strCache>
+            </c:strRef>
+          </c:cat>
+          <c:val>
+            <c:numRef>
+              <c:f>'KFCV_USA_AZ_Pima County_Tucson_'!$E$2:$J$2</c:f>
+              <c:numCache>
+                <c:formatCode>General</c:formatCode>
+                <c:ptCount val="6"/>
+                <c:pt idx="0">
+                  <c:v>21835</c:v>
+                </c:pt>
+                <c:pt idx="1">
+                  <c:v>29288</c:v>
+                </c:pt>
+                <c:pt idx="2">
+                  <c:v>22004</c:v>
+                </c:pt>
+                <c:pt idx="3">
+                  <c:v>20331</c:v>
+                </c:pt>
+                <c:pt idx="4">
+                  <c:v>23287</c:v>
+                </c:pt>
+                <c:pt idx="5">
+                  <c:v>26633</c:v>
+                </c:pt>
+              </c:numCache>
+            </c:numRef>
+          </c:val>
+          <c:extLst>
+            <c:ext xmlns:c16="http://schemas.microsoft.com/office/drawing/2014/chart" uri="{C3380CC4-5D6E-409C-BE32-E72D297353CC}">
+              <c16:uniqueId val="{00000000-5EC8-4F78-BF91-5A76E1C11A2E}"/>
+            </c:ext>
+          </c:extLst>
+        </c:ser>
+        <c:ser>
+          <c:idx val="1"/>
+          <c:order val="1"/>
+          <c:tx>
+            <c:strRef>
+              <c:f>'KFCV_USA_AZ_Pima County_Tucson_'!$D$3</c:f>
+              <c:strCache>
+                <c:ptCount val="1"/>
+                <c:pt idx="0">
+                  <c:v>Test</c:v>
+                </c:pt>
+              </c:strCache>
+            </c:strRef>
+          </c:tx>
+          <c:spPr>
+            <a:solidFill>
+              <a:schemeClr val="accent2"/>
+            </a:solidFill>
+            <a:ln>
+              <a:noFill/>
+            </a:ln>
+            <a:effectLst/>
+          </c:spPr>
+          <c:invertIfNegative val="0"/>
+          <c:cat>
+            <c:strRef>
+              <c:f>'KFCV_USA_AZ_Pima County_Tucson_'!$E$1:$J$1</c:f>
+              <c:strCache>
+                <c:ptCount val="6"/>
+                <c:pt idx="0">
+                  <c:v>M1</c:v>
+                </c:pt>
+                <c:pt idx="1">
+                  <c:v>M2</c:v>
+                </c:pt>
+                <c:pt idx="2">
+                  <c:v>M3</c:v>
+                </c:pt>
+                <c:pt idx="3">
+                  <c:v>M4</c:v>
+                </c:pt>
+                <c:pt idx="4">
+                  <c:v>M5</c:v>
+                </c:pt>
+                <c:pt idx="5">
+                  <c:v>M6</c:v>
+                </c:pt>
+              </c:strCache>
+            </c:strRef>
+          </c:cat>
+          <c:val>
+            <c:numRef>
+              <c:f>'KFCV_USA_AZ_Pima County_Tucson_'!$E$3:$J$3</c:f>
+              <c:numCache>
+                <c:formatCode>General</c:formatCode>
+                <c:ptCount val="6"/>
+                <c:pt idx="0">
+                  <c:v>31066</c:v>
+                </c:pt>
+                <c:pt idx="1">
+                  <c:v>20057</c:v>
+                </c:pt>
+                <c:pt idx="2">
+                  <c:v>29886</c:v>
+                </c:pt>
+                <c:pt idx="3">
+                  <c:v>35142</c:v>
+                </c:pt>
+                <c:pt idx="4">
+                  <c:v>9092</c:v>
+                </c:pt>
+                <c:pt idx="5">
+                  <c:v>23048</c:v>
+                </c:pt>
+              </c:numCache>
+            </c:numRef>
+          </c:val>
+          <c:extLst>
+            <c:ext xmlns:c16="http://schemas.microsoft.com/office/drawing/2014/chart" uri="{C3380CC4-5D6E-409C-BE32-E72D297353CC}">
+              <c16:uniqueId val="{00000001-5EC8-4F78-BF91-5A76E1C11A2E}"/>
+            </c:ext>
+          </c:extLst>
+        </c:ser>
+        <c:dLbls>
+          <c:showLegendKey val="0"/>
+          <c:showVal val="0"/>
+          <c:showCatName val="0"/>
+          <c:showSerName val="0"/>
+          <c:showPercent val="0"/>
+          <c:showBubbleSize val="0"/>
+        </c:dLbls>
+        <c:gapWidth val="219"/>
+        <c:overlap val="-27"/>
+        <c:axId val="681994239"/>
+        <c:axId val="681998079"/>
+      </c:barChart>
+      <c:catAx>
+        <c:axId val="681994239"/>
+        <c:scaling>
+          <c:orientation val="minMax"/>
+        </c:scaling>
+        <c:delete val="0"/>
+        <c:axPos val="b"/>
+        <c:numFmt formatCode="General" sourceLinked="1"/>
+        <c:majorTickMark val="none"/>
+        <c:minorTickMark val="none"/>
+        <c:tickLblPos val="nextTo"/>
+        <c:spPr>
+          <a:noFill/>
+          <a:ln w="9525" cap="flat" cmpd="sng" algn="ctr">
+            <a:solidFill>
+              <a:schemeClr val="tx1">
+                <a:lumMod val="15000"/>
+                <a:lumOff val="85000"/>
+              </a:schemeClr>
+            </a:solidFill>
+            <a:round/>
+          </a:ln>
+          <a:effectLst/>
+        </c:spPr>
+        <c:txPr>
+          <a:bodyPr rot="-60000000" spcFirstLastPara="1" vertOverflow="ellipsis" vert="horz" wrap="square" anchor="ctr" anchorCtr="1"/>
+          <a:lstStyle/>
+          <a:p>
+            <a:pPr>
+              <a:defRPr sz="900" b="0" i="0" u="none" strike="noStrike" kern="1200" baseline="0">
+                <a:solidFill>
+                  <a:schemeClr val="tx1">
+                    <a:lumMod val="65000"/>
+                    <a:lumOff val="35000"/>
+                  </a:schemeClr>
+                </a:solidFill>
+                <a:latin typeface="+mn-lt"/>
+                <a:ea typeface="+mn-ea"/>
+                <a:cs typeface="+mn-cs"/>
+              </a:defRPr>
+            </a:pPr>
+            <a:endParaRPr lang="en-US"/>
+          </a:p>
+        </c:txPr>
+        <c:crossAx val="681998079"/>
+        <c:crosses val="autoZero"/>
+        <c:auto val="1"/>
+        <c:lblAlgn val="ctr"/>
+        <c:lblOffset val="100"/>
+        <c:noMultiLvlLbl val="0"/>
+      </c:catAx>
+      <c:valAx>
+        <c:axId val="681998079"/>
+        <c:scaling>
+          <c:orientation val="minMax"/>
+        </c:scaling>
+        <c:delete val="0"/>
+        <c:axPos val="l"/>
+        <c:majorGridlines>
+          <c:spPr>
+            <a:ln w="9525" cap="flat" cmpd="sng" algn="ctr">
+              <a:solidFill>
+                <a:schemeClr val="tx1">
+                  <a:lumMod val="15000"/>
+                  <a:lumOff val="85000"/>
+                </a:schemeClr>
+              </a:solidFill>
+              <a:round/>
+            </a:ln>
+            <a:effectLst/>
+          </c:spPr>
+        </c:majorGridlines>
+        <c:numFmt formatCode="General" sourceLinked="1"/>
+        <c:majorTickMark val="none"/>
+        <c:minorTickMark val="none"/>
+        <c:tickLblPos val="nextTo"/>
+        <c:spPr>
+          <a:noFill/>
+          <a:ln>
+            <a:noFill/>
+          </a:ln>
+          <a:effectLst/>
+        </c:spPr>
+        <c:txPr>
+          <a:bodyPr rot="-60000000" spcFirstLastPara="1" vertOverflow="ellipsis" vert="horz" wrap="square" anchor="ctr" anchorCtr="1"/>
+          <a:lstStyle/>
+          <a:p>
+            <a:pPr>
+              <a:defRPr sz="900" b="0" i="0" u="none" strike="noStrike" kern="1200" baseline="0">
+                <a:solidFill>
+                  <a:schemeClr val="tx1">
+                    <a:lumMod val="65000"/>
+                    <a:lumOff val="35000"/>
+                  </a:schemeClr>
+                </a:solidFill>
+                <a:latin typeface="+mn-lt"/>
+                <a:ea typeface="+mn-ea"/>
+                <a:cs typeface="+mn-cs"/>
+              </a:defRPr>
+            </a:pPr>
+            <a:endParaRPr lang="en-US"/>
+          </a:p>
+        </c:txPr>
+        <c:crossAx val="681994239"/>
+        <c:crosses val="autoZero"/>
+        <c:crossBetween val="between"/>
+      </c:valAx>
+      <c:spPr>
+        <a:noFill/>
+        <a:ln>
+          <a:noFill/>
+        </a:ln>
+        <a:effectLst/>
+      </c:spPr>
+    </c:plotArea>
+    <c:legend>
+      <c:legendPos val="b"/>
+      <c:overlay val="0"/>
+      <c:spPr>
+        <a:noFill/>
+        <a:ln>
+          <a:noFill/>
+        </a:ln>
+        <a:effectLst/>
+      </c:spPr>
+      <c:txPr>
+        <a:bodyPr rot="0" spcFirstLastPara="1" vertOverflow="ellipsis" vert="horz" wrap="square" anchor="ctr" anchorCtr="1"/>
+        <a:lstStyle/>
+        <a:p>
+          <a:pPr>
+            <a:defRPr sz="900" b="0" i="0" u="none" strike="noStrike" kern="1200" baseline="0">
+              <a:solidFill>
+                <a:schemeClr val="tx1">
+                  <a:lumMod val="65000"/>
+                  <a:lumOff val="35000"/>
+                </a:schemeClr>
+              </a:solidFill>
+              <a:latin typeface="+mn-lt"/>
+              <a:ea typeface="+mn-ea"/>
+              <a:cs typeface="+mn-cs"/>
+            </a:defRPr>
+          </a:pPr>
+          <a:endParaRPr lang="en-US"/>
+        </a:p>
+      </c:txPr>
+    </c:legend>
+    <c:plotVisOnly val="1"/>
+    <c:dispBlanksAs val="gap"/>
+    <c:extLst>
+      <c:ext xmlns:c16r3="http://schemas.microsoft.com/office/drawing/2017/03/chart" uri="{56B9EC1D-385E-4148-901F-78D8002777C0}">
+        <c16r3:dataDisplayOptions16>
+          <c16r3:dispNaAsBlank val="1"/>
+        </c16r3:dataDisplayOptions16>
+      </c:ext>
+    </c:extLst>
+    <c:showDLblsOverMax val="0"/>
+  </c:chart>
+  <c:spPr>
+    <a:noFill/>
+    <a:ln>
+      <a:noFill/>
+    </a:ln>
+    <a:effectLst/>
+  </c:spPr>
+  <c:txPr>
+    <a:bodyPr/>
+    <a:lstStyle/>
+    <a:p>
+      <a:pPr>
+        <a:defRPr/>
+      </a:pPr>
+      <a:endParaRPr lang="en-US"/>
+    </a:p>
+  </c:txPr>
+  <c:externalData r:id="rId3">
+    <c:autoUpdate val="0"/>
+  </c:externalData>
+</c:chartSpace>
+</file>
+
+<file path=ppt/charts/colors1.xml><?xml version="1.0" encoding="utf-8"?>
+<cs:colorStyle xmlns:cs="http://schemas.microsoft.com/office/drawing/2012/chartStyle" xmlns:a="http://schemas.openxmlformats.org/drawingml/2006/main" meth="cycle" id="10">
+  <a:schemeClr val="accent1"/>
+  <a:schemeClr val="accent2"/>
+  <a:schemeClr val="accent3"/>
+  <a:schemeClr val="accent4"/>
+  <a:schemeClr val="accent5"/>
+  <a:schemeClr val="accent6"/>
+  <cs:variation/>
+  <cs:variation>
+    <a:lumMod val="60000"/>
+  </cs:variation>
+  <cs:variation>
+    <a:lumMod val="80000"/>
+    <a:lumOff val="20000"/>
+  </cs:variation>
+  <cs:variation>
+    <a:lumMod val="80000"/>
+  </cs:variation>
+  <cs:variation>
+    <a:lumMod val="60000"/>
+    <a:lumOff val="40000"/>
+  </cs:variation>
+  <cs:variation>
+    <a:lumMod val="50000"/>
+  </cs:variation>
+  <cs:variation>
+    <a:lumMod val="70000"/>
+    <a:lumOff val="30000"/>
+  </cs:variation>
+  <cs:variation>
+    <a:lumMod val="70000"/>
+  </cs:variation>
+  <cs:variation>
+    <a:lumMod val="50000"/>
+    <a:lumOff val="50000"/>
+  </cs:variation>
+</cs:colorStyle>
+</file>
+
+<file path=ppt/charts/colors2.xml><?xml version="1.0" encoding="utf-8"?>
+<cs:colorStyle xmlns:cs="http://schemas.microsoft.com/office/drawing/2012/chartStyle" xmlns:a="http://schemas.openxmlformats.org/drawingml/2006/main" meth="cycle" id="10">
+  <a:schemeClr val="accent1"/>
+  <a:schemeClr val="accent2"/>
+  <a:schemeClr val="accent3"/>
+  <a:schemeClr val="accent4"/>
+  <a:schemeClr val="accent5"/>
+  <a:schemeClr val="accent6"/>
+  <cs:variation/>
+  <cs:variation>
+    <a:lumMod val="60000"/>
+  </cs:variation>
+  <cs:variation>
+    <a:lumMod val="80000"/>
+    <a:lumOff val="20000"/>
+  </cs:variation>
+  <cs:variation>
+    <a:lumMod val="80000"/>
+  </cs:variation>
+  <cs:variation>
+    <a:lumMod val="60000"/>
+    <a:lumOff val="40000"/>
+  </cs:variation>
+  <cs:variation>
+    <a:lumMod val="50000"/>
+  </cs:variation>
+  <cs:variation>
+    <a:lumMod val="70000"/>
+    <a:lumOff val="30000"/>
+  </cs:variation>
+  <cs:variation>
+    <a:lumMod val="70000"/>
+  </cs:variation>
+  <cs:variation>
+    <a:lumMod val="50000"/>
+    <a:lumOff val="50000"/>
+  </cs:variation>
+</cs:colorStyle>
+</file>
+
+<file path=ppt/charts/style1.xml><?xml version="1.0" encoding="utf-8"?>
+<cs:chartStyle xmlns:cs="http://schemas.microsoft.com/office/drawing/2012/chartStyle" xmlns:a="http://schemas.openxmlformats.org/drawingml/2006/main" id="201">
+  <cs:axisTitle>
+    <cs:lnRef idx="0"/>
+    <cs:fillRef idx="0"/>
+    <cs:effectRef idx="0"/>
+    <cs:fontRef idx="minor">
+      <a:schemeClr val="tx1">
+        <a:lumMod val="65000"/>
+        <a:lumOff val="35000"/>
+      </a:schemeClr>
+    </cs:fontRef>
+    <cs:defRPr sz="1000" kern="1200"/>
+  </cs:axisTitle>
+  <cs:categoryAxis>
+    <cs:lnRef idx="0"/>
+    <cs:fillRef idx="0"/>
+    <cs:effectRef idx="0"/>
+    <cs:fontRef idx="minor">
+      <a:schemeClr val="tx1">
+        <a:lumMod val="65000"/>
+        <a:lumOff val="35000"/>
+      </a:schemeClr>
+    </cs:fontRef>
+    <cs:spPr>
+      <a:ln w="9525" cap="flat" cmpd="sng" algn="ctr">
+        <a:solidFill>
+          <a:schemeClr val="tx1">
+            <a:lumMod val="15000"/>
+            <a:lumOff val="85000"/>
+          </a:schemeClr>
+        </a:solidFill>
+        <a:round/>
+      </a:ln>
+    </cs:spPr>
+    <cs:defRPr sz="900" kern="1200"/>
+  </cs:categoryAxis>
+  <cs:chartArea mods="allowNoFillOverride allowNoLineOverride">
+    <cs:lnRef idx="0"/>
+    <cs:fillRef idx="0"/>
+    <cs:effectRef idx="0"/>
+    <cs:fontRef idx="minor">
+      <a:schemeClr val="tx1"/>
+    </cs:fontRef>
+    <cs:spPr>
+      <a:solidFill>
+        <a:schemeClr val="bg1"/>
+      </a:solidFill>
+      <a:ln w="9525" cap="flat" cmpd="sng" algn="ctr">
+        <a:solidFill>
+          <a:schemeClr val="tx1">
+            <a:lumMod val="15000"/>
+            <a:lumOff val="85000"/>
+          </a:schemeClr>
+        </a:solidFill>
+        <a:round/>
+      </a:ln>
+    </cs:spPr>
+    <cs:defRPr sz="1000" kern="1200"/>
+  </cs:chartArea>
+  <cs:dataLabel>
+    <cs:lnRef idx="0"/>
+    <cs:fillRef idx="0"/>
+    <cs:effectRef idx="0"/>
+    <cs:fontRef idx="minor">
+      <a:schemeClr val="tx1">
+        <a:lumMod val="75000"/>
+        <a:lumOff val="25000"/>
+      </a:schemeClr>
+    </cs:fontRef>
+    <cs:defRPr sz="900" kern="1200"/>
+  </cs:dataLabel>
+  <cs:dataLabelCallout>
+    <cs:lnRef idx="0"/>
+    <cs:fillRef idx="0"/>
+    <cs:effectRef idx="0"/>
+    <cs:fontRef idx="minor">
+      <a:schemeClr val="dk1">
+        <a:lumMod val="65000"/>
+        <a:lumOff val="35000"/>
+      </a:schemeClr>
+    </cs:fontRef>
+    <cs:spPr>
+      <a:solidFill>
+        <a:schemeClr val="lt1"/>
+      </a:solidFill>
+      <a:ln>
+        <a:solidFill>
+          <a:schemeClr val="dk1">
+            <a:lumMod val="25000"/>
+            <a:lumOff val="75000"/>
+          </a:schemeClr>
+        </a:solidFill>
+      </a:ln>
+    </cs:spPr>
+    <cs:defRPr sz="900" kern="1200"/>
+    <cs:bodyPr rot="0" spcFirstLastPara="1" vertOverflow="clip" horzOverflow="clip" vert="horz" wrap="square" lIns="36576" tIns="18288" rIns="36576" bIns="18288" anchor="ctr" anchorCtr="1">
+      <a:spAutoFit/>
+    </cs:bodyPr>
+  </cs:dataLabelCallout>
+  <cs:dataPoint>
+    <cs:lnRef idx="0"/>
+    <cs:fillRef idx="1">
+      <cs:styleClr val="auto"/>
+    </cs:fillRef>
+    <cs:effectRef idx="0"/>
+    <cs:fontRef idx="minor">
+      <a:schemeClr val="tx1"/>
+    </cs:fontRef>
+  </cs:dataPoint>
+  <cs:dataPoint3D>
+    <cs:lnRef idx="0"/>
+    <cs:fillRef idx="1">
+      <cs:styleClr val="auto"/>
+    </cs:fillRef>
+    <cs:effectRef idx="0"/>
+    <cs:fontRef idx="minor">
+      <a:schemeClr val="tx1"/>
+    </cs:fontRef>
+  </cs:dataPoint3D>
+  <cs:dataPointLine>
+    <cs:lnRef idx="0">
+      <cs:styleClr val="auto"/>
+    </cs:lnRef>
+    <cs:fillRef idx="1"/>
+    <cs:effectRef idx="0"/>
+    <cs:fontRef idx="minor">
+      <a:schemeClr val="tx1"/>
+    </cs:fontRef>
+    <cs:spPr>
+      <a:ln w="28575" cap="rnd">
+        <a:solidFill>
+          <a:schemeClr val="phClr"/>
+        </a:solidFill>
+        <a:round/>
+      </a:ln>
+    </cs:spPr>
+  </cs:dataPointLine>
+  <cs:dataPointMarker>
+    <cs:lnRef idx="0">
+      <cs:styleClr val="auto"/>
+    </cs:lnRef>
+    <cs:fillRef idx="1">
+      <cs:styleClr val="auto"/>
+    </cs:fillRef>
+    <cs:effectRef idx="0"/>
+    <cs:fontRef idx="minor">
+      <a:schemeClr val="tx1"/>
+    </cs:fontRef>
+    <cs:spPr>
+      <a:ln w="9525">
+        <a:solidFill>
+          <a:schemeClr val="phClr"/>
+        </a:solidFill>
+      </a:ln>
+    </cs:spPr>
+  </cs:dataPointMarker>
+  <cs:dataPointMarkerLayout symbol="circle" size="5"/>
+  <cs:dataPointWireframe>
+    <cs:lnRef idx="0">
+      <cs:styleClr val="auto"/>
+    </cs:lnRef>
+    <cs:fillRef idx="1"/>
+    <cs:effectRef idx="0"/>
+    <cs:fontRef idx="minor">
+      <a:schemeClr val="tx1"/>
+    </cs:fontRef>
+    <cs:spPr>
+      <a:ln w="9525" cap="rnd">
+        <a:solidFill>
+          <a:schemeClr val="phClr"/>
+        </a:solidFill>
+        <a:round/>
+      </a:ln>
+    </cs:spPr>
+  </cs:dataPointWireframe>
+  <cs:dataTable>
+    <cs:lnRef idx="0"/>
+    <cs:fillRef idx="0"/>
+    <cs:effectRef idx="0"/>
+    <cs:fontRef idx="minor">
+      <a:schemeClr val="tx1">
+        <a:lumMod val="65000"/>
+        <a:lumOff val="35000"/>
+      </a:schemeClr>
+    </cs:fontRef>
+    <cs:spPr>
+      <a:noFill/>
+      <a:ln w="9525" cap="flat" cmpd="sng" algn="ctr">
+        <a:solidFill>
+          <a:schemeClr val="tx1">
+            <a:lumMod val="15000"/>
+            <a:lumOff val="85000"/>
+          </a:schemeClr>
+        </a:solidFill>
+        <a:round/>
+      </a:ln>
+    </cs:spPr>
+    <cs:defRPr sz="900" kern="1200"/>
+  </cs:dataTable>
+  <cs:downBar>
+    <cs:lnRef idx="0"/>
+    <cs:fillRef idx="0"/>
+    <cs:effectRef idx="0"/>
+    <cs:fontRef idx="minor">
+      <a:schemeClr val="dk1"/>
+    </cs:fontRef>
+    <cs:spPr>
+      <a:solidFill>
+        <a:schemeClr val="dk1">
+          <a:lumMod val="65000"/>
+          <a:lumOff val="35000"/>
+        </a:schemeClr>
+      </a:solidFill>
+      <a:ln w="9525">
+        <a:solidFill>
+          <a:schemeClr val="tx1">
+            <a:lumMod val="65000"/>
+            <a:lumOff val="35000"/>
+          </a:schemeClr>
+        </a:solidFill>
+      </a:ln>
+    </cs:spPr>
+  </cs:downBar>
+  <cs:dropLine>
+    <cs:lnRef idx="0"/>
+    <cs:fillRef idx="0"/>
+    <cs:effectRef idx="0"/>
+    <cs:fontRef idx="minor">
+      <a:schemeClr val="tx1"/>
+    </cs:fontRef>
+    <cs:spPr>
+      <a:ln w="9525" cap="flat" cmpd="sng" algn="ctr">
+        <a:solidFill>
+          <a:schemeClr val="tx1">
+            <a:lumMod val="35000"/>
+            <a:lumOff val="65000"/>
+          </a:schemeClr>
+        </a:solidFill>
+        <a:round/>
+      </a:ln>
+    </cs:spPr>
+  </cs:dropLine>
+  <cs:errorBar>
+    <cs:lnRef idx="0"/>
+    <cs:fillRef idx="0"/>
+    <cs:effectRef idx="0"/>
+    <cs:fontRef idx="minor">
+      <a:schemeClr val="tx1"/>
+    </cs:fontRef>
+    <cs:spPr>
+      <a:ln w="9525" cap="flat" cmpd="sng" algn="ctr">
+        <a:solidFill>
+          <a:schemeClr val="tx1">
+            <a:lumMod val="65000"/>
+            <a:lumOff val="35000"/>
+          </a:schemeClr>
+        </a:solidFill>
+        <a:round/>
+      </a:ln>
+    </cs:spPr>
+  </cs:errorBar>
+  <cs:floor>
+    <cs:lnRef idx="0"/>
+    <cs:fillRef idx="0"/>
+    <cs:effectRef idx="0"/>
+    <cs:fontRef idx="minor">
+      <a:schemeClr val="tx1"/>
+    </cs:fontRef>
+    <cs:spPr>
+      <a:noFill/>
+      <a:ln>
+        <a:noFill/>
+      </a:ln>
+    </cs:spPr>
+  </cs:floor>
+  <cs:gridlineMajor>
+    <cs:lnRef idx="0"/>
+    <cs:fillRef idx="0"/>
+    <cs:effectRef idx="0"/>
+    <cs:fontRef idx="minor">
+      <a:schemeClr val="tx1"/>
+    </cs:fontRef>
+    <cs:spPr>
+      <a:ln w="9525" cap="flat" cmpd="sng" algn="ctr">
+        <a:solidFill>
+          <a:schemeClr val="tx1">
+            <a:lumMod val="15000"/>
+            <a:lumOff val="85000"/>
+          </a:schemeClr>
+        </a:solidFill>
+        <a:round/>
+      </a:ln>
+    </cs:spPr>
+  </cs:gridlineMajor>
+  <cs:gridlineMinor>
+    <cs:lnRef idx="0"/>
+    <cs:fillRef idx="0"/>
+    <cs:effectRef idx="0"/>
+    <cs:fontRef idx="minor">
+      <a:schemeClr val="tx1"/>
+    </cs:fontRef>
+    <cs:spPr>
+      <a:ln w="9525" cap="flat" cmpd="sng" algn="ctr">
+        <a:solidFill>
+          <a:schemeClr val="tx1">
+            <a:lumMod val="5000"/>
+            <a:lumOff val="95000"/>
+          </a:schemeClr>
+        </a:solidFill>
+        <a:round/>
+      </a:ln>
+    </cs:spPr>
+  </cs:gridlineMinor>
+  <cs:hiLoLine>
+    <cs:lnRef idx="0"/>
+    <cs:fillRef idx="0"/>
+    <cs:effectRef idx="0"/>
+    <cs:fontRef idx="minor">
+      <a:schemeClr val="tx1"/>
+    </cs:fontRef>
+    <cs:spPr>
+      <a:ln w="9525" cap="flat" cmpd="sng" algn="ctr">
+        <a:solidFill>
+          <a:schemeClr val="tx1">
+            <a:lumMod val="75000"/>
+            <a:lumOff val="25000"/>
+          </a:schemeClr>
+        </a:solidFill>
+        <a:round/>
+      </a:ln>
+    </cs:spPr>
+  </cs:hiLoLine>
+  <cs:leaderLine>
+    <cs:lnRef idx="0"/>
+    <cs:fillRef idx="0"/>
+    <cs:effectRef idx="0"/>
+    <cs:fontRef idx="minor">
+      <a:schemeClr val="tx1"/>
+    </cs:fontRef>
+    <cs:spPr>
+      <a:ln w="9525" cap="flat" cmpd="sng" algn="ctr">
+        <a:solidFill>
+          <a:schemeClr val="tx1">
+            <a:lumMod val="35000"/>
+            <a:lumOff val="65000"/>
+          </a:schemeClr>
+        </a:solidFill>
+        <a:round/>
+      </a:ln>
+    </cs:spPr>
+  </cs:leaderLine>
+  <cs:legend>
+    <cs:lnRef idx="0"/>
+    <cs:fillRef idx="0"/>
+    <cs:effectRef idx="0"/>
+    <cs:fontRef idx="minor">
+      <a:schemeClr val="tx1">
+        <a:lumMod val="65000"/>
+        <a:lumOff val="35000"/>
+      </a:schemeClr>
+    </cs:fontRef>
+    <cs:defRPr sz="900" kern="1200"/>
+  </cs:legend>
+  <cs:plotArea mods="allowNoFillOverride allowNoLineOverride">
+    <cs:lnRef idx="0"/>
+    <cs:fillRef idx="0"/>
+    <cs:effectRef idx="0"/>
+    <cs:fontRef idx="minor">
+      <a:schemeClr val="tx1"/>
+    </cs:fontRef>
+  </cs:plotArea>
+  <cs:plotArea3D mods="allowNoFillOverride allowNoLineOverride">
+    <cs:lnRef idx="0"/>
+    <cs:fillRef idx="0"/>
+    <cs:effectRef idx="0"/>
+    <cs:fontRef idx="minor">
+      <a:schemeClr val="tx1"/>
+    </cs:fontRef>
+  </cs:plotArea3D>
+  <cs:seriesAxis>
+    <cs:lnRef idx="0"/>
+    <cs:fillRef idx="0"/>
+    <cs:effectRef idx="0"/>
+    <cs:fontRef idx="minor">
+      <a:schemeClr val="tx1">
+        <a:lumMod val="65000"/>
+        <a:lumOff val="35000"/>
+      </a:schemeClr>
+    </cs:fontRef>
+    <cs:defRPr sz="900" kern="1200"/>
+  </cs:seriesAxis>
+  <cs:seriesLine>
+    <cs:lnRef idx="0"/>
+    <cs:fillRef idx="0"/>
+    <cs:effectRef idx="0"/>
+    <cs:fontRef idx="minor">
+      <a:schemeClr val="tx1"/>
+    </cs:fontRef>
+    <cs:spPr>
+      <a:ln w="9525" cap="flat" cmpd="sng" algn="ctr">
+        <a:solidFill>
+          <a:schemeClr val="tx1">
+            <a:lumMod val="35000"/>
+            <a:lumOff val="65000"/>
+          </a:schemeClr>
+        </a:solidFill>
+        <a:round/>
+      </a:ln>
+    </cs:spPr>
+  </cs:seriesLine>
+  <cs:title>
+    <cs:lnRef idx="0"/>
+    <cs:fillRef idx="0"/>
+    <cs:effectRef idx="0"/>
+    <cs:fontRef idx="minor">
+      <a:schemeClr val="tx1">
+        <a:lumMod val="65000"/>
+        <a:lumOff val="35000"/>
+      </a:schemeClr>
+    </cs:fontRef>
+    <cs:defRPr sz="1400" b="0" kern="1200" spc="0" baseline="0"/>
+  </cs:title>
+  <cs:trendline>
+    <cs:lnRef idx="0">
+      <cs:styleClr val="auto"/>
+    </cs:lnRef>
+    <cs:fillRef idx="0"/>
+    <cs:effectRef idx="0"/>
+    <cs:fontRef idx="minor">
+      <a:schemeClr val="tx1"/>
+    </cs:fontRef>
+    <cs:spPr>
+      <a:ln w="19050" cap="rnd">
+        <a:solidFill>
+          <a:schemeClr val="phClr"/>
+        </a:solidFill>
+        <a:prstDash val="sysDot"/>
+      </a:ln>
+    </cs:spPr>
+  </cs:trendline>
+  <cs:trendlineLabel>
+    <cs:lnRef idx="0"/>
+    <cs:fillRef idx="0"/>
+    <cs:effectRef idx="0"/>
+    <cs:fontRef idx="minor">
+      <a:schemeClr val="tx1">
+        <a:lumMod val="65000"/>
+        <a:lumOff val="35000"/>
+      </a:schemeClr>
+    </cs:fontRef>
+    <cs:defRPr sz="900" kern="1200"/>
+  </cs:trendlineLabel>
+  <cs:upBar>
+    <cs:lnRef idx="0"/>
+    <cs:fillRef idx="0"/>
+    <cs:effectRef idx="0"/>
+    <cs:fontRef idx="minor">
+      <a:schemeClr val="dk1"/>
+    </cs:fontRef>
+    <cs:spPr>
+      <a:solidFill>
+        <a:schemeClr val="lt1"/>
+      </a:solidFill>
+      <a:ln w="9525">
+        <a:solidFill>
+          <a:schemeClr val="tx1">
+            <a:lumMod val="15000"/>
+            <a:lumOff val="85000"/>
+          </a:schemeClr>
+        </a:solidFill>
+      </a:ln>
+    </cs:spPr>
+  </cs:upBar>
+  <cs:valueAxis>
+    <cs:lnRef idx="0"/>
+    <cs:fillRef idx="0"/>
+    <cs:effectRef idx="0"/>
+    <cs:fontRef idx="minor">
+      <a:schemeClr val="tx1">
+        <a:lumMod val="65000"/>
+        <a:lumOff val="35000"/>
+      </a:schemeClr>
+    </cs:fontRef>
+    <cs:defRPr sz="900" kern="1200"/>
+  </cs:valueAxis>
+  <cs:wall>
+    <cs:lnRef idx="0"/>
+    <cs:fillRef idx="0"/>
+    <cs:effectRef idx="0"/>
+    <cs:fontRef idx="minor">
+      <a:schemeClr val="tx1"/>
+    </cs:fontRef>
+    <cs:spPr>
+      <a:noFill/>
+      <a:ln>
+        <a:noFill/>
+      </a:ln>
+    </cs:spPr>
+  </cs:wall>
+</cs:chartStyle>
+</file>
+
+<file path=ppt/charts/style2.xml><?xml version="1.0" encoding="utf-8"?>
+<cs:chartStyle xmlns:cs="http://schemas.microsoft.com/office/drawing/2012/chartStyle" xmlns:a="http://schemas.openxmlformats.org/drawingml/2006/main" id="201">
+  <cs:axisTitle>
+    <cs:lnRef idx="0"/>
+    <cs:fillRef idx="0"/>
+    <cs:effectRef idx="0"/>
+    <cs:fontRef idx="minor">
+      <a:schemeClr val="tx1">
+        <a:lumMod val="65000"/>
+        <a:lumOff val="35000"/>
+      </a:schemeClr>
+    </cs:fontRef>
+    <cs:defRPr sz="1000" kern="1200"/>
+  </cs:axisTitle>
+  <cs:categoryAxis>
+    <cs:lnRef idx="0"/>
+    <cs:fillRef idx="0"/>
+    <cs:effectRef idx="0"/>
+    <cs:fontRef idx="minor">
+      <a:schemeClr val="tx1">
+        <a:lumMod val="65000"/>
+        <a:lumOff val="35000"/>
+      </a:schemeClr>
+    </cs:fontRef>
+    <cs:spPr>
+      <a:ln w="9525" cap="flat" cmpd="sng" algn="ctr">
+        <a:solidFill>
+          <a:schemeClr val="tx1">
+            <a:lumMod val="15000"/>
+            <a:lumOff val="85000"/>
+          </a:schemeClr>
+        </a:solidFill>
+        <a:round/>
+      </a:ln>
+    </cs:spPr>
+    <cs:defRPr sz="900" kern="1200"/>
+  </cs:categoryAxis>
+  <cs:chartArea mods="allowNoFillOverride allowNoLineOverride">
+    <cs:lnRef idx="0"/>
+    <cs:fillRef idx="0"/>
+    <cs:effectRef idx="0"/>
+    <cs:fontRef idx="minor">
+      <a:schemeClr val="tx1"/>
+    </cs:fontRef>
+    <cs:spPr>
+      <a:solidFill>
+        <a:schemeClr val="bg1"/>
+      </a:solidFill>
+      <a:ln w="9525" cap="flat" cmpd="sng" algn="ctr">
+        <a:solidFill>
+          <a:schemeClr val="tx1">
+            <a:lumMod val="15000"/>
+            <a:lumOff val="85000"/>
+          </a:schemeClr>
+        </a:solidFill>
+        <a:round/>
+      </a:ln>
+    </cs:spPr>
+    <cs:defRPr sz="1000" kern="1200"/>
+  </cs:chartArea>
+  <cs:dataLabel>
+    <cs:lnRef idx="0"/>
+    <cs:fillRef idx="0"/>
+    <cs:effectRef idx="0"/>
+    <cs:fontRef idx="minor">
+      <a:schemeClr val="tx1">
+        <a:lumMod val="75000"/>
+        <a:lumOff val="25000"/>
+      </a:schemeClr>
+    </cs:fontRef>
+    <cs:defRPr sz="900" kern="1200"/>
+  </cs:dataLabel>
+  <cs:dataLabelCallout>
+    <cs:lnRef idx="0"/>
+    <cs:fillRef idx="0"/>
+    <cs:effectRef idx="0"/>
+    <cs:fontRef idx="minor">
+      <a:schemeClr val="dk1">
+        <a:lumMod val="65000"/>
+        <a:lumOff val="35000"/>
+      </a:schemeClr>
+    </cs:fontRef>
+    <cs:spPr>
+      <a:solidFill>
+        <a:schemeClr val="lt1"/>
+      </a:solidFill>
+      <a:ln>
+        <a:solidFill>
+          <a:schemeClr val="dk1">
+            <a:lumMod val="25000"/>
+            <a:lumOff val="75000"/>
+          </a:schemeClr>
+        </a:solidFill>
+      </a:ln>
+    </cs:spPr>
+    <cs:defRPr sz="900" kern="1200"/>
+    <cs:bodyPr rot="0" spcFirstLastPara="1" vertOverflow="clip" horzOverflow="clip" vert="horz" wrap="square" lIns="36576" tIns="18288" rIns="36576" bIns="18288" anchor="ctr" anchorCtr="1">
+      <a:spAutoFit/>
+    </cs:bodyPr>
+  </cs:dataLabelCallout>
+  <cs:dataPoint>
+    <cs:lnRef idx="0"/>
+    <cs:fillRef idx="1">
+      <cs:styleClr val="auto"/>
+    </cs:fillRef>
+    <cs:effectRef idx="0"/>
+    <cs:fontRef idx="minor">
+      <a:schemeClr val="tx1"/>
+    </cs:fontRef>
+  </cs:dataPoint>
+  <cs:dataPoint3D>
+    <cs:lnRef idx="0"/>
+    <cs:fillRef idx="1">
+      <cs:styleClr val="auto"/>
+    </cs:fillRef>
+    <cs:effectRef idx="0"/>
+    <cs:fontRef idx="minor">
+      <a:schemeClr val="tx1"/>
+    </cs:fontRef>
+  </cs:dataPoint3D>
+  <cs:dataPointLine>
+    <cs:lnRef idx="0">
+      <cs:styleClr val="auto"/>
+    </cs:lnRef>
+    <cs:fillRef idx="1"/>
+    <cs:effectRef idx="0"/>
+    <cs:fontRef idx="minor">
+      <a:schemeClr val="tx1"/>
+    </cs:fontRef>
+    <cs:spPr>
+      <a:ln w="28575" cap="rnd">
+        <a:solidFill>
+          <a:schemeClr val="phClr"/>
+        </a:solidFill>
+        <a:round/>
+      </a:ln>
+    </cs:spPr>
+  </cs:dataPointLine>
+  <cs:dataPointMarker>
+    <cs:lnRef idx="0">
+      <cs:styleClr val="auto"/>
+    </cs:lnRef>
+    <cs:fillRef idx="1">
+      <cs:styleClr val="auto"/>
+    </cs:fillRef>
+    <cs:effectRef idx="0"/>
+    <cs:fontRef idx="minor">
+      <a:schemeClr val="tx1"/>
+    </cs:fontRef>
+    <cs:spPr>
+      <a:ln w="9525">
+        <a:solidFill>
+          <a:schemeClr val="phClr"/>
+        </a:solidFill>
+      </a:ln>
+    </cs:spPr>
+  </cs:dataPointMarker>
+  <cs:dataPointMarkerLayout symbol="circle" size="5"/>
+  <cs:dataPointWireframe>
+    <cs:lnRef idx="0">
+      <cs:styleClr val="auto"/>
+    </cs:lnRef>
+    <cs:fillRef idx="1"/>
+    <cs:effectRef idx="0"/>
+    <cs:fontRef idx="minor">
+      <a:schemeClr val="tx1"/>
+    </cs:fontRef>
+    <cs:spPr>
+      <a:ln w="9525" cap="rnd">
+        <a:solidFill>
+          <a:schemeClr val="phClr"/>
+        </a:solidFill>
+        <a:round/>
+      </a:ln>
+    </cs:spPr>
+  </cs:dataPointWireframe>
+  <cs:dataTable>
+    <cs:lnRef idx="0"/>
+    <cs:fillRef idx="0"/>
+    <cs:effectRef idx="0"/>
+    <cs:fontRef idx="minor">
+      <a:schemeClr val="tx1">
+        <a:lumMod val="65000"/>
+        <a:lumOff val="35000"/>
+      </a:schemeClr>
+    </cs:fontRef>
+    <cs:spPr>
+      <a:noFill/>
+      <a:ln w="9525" cap="flat" cmpd="sng" algn="ctr">
+        <a:solidFill>
+          <a:schemeClr val="tx1">
+            <a:lumMod val="15000"/>
+            <a:lumOff val="85000"/>
+          </a:schemeClr>
+        </a:solidFill>
+        <a:round/>
+      </a:ln>
+    </cs:spPr>
+    <cs:defRPr sz="900" kern="1200"/>
+  </cs:dataTable>
+  <cs:downBar>
+    <cs:lnRef idx="0"/>
+    <cs:fillRef idx="0"/>
+    <cs:effectRef idx="0"/>
+    <cs:fontRef idx="minor">
+      <a:schemeClr val="dk1"/>
+    </cs:fontRef>
+    <cs:spPr>
+      <a:solidFill>
+        <a:schemeClr val="dk1">
+          <a:lumMod val="65000"/>
+          <a:lumOff val="35000"/>
+        </a:schemeClr>
+      </a:solidFill>
+      <a:ln w="9525">
+        <a:solidFill>
+          <a:schemeClr val="tx1">
+            <a:lumMod val="65000"/>
+            <a:lumOff val="35000"/>
+          </a:schemeClr>
+        </a:solidFill>
+      </a:ln>
+    </cs:spPr>
+  </cs:downBar>
+  <cs:dropLine>
+    <cs:lnRef idx="0"/>
+    <cs:fillRef idx="0"/>
+    <cs:effectRef idx="0"/>
+    <cs:fontRef idx="minor">
+      <a:schemeClr val="tx1"/>
+    </cs:fontRef>
+    <cs:spPr>
+      <a:ln w="9525" cap="flat" cmpd="sng" algn="ctr">
+        <a:solidFill>
+          <a:schemeClr val="tx1">
+            <a:lumMod val="35000"/>
+            <a:lumOff val="65000"/>
+          </a:schemeClr>
+        </a:solidFill>
+        <a:round/>
+      </a:ln>
+    </cs:spPr>
+  </cs:dropLine>
+  <cs:errorBar>
+    <cs:lnRef idx="0"/>
+    <cs:fillRef idx="0"/>
+    <cs:effectRef idx="0"/>
+    <cs:fontRef idx="minor">
+      <a:schemeClr val="tx1"/>
+    </cs:fontRef>
+    <cs:spPr>
+      <a:ln w="9525" cap="flat" cmpd="sng" algn="ctr">
+        <a:solidFill>
+          <a:schemeClr val="tx1">
+            <a:lumMod val="65000"/>
+            <a:lumOff val="35000"/>
+          </a:schemeClr>
+        </a:solidFill>
+        <a:round/>
+      </a:ln>
+    </cs:spPr>
+  </cs:errorBar>
+  <cs:floor>
+    <cs:lnRef idx="0"/>
+    <cs:fillRef idx="0"/>
+    <cs:effectRef idx="0"/>
+    <cs:fontRef idx="minor">
+      <a:schemeClr val="tx1"/>
+    </cs:fontRef>
+    <cs:spPr>
+      <a:noFill/>
+      <a:ln>
+        <a:noFill/>
+      </a:ln>
+    </cs:spPr>
+  </cs:floor>
+  <cs:gridlineMajor>
+    <cs:lnRef idx="0"/>
+    <cs:fillRef idx="0"/>
+    <cs:effectRef idx="0"/>
+    <cs:fontRef idx="minor">
+      <a:schemeClr val="tx1"/>
+    </cs:fontRef>
+    <cs:spPr>
+      <a:ln w="9525" cap="flat" cmpd="sng" algn="ctr">
+        <a:solidFill>
+          <a:schemeClr val="tx1">
+            <a:lumMod val="15000"/>
+            <a:lumOff val="85000"/>
+          </a:schemeClr>
+        </a:solidFill>
+        <a:round/>
+      </a:ln>
+    </cs:spPr>
+  </cs:gridlineMajor>
+  <cs:gridlineMinor>
+    <cs:lnRef idx="0"/>
+    <cs:fillRef idx="0"/>
+    <cs:effectRef idx="0"/>
+    <cs:fontRef idx="minor">
+      <a:schemeClr val="tx1"/>
+    </cs:fontRef>
+    <cs:spPr>
+      <a:ln w="9525" cap="flat" cmpd="sng" algn="ctr">
+        <a:solidFill>
+          <a:schemeClr val="tx1">
+            <a:lumMod val="5000"/>
+            <a:lumOff val="95000"/>
+          </a:schemeClr>
+        </a:solidFill>
+        <a:round/>
+      </a:ln>
+    </cs:spPr>
+  </cs:gridlineMinor>
+  <cs:hiLoLine>
+    <cs:lnRef idx="0"/>
+    <cs:fillRef idx="0"/>
+    <cs:effectRef idx="0"/>
+    <cs:fontRef idx="minor">
+      <a:schemeClr val="tx1"/>
+    </cs:fontRef>
+    <cs:spPr>
+      <a:ln w="9525" cap="flat" cmpd="sng" algn="ctr">
+        <a:solidFill>
+          <a:schemeClr val="tx1">
+            <a:lumMod val="75000"/>
+            <a:lumOff val="25000"/>
+          </a:schemeClr>
+        </a:solidFill>
+        <a:round/>
+      </a:ln>
+    </cs:spPr>
+  </cs:hiLoLine>
+  <cs:leaderLine>
+    <cs:lnRef idx="0"/>
+    <cs:fillRef idx="0"/>
+    <cs:effectRef idx="0"/>
+    <cs:fontRef idx="minor">
+      <a:schemeClr val="tx1"/>
+    </cs:fontRef>
+    <cs:spPr>
+      <a:ln w="9525" cap="flat" cmpd="sng" algn="ctr">
+        <a:solidFill>
+          <a:schemeClr val="tx1">
+            <a:lumMod val="35000"/>
+            <a:lumOff val="65000"/>
+          </a:schemeClr>
+        </a:solidFill>
+        <a:round/>
+      </a:ln>
+    </cs:spPr>
+  </cs:leaderLine>
+  <cs:legend>
+    <cs:lnRef idx="0"/>
+    <cs:fillRef idx="0"/>
+    <cs:effectRef idx="0"/>
+    <cs:fontRef idx="minor">
+      <a:schemeClr val="tx1">
+        <a:lumMod val="65000"/>
+        <a:lumOff val="35000"/>
+      </a:schemeClr>
+    </cs:fontRef>
+    <cs:defRPr sz="900" kern="1200"/>
+  </cs:legend>
+  <cs:plotArea mods="allowNoFillOverride allowNoLineOverride">
+    <cs:lnRef idx="0"/>
+    <cs:fillRef idx="0"/>
+    <cs:effectRef idx="0"/>
+    <cs:fontRef idx="minor">
+      <a:schemeClr val="tx1"/>
+    </cs:fontRef>
+  </cs:plotArea>
+  <cs:plotArea3D mods="allowNoFillOverride allowNoLineOverride">
+    <cs:lnRef idx="0"/>
+    <cs:fillRef idx="0"/>
+    <cs:effectRef idx="0"/>
+    <cs:fontRef idx="minor">
+      <a:schemeClr val="tx1"/>
+    </cs:fontRef>
+  </cs:plotArea3D>
+  <cs:seriesAxis>
+    <cs:lnRef idx="0"/>
+    <cs:fillRef idx="0"/>
+    <cs:effectRef idx="0"/>
+    <cs:fontRef idx="minor">
+      <a:schemeClr val="tx1">
+        <a:lumMod val="65000"/>
+        <a:lumOff val="35000"/>
+      </a:schemeClr>
+    </cs:fontRef>
+    <cs:defRPr sz="900" kern="1200"/>
+  </cs:seriesAxis>
+  <cs:seriesLine>
+    <cs:lnRef idx="0"/>
+    <cs:fillRef idx="0"/>
+    <cs:effectRef idx="0"/>
+    <cs:fontRef idx="minor">
+      <a:schemeClr val="tx1"/>
+    </cs:fontRef>
+    <cs:spPr>
+      <a:ln w="9525" cap="flat" cmpd="sng" algn="ctr">
+        <a:solidFill>
+          <a:schemeClr val="tx1">
+            <a:lumMod val="35000"/>
+            <a:lumOff val="65000"/>
+          </a:schemeClr>
+        </a:solidFill>
+        <a:round/>
+      </a:ln>
+    </cs:spPr>
+  </cs:seriesLine>
+  <cs:title>
+    <cs:lnRef idx="0"/>
+    <cs:fillRef idx="0"/>
+    <cs:effectRef idx="0"/>
+    <cs:fontRef idx="minor">
+      <a:schemeClr val="tx1">
+        <a:lumMod val="65000"/>
+        <a:lumOff val="35000"/>
+      </a:schemeClr>
+    </cs:fontRef>
+    <cs:defRPr sz="1400" b="0" kern="1200" spc="0" baseline="0"/>
+  </cs:title>
+  <cs:trendline>
+    <cs:lnRef idx="0">
+      <cs:styleClr val="auto"/>
+    </cs:lnRef>
+    <cs:fillRef idx="0"/>
+    <cs:effectRef idx="0"/>
+    <cs:fontRef idx="minor">
+      <a:schemeClr val="tx1"/>
+    </cs:fontRef>
+    <cs:spPr>
+      <a:ln w="19050" cap="rnd">
+        <a:solidFill>
+          <a:schemeClr val="phClr"/>
+        </a:solidFill>
+        <a:prstDash val="sysDot"/>
+      </a:ln>
+    </cs:spPr>
+  </cs:trendline>
+  <cs:trendlineLabel>
+    <cs:lnRef idx="0"/>
+    <cs:fillRef idx="0"/>
+    <cs:effectRef idx="0"/>
+    <cs:fontRef idx="minor">
+      <a:schemeClr val="tx1">
+        <a:lumMod val="65000"/>
+        <a:lumOff val="35000"/>
+      </a:schemeClr>
+    </cs:fontRef>
+    <cs:defRPr sz="900" kern="1200"/>
+  </cs:trendlineLabel>
+  <cs:upBar>
+    <cs:lnRef idx="0"/>
+    <cs:fillRef idx="0"/>
+    <cs:effectRef idx="0"/>
+    <cs:fontRef idx="minor">
+      <a:schemeClr val="dk1"/>
+    </cs:fontRef>
+    <cs:spPr>
+      <a:solidFill>
+        <a:schemeClr val="lt1"/>
+      </a:solidFill>
+      <a:ln w="9525">
+        <a:solidFill>
+          <a:schemeClr val="tx1">
+            <a:lumMod val="15000"/>
+            <a:lumOff val="85000"/>
+          </a:schemeClr>
+        </a:solidFill>
+      </a:ln>
+    </cs:spPr>
+  </cs:upBar>
+  <cs:valueAxis>
+    <cs:lnRef idx="0"/>
+    <cs:fillRef idx="0"/>
+    <cs:effectRef idx="0"/>
+    <cs:fontRef idx="minor">
+      <a:schemeClr val="tx1">
+        <a:lumMod val="65000"/>
+        <a:lumOff val="35000"/>
+      </a:schemeClr>
+    </cs:fontRef>
+    <cs:defRPr sz="900" kern="1200"/>
+  </cs:valueAxis>
+  <cs:wall>
+    <cs:lnRef idx="0"/>
+    <cs:fillRef idx="0"/>
+    <cs:effectRef idx="0"/>
+    <cs:fontRef idx="minor">
+      <a:schemeClr val="tx1"/>
+    </cs:fontRef>
+    <cs:spPr>
+      <a:noFill/>
+      <a:ln>
+        <a:noFill/>
+      </a:ln>
+    </cs:spPr>
+  </cs:wall>
+</cs:chartStyle>
+</file>
+
 <file path=ppt/slideLayouts/slideLayout1.xml><?xml version="1.0" encoding="utf-8"?>
 <p:sldLayout xmlns:a="http://schemas.openxmlformats.org/drawingml/2006/main" xmlns:r="http://schemas.openxmlformats.org/officeDocument/2006/relationships" xmlns:p="http://schemas.openxmlformats.org/presentationml/2006/main" showMasterPhAnim="0" type="title" preserve="1" userDrawn="1">
   <p:cSld name="Title Slide">
@@ -286,7 +2502,7 @@
             </a:pPr>
             <a:fld id="{5487DD6D-3B3D-41F0-9E3F-0C2163E813E3}" type="datetimeFigureOut">
               <a:rPr lang="en-US"/>
-              <a:t>3/31/2023</a:t>
+              <a:t>4/7/2023</a:t>
             </a:fld>
             <a:endParaRPr lang="en-US"/>
           </a:p>
@@ -477,7 +2693,7 @@
             </a:pPr>
             <a:fld id="{5487DD6D-3B3D-41F0-9E3F-0C2163E813E3}" type="datetimeFigureOut">
               <a:rPr lang="en-US"/>
-              <a:t>3/31/2023</a:t>
+              <a:t>4/7/2023</a:t>
             </a:fld>
             <a:endParaRPr lang="en-US"/>
           </a:p>
@@ -678,7 +2894,7 @@
             </a:pPr>
             <a:fld id="{5487DD6D-3B3D-41F0-9E3F-0C2163E813E3}" type="datetimeFigureOut">
               <a:rPr lang="en-US"/>
-              <a:t>3/31/2023</a:t>
+              <a:t>4/7/2023</a:t>
             </a:fld>
             <a:endParaRPr lang="en-US"/>
           </a:p>
@@ -869,7 +3085,7 @@
             </a:pPr>
             <a:fld id="{5487DD6D-3B3D-41F0-9E3F-0C2163E813E3}" type="datetimeFigureOut">
               <a:rPr lang="en-US"/>
-              <a:t>3/31/2023</a:t>
+              <a:t>4/7/2023</a:t>
             </a:fld>
             <a:endParaRPr lang="en-US"/>
           </a:p>
@@ -1125,7 +3341,7 @@
             </a:pPr>
             <a:fld id="{5487DD6D-3B3D-41F0-9E3F-0C2163E813E3}" type="datetimeFigureOut">
               <a:rPr lang="en-US"/>
-              <a:t>3/31/2023</a:t>
+              <a:t>4/7/2023</a:t>
             </a:fld>
             <a:endParaRPr lang="en-US"/>
           </a:p>
@@ -1392,7 +3608,7 @@
             </a:pPr>
             <a:fld id="{5487DD6D-3B3D-41F0-9E3F-0C2163E813E3}" type="datetimeFigureOut">
               <a:rPr lang="en-US"/>
-              <a:t>3/31/2023</a:t>
+              <a:t>4/7/2023</a:t>
             </a:fld>
             <a:endParaRPr lang="en-US"/>
           </a:p>
@@ -1800,7 +4016,7 @@
             </a:pPr>
             <a:fld id="{5487DD6D-3B3D-41F0-9E3F-0C2163E813E3}" type="datetimeFigureOut">
               <a:rPr lang="en-US"/>
-              <a:t>3/31/2023</a:t>
+              <a:t>4/7/2023</a:t>
             </a:fld>
             <a:endParaRPr lang="en-US"/>
           </a:p>
@@ -1925,7 +4141,7 @@
             </a:pPr>
             <a:fld id="{5487DD6D-3B3D-41F0-9E3F-0C2163E813E3}" type="datetimeFigureOut">
               <a:rPr lang="en-US"/>
-              <a:t>3/31/2023</a:t>
+              <a:t>4/7/2023</a:t>
             </a:fld>
             <a:endParaRPr lang="en-US"/>
           </a:p>
@@ -2024,7 +4240,7 @@
             </a:pPr>
             <a:fld id="{5487DD6D-3B3D-41F0-9E3F-0C2163E813E3}" type="datetimeFigureOut">
               <a:rPr lang="en-US"/>
-              <a:t>3/31/2023</a:t>
+              <a:t>4/7/2023</a:t>
             </a:fld>
             <a:endParaRPr lang="en-US"/>
           </a:p>
@@ -2325,7 +4541,7 @@
             </a:pPr>
             <a:fld id="{5487DD6D-3B3D-41F0-9E3F-0C2163E813E3}" type="datetimeFigureOut">
               <a:rPr lang="en-US"/>
-              <a:t>3/31/2023</a:t>
+              <a:t>4/7/2023</a:t>
             </a:fld>
             <a:endParaRPr lang="en-US"/>
           </a:p>
@@ -2591,7 +4807,7 @@
             </a:pPr>
             <a:fld id="{5487DD6D-3B3D-41F0-9E3F-0C2163E813E3}" type="datetimeFigureOut">
               <a:rPr lang="en-US"/>
-              <a:t>3/31/2023</a:t>
+              <a:t>4/7/2023</a:t>
             </a:fld>
             <a:endParaRPr lang="en-US"/>
           </a:p>
@@ -2825,7 +5041,7 @@
             </a:pPr>
             <a:fld id="{5487DD6D-3B3D-41F0-9E3F-0C2163E813E3}" type="datetimeFigureOut">
               <a:rPr lang="en-US"/>
-              <a:t>3/31/2023</a:t>
+              <a:t>4/7/2023</a:t>
             </a:fld>
             <a:endParaRPr lang="en-US"/>
           </a:p>
@@ -5870,6 +8086,171 @@
 </p:sld>
 </file>
 
+<file path=ppt/slides/slide25.xml><?xml version="1.0" encoding="utf-8"?>
+<p:sld xmlns:a="http://schemas.openxmlformats.org/drawingml/2006/main" xmlns:r="http://schemas.openxmlformats.org/officeDocument/2006/relationships" xmlns:p="http://schemas.openxmlformats.org/presentationml/2006/main">
+  <p:cSld>
+    <p:spTree>
+      <p:nvGrpSpPr>
+        <p:cNvPr id="1" name=""/>
+        <p:cNvGrpSpPr/>
+        <p:nvPr/>
+      </p:nvGrpSpPr>
+      <p:grpSpPr>
+        <a:xfrm>
+          <a:off x="0" y="0"/>
+          <a:ext cx="0" cy="0"/>
+          <a:chOff x="0" y="0"/>
+          <a:chExt cx="0" cy="0"/>
+        </a:xfrm>
+      </p:grpSpPr>
+      <p:sp>
+        <p:nvSpPr>
+          <p:cNvPr id="2" name="Title 1">
+            <a:extLst>
+              <a:ext uri="{FF2B5EF4-FFF2-40B4-BE49-F238E27FC236}">
+                <a16:creationId xmlns:a16="http://schemas.microsoft.com/office/drawing/2014/main" id="{74CE2894-08F6-7D2A-E699-8962153F8F4A}"/>
+              </a:ext>
+            </a:extLst>
+          </p:cNvPr>
+          <p:cNvSpPr>
+            <a:spLocks noGrp="1"/>
+          </p:cNvSpPr>
+          <p:nvPr>
+            <p:ph type="title"/>
+          </p:nvPr>
+        </p:nvSpPr>
+        <p:spPr/>
+        <p:txBody>
+          <a:bodyPr/>
+          <a:lstStyle/>
+          <a:p>
+            <a:r>
+              <a:rPr lang="en-US"/>
+              <a:t>No cross validation</a:t>
+            </a:r>
+          </a:p>
+        </p:txBody>
+      </p:sp>
+      <p:graphicFrame>
+        <p:nvGraphicFramePr>
+          <p:cNvPr id="4" name="Content Placeholder 3">
+            <a:extLst>
+              <a:ext uri="{FF2B5EF4-FFF2-40B4-BE49-F238E27FC236}">
+                <a16:creationId xmlns:a16="http://schemas.microsoft.com/office/drawing/2014/main" id="{CD2AD0F6-8E9E-4FC1-AAB6-B9AF9516D43E}"/>
+              </a:ext>
+            </a:extLst>
+          </p:cNvPr>
+          <p:cNvGraphicFramePr>
+            <a:graphicFrameLocks noGrp="1"/>
+          </p:cNvGraphicFramePr>
+          <p:nvPr>
+            <p:ph idx="1"/>
+          </p:nvPr>
+        </p:nvGraphicFramePr>
+        <p:xfrm>
+          <a:off x="838200" y="1825625"/>
+          <a:ext cx="10515600" cy="4351338"/>
+        </p:xfrm>
+        <a:graphic>
+          <a:graphicData uri="http://schemas.openxmlformats.org/drawingml/2006/chart">
+            <c:chart xmlns:c="http://schemas.openxmlformats.org/drawingml/2006/chart" xmlns:r="http://schemas.openxmlformats.org/officeDocument/2006/relationships" r:id="rId2"/>
+          </a:graphicData>
+        </a:graphic>
+      </p:graphicFrame>
+    </p:spTree>
+    <p:extLst>
+      <p:ext uri="{BB962C8B-B14F-4D97-AF65-F5344CB8AC3E}">
+        <p14:creationId xmlns:p14="http://schemas.microsoft.com/office/powerpoint/2010/main" val="3730574304"/>
+      </p:ext>
+    </p:extLst>
+  </p:cSld>
+  <p:clrMapOvr>
+    <a:masterClrMapping/>
+  </p:clrMapOvr>
+</p:sld>
+</file>
+
+<file path=ppt/slides/slide26.xml><?xml version="1.0" encoding="utf-8"?>
+<p:sld xmlns:a="http://schemas.openxmlformats.org/drawingml/2006/main" xmlns:r="http://schemas.openxmlformats.org/officeDocument/2006/relationships" xmlns:p="http://schemas.openxmlformats.org/presentationml/2006/main">
+  <p:cSld>
+    <p:spTree>
+      <p:nvGrpSpPr>
+        <p:cNvPr id="1" name=""/>
+        <p:cNvGrpSpPr/>
+        <p:nvPr/>
+      </p:nvGrpSpPr>
+      <p:grpSpPr>
+        <a:xfrm>
+          <a:off x="0" y="0"/>
+          <a:ext cx="0" cy="0"/>
+          <a:chOff x="0" y="0"/>
+          <a:chExt cx="0" cy="0"/>
+        </a:xfrm>
+      </p:grpSpPr>
+      <p:sp>
+        <p:nvSpPr>
+          <p:cNvPr id="2" name="Title 1">
+            <a:extLst>
+              <a:ext uri="{FF2B5EF4-FFF2-40B4-BE49-F238E27FC236}">
+                <a16:creationId xmlns:a16="http://schemas.microsoft.com/office/drawing/2014/main" id="{C773B687-5BAF-3E72-DD9D-0024A67D5391}"/>
+              </a:ext>
+            </a:extLst>
+          </p:cNvPr>
+          <p:cNvSpPr>
+            <a:spLocks noGrp="1"/>
+          </p:cNvSpPr>
+          <p:nvPr>
+            <p:ph type="title"/>
+          </p:nvPr>
+        </p:nvSpPr>
+        <p:spPr/>
+        <p:txBody>
+          <a:bodyPr/>
+          <a:lstStyle/>
+          <a:p>
+            <a:endParaRPr lang="en-US"/>
+          </a:p>
+        </p:txBody>
+      </p:sp>
+      <p:graphicFrame>
+        <p:nvGraphicFramePr>
+          <p:cNvPr id="6" name="Content Placeholder 5">
+            <a:extLst>
+              <a:ext uri="{FF2B5EF4-FFF2-40B4-BE49-F238E27FC236}">
+                <a16:creationId xmlns:a16="http://schemas.microsoft.com/office/drawing/2014/main" id="{29F431DF-994E-357D-1997-40C62CFDC064}"/>
+              </a:ext>
+            </a:extLst>
+          </p:cNvPr>
+          <p:cNvGraphicFramePr>
+            <a:graphicFrameLocks noGrp="1"/>
+          </p:cNvGraphicFramePr>
+          <p:nvPr>
+            <p:ph idx="1"/>
+          </p:nvPr>
+        </p:nvGraphicFramePr>
+        <p:xfrm>
+          <a:off x="838200" y="1825625"/>
+          <a:ext cx="10515600" cy="4351338"/>
+        </p:xfrm>
+        <a:graphic>
+          <a:graphicData uri="http://schemas.openxmlformats.org/drawingml/2006/chart">
+            <c:chart xmlns:c="http://schemas.openxmlformats.org/drawingml/2006/chart" xmlns:r="http://schemas.openxmlformats.org/officeDocument/2006/relationships" r:id="rId2"/>
+          </a:graphicData>
+        </a:graphic>
+      </p:graphicFrame>
+    </p:spTree>
+    <p:extLst>
+      <p:ext uri="{BB962C8B-B14F-4D97-AF65-F5344CB8AC3E}">
+        <p14:creationId xmlns:p14="http://schemas.microsoft.com/office/powerpoint/2010/main" val="3853355965"/>
+      </p:ext>
+    </p:extLst>
+  </p:cSld>
+  <p:clrMapOvr>
+    <a:masterClrMapping/>
+  </p:clrMapOvr>
+</p:sld>
+</file>
+
 <file path=ppt/slides/slide3.xml><?xml version="1.0" encoding="utf-8"?>
 <p:sld xmlns:a="http://schemas.openxmlformats.org/drawingml/2006/main" xmlns:r="http://schemas.openxmlformats.org/officeDocument/2006/relationships" xmlns:p="http://schemas.openxmlformats.org/presentationml/2006/main" showMasterPhAnim="0">
   <p:cSld>

</xml_diff>